<commit_message>
update: created nasumama and others
</commit_message>
<xml_diff>
--- a/kikaku/potato_kikakusho.pptx
+++ b/kikaku/potato_kikakusho.pptx
@@ -206,7 +206,7 @@
           <a:p>
             <a:fld id="{D7D61A3E-AC6E-4B60-95A4-C1B3371851F9}" type="datetimeFigureOut">
               <a:rPr kumimoji="1" lang="ja-JP" altLang="en-US" smtClean="0"/>
-              <a:t>2023/10/17</a:t>
+              <a:t>2023/10/20</a:t>
             </a:fld>
             <a:endParaRPr kumimoji="1" lang="ja-JP" altLang="en-US"/>
           </a:p>
@@ -371,7 +371,7 @@
           <a:p>
             <a:fld id="{64C34F6E-DEEE-400C-92A1-19923C75B907}" type="datetimeFigureOut">
               <a:rPr kumimoji="1" lang="ja-JP" altLang="en-US" smtClean="0"/>
-              <a:t>2023/10/17</a:t>
+              <a:t>2023/10/20</a:t>
             </a:fld>
             <a:endParaRPr kumimoji="1" lang="ja-JP" altLang="en-US"/>
           </a:p>
@@ -873,7 +873,7 @@
           <a:p>
             <a:fld id="{14C5B98E-B881-44C6-965E-C4CBF4BD5DE0}" type="datetimeFigureOut">
               <a:rPr kumimoji="1" lang="ja-JP" altLang="en-US" smtClean="0"/>
-              <a:t>2023/10/17</a:t>
+              <a:t>2023/10/20</a:t>
             </a:fld>
             <a:endParaRPr kumimoji="1" lang="ja-JP" altLang="en-US"/>
           </a:p>
@@ -963,7 +963,7 @@
           <a:p>
             <a:fld id="{760FBDFE-C587-4B4C-A407-44438C67B59E}" type="datetimeFigureOut">
               <a:rPr lang="en-US" smtClean="0"/>
-              <a:t>10/17/2023</a:t>
+              <a:t>10/20/2023</a:t>
             </a:fld>
             <a:endParaRPr lang="en-US"/>
           </a:p>
@@ -1249,7 +1249,7 @@
           <a:p>
             <a:fld id="{14C5B98E-B881-44C6-965E-C4CBF4BD5DE0}" type="datetimeFigureOut">
               <a:rPr kumimoji="1" lang="ja-JP" altLang="en-US" smtClean="0"/>
-              <a:t>2023/10/17</a:t>
+              <a:t>2023/10/20</a:t>
             </a:fld>
             <a:endParaRPr kumimoji="1" lang="ja-JP" altLang="en-US"/>
           </a:p>
@@ -1489,7 +1489,7 @@
           <a:p>
             <a:fld id="{14C5B98E-B881-44C6-965E-C4CBF4BD5DE0}" type="datetimeFigureOut">
               <a:rPr kumimoji="1" lang="ja-JP" altLang="en-US" smtClean="0"/>
-              <a:t>2023/10/17</a:t>
+              <a:t>2023/10/20</a:t>
             </a:fld>
             <a:endParaRPr kumimoji="1" lang="ja-JP" altLang="en-US"/>
           </a:p>
@@ -1777,7 +1777,7 @@
           <a:p>
             <a:fld id="{14C5B98E-B881-44C6-965E-C4CBF4BD5DE0}" type="datetimeFigureOut">
               <a:rPr kumimoji="1" lang="ja-JP" altLang="en-US" smtClean="0"/>
-              <a:t>2023/10/17</a:t>
+              <a:t>2023/10/20</a:t>
             </a:fld>
             <a:endParaRPr kumimoji="1" lang="ja-JP" altLang="en-US"/>
           </a:p>
@@ -2200,7 +2200,7 @@
           <a:p>
             <a:fld id="{14C5B98E-B881-44C6-965E-C4CBF4BD5DE0}" type="datetimeFigureOut">
               <a:rPr kumimoji="1" lang="ja-JP" altLang="en-US" smtClean="0"/>
-              <a:t>2023/10/17</a:t>
+              <a:t>2023/10/20</a:t>
             </a:fld>
             <a:endParaRPr kumimoji="1" lang="ja-JP" altLang="en-US"/>
           </a:p>
@@ -2312,7 +2312,7 @@
           <a:p>
             <a:fld id="{14C5B98E-B881-44C6-965E-C4CBF4BD5DE0}" type="datetimeFigureOut">
               <a:rPr kumimoji="1" lang="ja-JP" altLang="en-US" smtClean="0"/>
-              <a:t>2023/10/17</a:t>
+              <a:t>2023/10/20</a:t>
             </a:fld>
             <a:endParaRPr kumimoji="1" lang="ja-JP" altLang="en-US"/>
           </a:p>
@@ -2402,7 +2402,7 @@
           <a:p>
             <a:fld id="{14C5B98E-B881-44C6-965E-C4CBF4BD5DE0}" type="datetimeFigureOut">
               <a:rPr kumimoji="1" lang="ja-JP" altLang="en-US" smtClean="0"/>
-              <a:t>2023/10/17</a:t>
+              <a:t>2023/10/20</a:t>
             </a:fld>
             <a:endParaRPr kumimoji="1" lang="ja-JP" altLang="en-US"/>
           </a:p>
@@ -2649,7 +2649,7 @@
           <a:p>
             <a:fld id="{14C5B98E-B881-44C6-965E-C4CBF4BD5DE0}" type="datetimeFigureOut">
               <a:rPr kumimoji="1" lang="ja-JP" altLang="en-US" smtClean="0"/>
-              <a:t>2023/10/17</a:t>
+              <a:t>2023/10/20</a:t>
             </a:fld>
             <a:endParaRPr kumimoji="1" lang="ja-JP" altLang="en-US"/>
           </a:p>
@@ -2948,7 +2948,7 @@
           <a:p>
             <a:fld id="{760FBDFE-C587-4B4C-A407-44438C67B59E}" type="datetimeFigureOut">
               <a:rPr lang="en-US" altLang="ja-JP" smtClean="0"/>
-              <a:t>10/17/2023</a:t>
+              <a:t>10/20/2023</a:t>
             </a:fld>
             <a:endParaRPr lang="ja-JP"/>
           </a:p>
@@ -3186,7 +3186,7 @@
           <a:p>
             <a:fld id="{14C5B98E-B881-44C6-965E-C4CBF4BD5DE0}" type="datetimeFigureOut">
               <a:rPr kumimoji="1" lang="ja-JP" altLang="en-US" smtClean="0"/>
-              <a:t>2023/10/17</a:t>
+              <a:t>2023/10/20</a:t>
             </a:fld>
             <a:endParaRPr kumimoji="1" lang="ja-JP" altLang="en-US"/>
           </a:p>
@@ -3909,7 +3909,7 @@
         </p:nvSpPr>
         <p:spPr>
           <a:xfrm>
-            <a:off x="366395" y="1259840"/>
+            <a:off x="374650" y="1259840"/>
             <a:ext cx="7148195" cy="1936206"/>
           </a:xfrm>
           <a:prstGeom prst="rect">
@@ -3925,124 +3925,147 @@
           <a:p>
             <a:pPr algn="l"/>
             <a:r>
-              <a:rPr lang="ja-JP" altLang="en-US" sz="3000" dirty="0">
+              <a:rPr lang="ja-JP" altLang="en-US" sz="2400" b="0" i="0" dirty="0">
                 <a:solidFill>
                   <a:schemeClr val="tx2">
                     <a:lumMod val="75000"/>
                   </a:schemeClr>
                 </a:solidFill>
-                <a:latin typeface="FOT-Popハッピネス Std EB" panose="02020900000000000000" charset="-128"/>
-                <a:ea typeface="FOT-Popハッピネス Std EB" panose="02020900000000000000" charset="-128"/>
-                <a:cs typeface="FOT-Popハッピネス Std EB" panose="02020900000000000000" charset="-128"/>
-              </a:rPr>
-              <a:t>ある日、ママから一通の手紙が。</a:t>
-            </a:r>
-            <a:endParaRPr lang="en-US" altLang="ja-JP" sz="3000" dirty="0">
+                <a:effectLst/>
+                <a:latin typeface="FOT-Popハッピネス Std EB" panose="02020900000000000000" pitchFamily="18" charset="-128"/>
+                <a:ea typeface="FOT-Popハッピネス Std EB" panose="02020900000000000000" pitchFamily="18" charset="-128"/>
+              </a:rPr>
+              <a:t>部屋の前に一通の手紙</a:t>
+            </a:r>
+            <a:endParaRPr lang="en-US" altLang="ja-JP" sz="2400" b="0" i="0" dirty="0">
               <a:solidFill>
                 <a:schemeClr val="tx2">
                   <a:lumMod val="75000"/>
                 </a:schemeClr>
               </a:solidFill>
-              <a:latin typeface="FOT-Popハッピネス Std EB" panose="02020900000000000000" charset="-128"/>
-              <a:ea typeface="FOT-Popハッピネス Std EB" panose="02020900000000000000" charset="-128"/>
-              <a:cs typeface="FOT-Popハッピネス Std EB" panose="02020900000000000000" charset="-128"/>
+              <a:effectLst/>
+              <a:latin typeface="FOT-Popハッピネス Std EB" panose="02020900000000000000" pitchFamily="18" charset="-128"/>
+              <a:ea typeface="FOT-Popハッピネス Std EB" panose="02020900000000000000" pitchFamily="18" charset="-128"/>
             </a:endParaRPr>
           </a:p>
           <a:p>
             <a:pPr algn="l"/>
             <a:r>
-              <a:rPr lang="ja-JP" altLang="en-US" sz="3000" dirty="0">
+              <a:rPr lang="ja-JP" altLang="en-US" sz="2400" b="0" i="0" dirty="0">
                 <a:solidFill>
                   <a:schemeClr val="tx2">
                     <a:lumMod val="75000"/>
                   </a:schemeClr>
                 </a:solidFill>
-                <a:latin typeface="FOT-Popハッピネス Std EB" panose="02020900000000000000" charset="-128"/>
-                <a:ea typeface="FOT-Popハッピネス Std EB" panose="02020900000000000000" charset="-128"/>
-                <a:cs typeface="FOT-Popハッピネス Std EB" panose="02020900000000000000" charset="-128"/>
-              </a:rPr>
-              <a:t>これからは自分の手で稼がなければ</a:t>
-            </a:r>
-            <a:r>
-              <a:rPr lang="en-US" altLang="ja-JP" sz="3000" dirty="0">
-                <a:solidFill>
-                  <a:schemeClr val="tx2">
-                    <a:lumMod val="75000"/>
-                  </a:schemeClr>
-                </a:solidFill>
-                <a:latin typeface="FOT-Popハッピネス Std EB" panose="02020900000000000000" charset="-128"/>
-                <a:ea typeface="FOT-Popハッピネス Std EB" panose="02020900000000000000" charset="-128"/>
-                <a:cs typeface="FOT-Popハッピネス Std EB" panose="02020900000000000000" charset="-128"/>
-              </a:rPr>
-              <a:t>...</a:t>
-            </a:r>
-            <a:endParaRPr lang="ja-JP" altLang="en-US" sz="3000" dirty="0">
+                <a:effectLst/>
+                <a:latin typeface="FOT-Popハッピネス Std EB" panose="02020900000000000000" pitchFamily="18" charset="-128"/>
+                <a:ea typeface="FOT-Popハッピネス Std EB" panose="02020900000000000000" pitchFamily="18" charset="-128"/>
+              </a:rPr>
+              <a:t>未来への旅立ちの合図</a:t>
+            </a:r>
+            <a:endParaRPr lang="en-US" altLang="ja-JP" sz="2400" b="0" i="0" dirty="0">
               <a:solidFill>
                 <a:schemeClr val="tx2">
                   <a:lumMod val="75000"/>
                 </a:schemeClr>
               </a:solidFill>
-              <a:latin typeface="FOT-Popハッピネス Std EB" panose="02020900000000000000" charset="-128"/>
-              <a:ea typeface="FOT-Popハッピネス Std EB" panose="02020900000000000000" charset="-128"/>
-              <a:cs typeface="FOT-Popハッピネス Std EB" panose="02020900000000000000" charset="-128"/>
+              <a:effectLst/>
+              <a:latin typeface="FOT-Popハッピネス Std EB" panose="02020900000000000000" pitchFamily="18" charset="-128"/>
+              <a:ea typeface="FOT-Popハッピネス Std EB" panose="02020900000000000000" pitchFamily="18" charset="-128"/>
             </a:endParaRPr>
           </a:p>
           <a:p>
             <a:pPr algn="l"/>
-            <a:endParaRPr lang="ja-JP" altLang="en-US" sz="3000" dirty="0">
+            <a:endParaRPr lang="ja-JP" altLang="en-US" sz="2400" b="0" i="0" dirty="0">
               <a:solidFill>
                 <a:schemeClr val="tx2">
                   <a:lumMod val="75000"/>
                 </a:schemeClr>
               </a:solidFill>
-              <a:latin typeface="FOT-Popハッピネス Std EB" panose="02020900000000000000" charset="-128"/>
-              <a:ea typeface="FOT-Popハッピネス Std EB" panose="02020900000000000000" charset="-128"/>
-              <a:cs typeface="FOT-Popハッピネス Std EB" panose="02020900000000000000" charset="-128"/>
+              <a:effectLst/>
+              <a:latin typeface="FOT-Popハッピネス Std EB" panose="02020900000000000000" pitchFamily="18" charset="-128"/>
+              <a:ea typeface="FOT-Popハッピネス Std EB" panose="02020900000000000000" pitchFamily="18" charset="-128"/>
             </a:endParaRPr>
           </a:p>
           <a:p>
             <a:pPr algn="l"/>
             <a:r>
-              <a:rPr lang="ja-JP" altLang="en-US" sz="3000" dirty="0">
+              <a:rPr lang="ja-JP" altLang="en-US" sz="2400" b="0" i="0" dirty="0">
                 <a:solidFill>
                   <a:schemeClr val="tx2">
                     <a:lumMod val="75000"/>
                   </a:schemeClr>
                 </a:solidFill>
-                <a:latin typeface="FOT-Popハッピネス Std EB" panose="02020900000000000000" charset="-128"/>
-                <a:ea typeface="FOT-Popハッピネス Std EB" panose="02020900000000000000" charset="-128"/>
-                <a:cs typeface="FOT-Popハッピネス Std EB" panose="02020900000000000000" charset="-128"/>
-                <a:sym typeface="+mn-ea"/>
-              </a:rPr>
-              <a:t>ステージ内に仕掛けられた</a:t>
-            </a:r>
-            <a:endParaRPr lang="en-US" altLang="ja-JP" sz="3000" dirty="0">
+                <a:effectLst/>
+                <a:latin typeface="FOT-Popハッピネス Std EB" panose="02020900000000000000" pitchFamily="18" charset="-128"/>
+                <a:ea typeface="FOT-Popハッピネス Std EB" panose="02020900000000000000" pitchFamily="18" charset="-128"/>
+              </a:rPr>
+              <a:t>これからは自分の手で稼がかなければ</a:t>
+            </a:r>
+            <a:endParaRPr lang="en-US" altLang="ja-JP" sz="2400" b="0" i="0" dirty="0">
               <a:solidFill>
                 <a:schemeClr val="tx2">
                   <a:lumMod val="75000"/>
                 </a:schemeClr>
               </a:solidFill>
-              <a:latin typeface="FOT-Popハッピネス Std EB" panose="02020900000000000000" charset="-128"/>
-              <a:ea typeface="FOT-Popハッピネス Std EB" panose="02020900000000000000" charset="-128"/>
-              <a:cs typeface="FOT-Popハッピネス Std EB" panose="02020900000000000000" charset="-128"/>
-              <a:sym typeface="+mn-ea"/>
+              <a:effectLst/>
+              <a:latin typeface="FOT-Popハッピネス Std EB" panose="02020900000000000000" pitchFamily="18" charset="-128"/>
+              <a:ea typeface="FOT-Popハッピネス Std EB" panose="02020900000000000000" pitchFamily="18" charset="-128"/>
             </a:endParaRPr>
           </a:p>
           <a:p>
             <a:pPr algn="l"/>
             <a:r>
-              <a:rPr lang="ja-JP" altLang="en-US" sz="3000" dirty="0">
+              <a:rPr lang="ja-JP" altLang="en-US" sz="2400" b="0" i="0" dirty="0">
                 <a:solidFill>
                   <a:schemeClr val="tx2">
                     <a:lumMod val="75000"/>
                   </a:schemeClr>
                 </a:solidFill>
-                <a:latin typeface="FOT-Popハッピネス Std EB" panose="02020900000000000000" charset="-128"/>
-                <a:ea typeface="FOT-Popハッピネス Std EB" panose="02020900000000000000" charset="-128"/>
-                <a:cs typeface="FOT-Popハッピネス Std EB" panose="02020900000000000000" charset="-128"/>
-                <a:sym typeface="+mn-ea"/>
-              </a:rPr>
-              <a:t>沢山の試練を乗り越えて就職を目指そう</a:t>
+                <a:effectLst/>
+                <a:latin typeface="FOT-Popハッピネス Std EB" panose="02020900000000000000" pitchFamily="18" charset="-128"/>
+                <a:ea typeface="FOT-Popハッピネス Std EB" panose="02020900000000000000" pitchFamily="18" charset="-128"/>
+              </a:rPr>
+              <a:t>生きていくための糧を</a:t>
+            </a:r>
+            <a:endParaRPr lang="en-US" altLang="ja-JP" sz="2400" b="0" i="0" dirty="0">
+              <a:solidFill>
+                <a:schemeClr val="tx2">
+                  <a:lumMod val="75000"/>
+                </a:schemeClr>
+              </a:solidFill>
+              <a:effectLst/>
+              <a:latin typeface="FOT-Popハッピネス Std EB" panose="02020900000000000000" pitchFamily="18" charset="-128"/>
+              <a:ea typeface="FOT-Popハッピネス Std EB" panose="02020900000000000000" pitchFamily="18" charset="-128"/>
+            </a:endParaRPr>
+          </a:p>
+          <a:p>
+            <a:pPr algn="l"/>
+            <a:endParaRPr lang="ja-JP" altLang="en-US" sz="2400" b="0" i="0" dirty="0">
+              <a:solidFill>
+                <a:schemeClr val="tx2">
+                  <a:lumMod val="75000"/>
+                </a:schemeClr>
+              </a:solidFill>
+              <a:effectLst/>
+              <a:latin typeface="FOT-Popハッピネス Std EB" panose="02020900000000000000" pitchFamily="18" charset="-128"/>
+              <a:ea typeface="FOT-Popハッピネス Std EB" panose="02020900000000000000" pitchFamily="18" charset="-128"/>
+            </a:endParaRPr>
+          </a:p>
+          <a:p>
+            <a:pPr algn="l"/>
+            <a:r>
+              <a:rPr lang="ja-JP" altLang="en-US" sz="2400" b="0" i="0" dirty="0">
+                <a:solidFill>
+                  <a:schemeClr val="tx2">
+                    <a:lumMod val="75000"/>
+                  </a:schemeClr>
+                </a:solidFill>
+                <a:effectLst/>
+                <a:latin typeface="FOT-Popハッピネス Std EB" panose="02020900000000000000" pitchFamily="18" charset="-128"/>
+                <a:ea typeface="FOT-Popハッピネス Std EB" panose="02020900000000000000" pitchFamily="18" charset="-128"/>
+              </a:rPr>
+              <a:t>ステージ内に仕掛けられたたくさんの試練 それを乗り越えて就職を目指そう</a:t>
             </a:r>
           </a:p>
         </p:txBody>
@@ -4111,7 +4134,7 @@
         </p:nvSpPr>
         <p:spPr>
           <a:xfrm>
-            <a:off x="450850" y="4244340"/>
+            <a:off x="374650" y="5329509"/>
             <a:ext cx="7254240" cy="829945"/>
           </a:xfrm>
           <a:prstGeom prst="rect">
@@ -4735,7 +4758,7 @@
         <p:spPr>
           <a:xfrm>
             <a:off x="898842" y="1322705"/>
-            <a:ext cx="10394315" cy="4647426"/>
+            <a:ext cx="10394315" cy="3785652"/>
           </a:xfrm>
           <a:prstGeom prst="rect">
             <a:avLst/>
@@ -4957,109 +4980,11 @@
               <a:t>			Notion</a:t>
             </a:r>
           </a:p>
-          <a:p>
-            <a:endParaRPr lang="en-US" altLang="ja-JP" sz="2800" dirty="0">
-              <a:solidFill>
-                <a:schemeClr val="tx2">
-                  <a:lumMod val="75000"/>
-                </a:schemeClr>
-              </a:solidFill>
-              <a:latin typeface="FOT-Popハッピネス Std EB" panose="02020900000000000000" charset="-128"/>
-              <a:ea typeface="FOT-Popハッピネス Std EB" panose="02020900000000000000" charset="-128"/>
-              <a:cs typeface="FOT-Popハッピネス Std EB" panose="02020900000000000000" charset="-128"/>
-            </a:endParaRPr>
-          </a:p>
-          <a:p>
-            <a:r>
-              <a:rPr lang="ja-JP" altLang="en-US" sz="2800" dirty="0">
-                <a:solidFill>
-                  <a:schemeClr val="tx2">
-                    <a:lumMod val="75000"/>
-                  </a:schemeClr>
-                </a:solidFill>
-                <a:latin typeface="FOT-Popハッピネス Std EB" panose="02020900000000000000" charset="-128"/>
-                <a:ea typeface="FOT-Popハッピネス Std EB" panose="02020900000000000000" charset="-128"/>
-                <a:cs typeface="FOT-Popハッピネス Std EB" panose="02020900000000000000" charset="-128"/>
-              </a:rPr>
-              <a:t>キーボード</a:t>
-            </a:r>
-            <a:r>
-              <a:rPr lang="en-US" altLang="ja-JP" sz="2800" dirty="0">
-                <a:solidFill>
-                  <a:schemeClr val="tx2">
-                    <a:lumMod val="75000"/>
-                  </a:schemeClr>
-                </a:solidFill>
-                <a:latin typeface="FOT-Popハッピネス Std EB" panose="02020900000000000000" charset="-128"/>
-                <a:ea typeface="FOT-Popハッピネス Std EB" panose="02020900000000000000" charset="-128"/>
-                <a:cs typeface="FOT-Popハッピネス Std EB" panose="02020900000000000000" charset="-128"/>
-              </a:rPr>
-              <a:t>		</a:t>
-            </a:r>
-            <a:r>
-              <a:rPr lang="en-US" altLang="ja-JP" sz="2800" dirty="0" err="1">
-                <a:solidFill>
-                  <a:schemeClr val="tx2">
-                    <a:lumMod val="75000"/>
-                  </a:schemeClr>
-                </a:solidFill>
-                <a:latin typeface="FOT-Popハッピネス Std EB" panose="02020900000000000000" charset="-128"/>
-                <a:ea typeface="FOT-Popハッピネス Std EB" panose="02020900000000000000" charset="-128"/>
-                <a:cs typeface="FOT-Popハッピネス Std EB" panose="02020900000000000000" charset="-128"/>
-              </a:rPr>
-              <a:t>Keychron</a:t>
-            </a:r>
-            <a:r>
-              <a:rPr lang="en-US" altLang="ja-JP" sz="2800" dirty="0">
-                <a:solidFill>
-                  <a:schemeClr val="tx2">
-                    <a:lumMod val="75000"/>
-                  </a:schemeClr>
-                </a:solidFill>
-                <a:latin typeface="FOT-Popハッピネス Std EB" panose="02020900000000000000" charset="-128"/>
-                <a:ea typeface="FOT-Popハッピネス Std EB" panose="02020900000000000000" charset="-128"/>
-                <a:cs typeface="FOT-Popハッピネス Std EB" panose="02020900000000000000" charset="-128"/>
-              </a:rPr>
-              <a:t> K8 Pro / </a:t>
-            </a:r>
-            <a:r>
-              <a:rPr lang="en-US" altLang="ja-JP" sz="2800" dirty="0" err="1">
-                <a:solidFill>
-                  <a:schemeClr val="tx2">
-                    <a:lumMod val="75000"/>
-                  </a:schemeClr>
-                </a:solidFill>
-                <a:latin typeface="FOT-Popハッピネス Std EB" panose="02020900000000000000" charset="-128"/>
-                <a:ea typeface="FOT-Popハッピネス Std EB" panose="02020900000000000000" charset="-128"/>
-                <a:cs typeface="FOT-Popハッピネス Std EB" panose="02020900000000000000" charset="-128"/>
-              </a:rPr>
-              <a:t>Gateron</a:t>
-            </a:r>
-            <a:r>
-              <a:rPr lang="en-US" altLang="ja-JP" sz="2800" dirty="0">
-                <a:solidFill>
-                  <a:schemeClr val="tx2">
-                    <a:lumMod val="75000"/>
-                  </a:schemeClr>
-                </a:solidFill>
-                <a:latin typeface="FOT-Popハッピネス Std EB" panose="02020900000000000000" charset="-128"/>
-                <a:ea typeface="FOT-Popハッピネス Std EB" panose="02020900000000000000" charset="-128"/>
-                <a:cs typeface="FOT-Popハッピネス Std EB" panose="02020900000000000000" charset="-128"/>
-              </a:rPr>
-              <a:t> Silent Clear</a:t>
-            </a:r>
-          </a:p>
-        </p:txBody>
-      </p:sp>
-      <p:sp>
-        <p:nvSpPr>
-          <p:cNvPr id="2" name="テキストボックス 5">
-            <a:extLst>
-              <a:ext uri="{FF2B5EF4-FFF2-40B4-BE49-F238E27FC236}">
-                <a16:creationId xmlns:a16="http://schemas.microsoft.com/office/drawing/2014/main" id="{4C81B350-A9AB-A887-DB23-D261A5AA8937}"/>
-              </a:ext>
-            </a:extLst>
-          </p:cNvPr>
+        </p:txBody>
+      </p:sp>
+      <p:sp>
+        <p:nvSpPr>
+          <p:cNvPr id="2" name="テキストボックス 5"/>
           <p:cNvSpPr txBox="1"/>
           <p:nvPr/>
         </p:nvSpPr>

</xml_diff>

<commit_message>
update: edited kikakusho, rework nasumama skil
</commit_message>
<xml_diff>
--- a/kikaku/potato_kikakusho.pptx
+++ b/kikaku/potato_kikakusho.pptx
@@ -5,16 +5,17 @@
     <p:sldMasterId id="2147483648" r:id="rId1"/>
   </p:sldMasterIdLst>
   <p:notesMasterIdLst>
-    <p:notesMasterId r:id="rId6"/>
+    <p:notesMasterId r:id="rId4"/>
   </p:notesMasterIdLst>
   <p:handoutMasterIdLst>
-    <p:handoutMasterId r:id="rId7"/>
+    <p:handoutMasterId r:id="rId9"/>
   </p:handoutMasterIdLst>
   <p:sldIdLst>
-    <p:sldId id="256" r:id="rId2"/>
-    <p:sldId id="259" r:id="rId3"/>
-    <p:sldId id="257" r:id="rId4"/>
-    <p:sldId id="258" r:id="rId5"/>
+    <p:sldId id="256" r:id="rId3"/>
+    <p:sldId id="259" r:id="rId5"/>
+    <p:sldId id="262" r:id="rId6"/>
+    <p:sldId id="257" r:id="rId7"/>
+    <p:sldId id="258" r:id="rId8"/>
   </p:sldIdLst>
   <p:sldSz cx="12192000" cy="6858000"/>
   <p:notesSz cx="6858000" cy="9144000"/>
@@ -113,14 +114,6 @@
       </a:defRPr>
     </a:lvl9pPr>
   </p:defaultTextStyle>
-  <p:extLst>
-    <p:ext uri="{EFAFB233-063F-42B5-8137-9DF3F51BA10A}">
-      <p15:sldGuideLst xmlns:p15="http://schemas.microsoft.com/office/powerpoint/2012/main"/>
-    </p:ext>
-    <p:ext uri="{2D200454-40CA-4A62-9FC3-DE9A4176ACB9}">
-      <p15:notesGuideLst xmlns:p15="http://schemas.microsoft.com/office/powerpoint/2012/main"/>
-    </p:ext>
-  </p:extLst>
 </p:presentation>
 </file>
 
@@ -206,7 +199,6 @@
           <a:p>
             <a:fld id="{D7D61A3E-AC6E-4B60-95A4-C1B3371851F9}" type="datetimeFigureOut">
               <a:rPr kumimoji="1" lang="ja-JP" altLang="en-US" smtClean="0"/>
-              <a:t>2023/10/20</a:t>
             </a:fld>
             <a:endParaRPr kumimoji="1" lang="ja-JP" altLang="en-US"/>
           </a:p>
@@ -272,18 +264,12 @@
           <a:p>
             <a:fld id="{0990A3E0-14E8-4BE6-85AB-5C5385A62A44}" type="slidenum">
               <a:rPr kumimoji="1" lang="ja-JP" altLang="en-US" smtClean="0"/>
-              <a:t>‹#›</a:t>
             </a:fld>
             <a:endParaRPr kumimoji="1" lang="ja-JP" altLang="en-US"/>
           </a:p>
         </p:txBody>
       </p:sp>
     </p:spTree>
-    <p:extLst>
-      <p:ext uri="{BB962C8B-B14F-4D97-AF65-F5344CB8AC3E}">
-        <p14:creationId xmlns:p14="http://schemas.microsoft.com/office/powerpoint/2010/main" val="1"/>
-      </p:ext>
-    </p:extLst>
   </p:cSld>
   <p:clrMap bg1="lt1" tx1="dk1" bg2="lt2" tx2="dk2" accent1="accent1" accent2="accent2" accent3="accent3" accent4="accent4" accent5="accent5" accent6="accent6" hlink="hlink" folHlink="folHlink"/>
 </p:handoutMaster>
@@ -371,7 +357,6 @@
           <a:p>
             <a:fld id="{64C34F6E-DEEE-400C-92A1-19923C75B907}" type="datetimeFigureOut">
               <a:rPr kumimoji="1" lang="ja-JP" altLang="en-US" smtClean="0"/>
-              <a:t>2023/10/20</a:t>
             </a:fld>
             <a:endParaRPr kumimoji="1" lang="ja-JP" altLang="en-US"/>
           </a:p>
@@ -438,6 +423,7 @@
               <a:rPr kumimoji="1" lang="ja-JP" altLang="en-US"/>
               <a:t>マスター テキストの書式設定</a:t>
             </a:r>
+            <a:endParaRPr kumimoji="1" lang="ja-JP" altLang="en-US"/>
           </a:p>
           <a:p>
             <a:pPr lvl="1"/>
@@ -453,6 +439,7 @@
               <a:rPr kumimoji="1" lang="ja-JP" altLang="en-US"/>
               <a:t>レベル</a:t>
             </a:r>
+            <a:endParaRPr kumimoji="1" lang="ja-JP" altLang="en-US"/>
           </a:p>
           <a:p>
             <a:pPr lvl="2"/>
@@ -468,6 +455,7 @@
               <a:rPr kumimoji="1" lang="ja-JP" altLang="en-US"/>
               <a:t>レベル</a:t>
             </a:r>
+            <a:endParaRPr kumimoji="1" lang="ja-JP" altLang="en-US"/>
           </a:p>
           <a:p>
             <a:pPr lvl="3"/>
@@ -483,6 +471,7 @@
               <a:rPr kumimoji="1" lang="ja-JP" altLang="en-US"/>
               <a:t>レベル</a:t>
             </a:r>
+            <a:endParaRPr kumimoji="1" lang="ja-JP" altLang="en-US"/>
           </a:p>
           <a:p>
             <a:pPr lvl="4"/>
@@ -498,6 +487,7 @@
               <a:rPr kumimoji="1" lang="ja-JP" altLang="en-US"/>
               <a:t>レベル</a:t>
             </a:r>
+            <a:endParaRPr kumimoji="1" lang="ja-JP" altLang="en-US"/>
           </a:p>
         </p:txBody>
       </p:sp>
@@ -561,7 +551,6 @@
           <a:p>
             <a:fld id="{8D23A1E1-D89E-4D9F-ACC7-724568FAD569}" type="slidenum">
               <a:rPr kumimoji="1" lang="ja-JP" altLang="en-US" smtClean="0"/>
-              <a:t>‹#›</a:t>
             </a:fld>
             <a:endParaRPr kumimoji="1" lang="ja-JP" altLang="en-US"/>
           </a:p>
@@ -730,7 +719,6 @@
           <a:p>
             <a:fld id="{8D23A1E1-D89E-4D9F-ACC7-724568FAD569}" type="slidenum">
               <a:rPr kumimoji="1" lang="ja-JP" altLang="en-US" smtClean="0"/>
-              <a:t>1</a:t>
             </a:fld>
             <a:endParaRPr kumimoji="1" lang="ja-JP" altLang="en-US"/>
           </a:p>
@@ -789,6 +777,7 @@
               <a:rPr kumimoji="1" lang="ja-JP" altLang="en-US"/>
               <a:t>マスター タイトルの書式設定</a:t>
             </a:r>
+            <a:endParaRPr kumimoji="1" lang="ja-JP" altLang="en-US"/>
           </a:p>
         </p:txBody>
       </p:sp>
@@ -853,6 +842,7 @@
               <a:rPr kumimoji="1" lang="ja-JP" altLang="en-US"/>
               <a:t>マスター サブタイトルの書式設定</a:t>
             </a:r>
+            <a:endParaRPr kumimoji="1" lang="ja-JP" altLang="en-US"/>
           </a:p>
         </p:txBody>
       </p:sp>
@@ -873,7 +863,6 @@
           <a:p>
             <a:fld id="{14C5B98E-B881-44C6-965E-C4CBF4BD5DE0}" type="datetimeFigureOut">
               <a:rPr kumimoji="1" lang="ja-JP" altLang="en-US" smtClean="0"/>
-              <a:t>2023/10/20</a:t>
             </a:fld>
             <a:endParaRPr kumimoji="1" lang="ja-JP" altLang="en-US"/>
           </a:p>
@@ -915,7 +904,6 @@
           <a:p>
             <a:fld id="{B261B85B-3F11-4807-BF0A-089ABAB91E6D}" type="slidenum">
               <a:rPr kumimoji="1" lang="ja-JP" altLang="en-US" smtClean="0"/>
-              <a:t>‹#›</a:t>
             </a:fld>
             <a:endParaRPr kumimoji="1" lang="ja-JP" altLang="en-US"/>
           </a:p>
@@ -963,7 +951,6 @@
           <a:p>
             <a:fld id="{760FBDFE-C587-4B4C-A407-44438C67B59E}" type="datetimeFigureOut">
               <a:rPr lang="en-US" smtClean="0"/>
-              <a:t>10/20/2023</a:t>
             </a:fld>
             <a:endParaRPr lang="en-US"/>
           </a:p>
@@ -988,6 +975,7 @@
               <a:rPr lang="en-US"/>
               <a:t>フッター</a:t>
             </a:r>
+            <a:endParaRPr lang="en-US"/>
           </a:p>
         </p:txBody>
       </p:sp>
@@ -1008,7 +996,6 @@
           <a:p>
             <a:fld id="{49AE70B2-8BF9-45C0-BB95-33D1B9D3A854}" type="slidenum">
               <a:rPr lang="en-US" smtClean="0"/>
-              <a:t>‹#›</a:t>
             </a:fld>
             <a:endParaRPr lang="en-US"/>
           </a:p>
@@ -1039,6 +1026,7 @@
               <a:rPr kumimoji="1" lang="ja-JP" altLang="en-US" dirty="0"/>
               <a:t>マスター テキストの書式設定</a:t>
             </a:r>
+            <a:endParaRPr kumimoji="1" lang="ja-JP" altLang="en-US" dirty="0"/>
           </a:p>
           <a:p>
             <a:pPr lvl="1"/>
@@ -1054,6 +1042,7 @@
               <a:rPr kumimoji="1" lang="ja-JP" altLang="en-US" dirty="0"/>
               <a:t>レベル</a:t>
             </a:r>
+            <a:endParaRPr kumimoji="1" lang="ja-JP" altLang="en-US" dirty="0"/>
           </a:p>
           <a:p>
             <a:pPr lvl="2"/>
@@ -1069,6 +1058,7 @@
               <a:rPr kumimoji="1" lang="ja-JP" altLang="en-US" dirty="0"/>
               <a:t>レベル</a:t>
             </a:r>
+            <a:endParaRPr kumimoji="1" lang="ja-JP" altLang="en-US" dirty="0"/>
           </a:p>
           <a:p>
             <a:pPr lvl="3"/>
@@ -1084,6 +1074,7 @@
               <a:rPr kumimoji="1" lang="ja-JP" altLang="en-US" dirty="0"/>
               <a:t>レベル</a:t>
             </a:r>
+            <a:endParaRPr kumimoji="1" lang="ja-JP" altLang="en-US" dirty="0"/>
           </a:p>
           <a:p>
             <a:pPr lvl="4"/>
@@ -1099,6 +1090,7 @@
               <a:rPr kumimoji="1" lang="ja-JP" altLang="en-US" dirty="0"/>
               <a:t>レベル</a:t>
             </a:r>
+            <a:endParaRPr kumimoji="1" lang="ja-JP" altLang="en-US" dirty="0"/>
           </a:p>
         </p:txBody>
       </p:sp>
@@ -1146,6 +1138,7 @@
               <a:rPr kumimoji="1" lang="ja-JP" altLang="en-US"/>
               <a:t>マスター タイトルの書式設定</a:t>
             </a:r>
+            <a:endParaRPr kumimoji="1" lang="ja-JP" altLang="en-US"/>
           </a:p>
         </p:txBody>
       </p:sp>
@@ -1169,6 +1162,7 @@
               <a:rPr kumimoji="1" lang="ja-JP" altLang="en-US"/>
               <a:t>マスター テキストの書式設定</a:t>
             </a:r>
+            <a:endParaRPr kumimoji="1" lang="ja-JP" altLang="en-US"/>
           </a:p>
           <a:p>
             <a:pPr lvl="1"/>
@@ -1184,6 +1178,7 @@
               <a:rPr kumimoji="1" lang="ja-JP" altLang="en-US"/>
               <a:t>レベル</a:t>
             </a:r>
+            <a:endParaRPr kumimoji="1" lang="ja-JP" altLang="en-US"/>
           </a:p>
           <a:p>
             <a:pPr lvl="2"/>
@@ -1199,6 +1194,7 @@
               <a:rPr kumimoji="1" lang="ja-JP" altLang="en-US"/>
               <a:t>レベル</a:t>
             </a:r>
+            <a:endParaRPr kumimoji="1" lang="ja-JP" altLang="en-US"/>
           </a:p>
           <a:p>
             <a:pPr lvl="3"/>
@@ -1214,6 +1210,7 @@
               <a:rPr kumimoji="1" lang="ja-JP" altLang="en-US"/>
               <a:t>レベル</a:t>
             </a:r>
+            <a:endParaRPr kumimoji="1" lang="ja-JP" altLang="en-US"/>
           </a:p>
           <a:p>
             <a:pPr lvl="4"/>
@@ -1229,6 +1226,7 @@
               <a:rPr kumimoji="1" lang="ja-JP" altLang="en-US"/>
               <a:t>レベル</a:t>
             </a:r>
+            <a:endParaRPr kumimoji="1" lang="ja-JP" altLang="en-US"/>
           </a:p>
         </p:txBody>
       </p:sp>
@@ -1249,7 +1247,6 @@
           <a:p>
             <a:fld id="{14C5B98E-B881-44C6-965E-C4CBF4BD5DE0}" type="datetimeFigureOut">
               <a:rPr kumimoji="1" lang="ja-JP" altLang="en-US" smtClean="0"/>
-              <a:t>2023/10/20</a:t>
             </a:fld>
             <a:endParaRPr kumimoji="1" lang="ja-JP" altLang="en-US"/>
           </a:p>
@@ -1291,7 +1288,6 @@
           <a:p>
             <a:fld id="{B261B85B-3F11-4807-BF0A-089ABAB91E6D}" type="slidenum">
               <a:rPr kumimoji="1" lang="ja-JP" altLang="en-US" smtClean="0"/>
-              <a:t>‹#›</a:t>
             </a:fld>
             <a:endParaRPr kumimoji="1" lang="ja-JP" altLang="en-US"/>
           </a:p>
@@ -1350,6 +1346,7 @@
               <a:rPr kumimoji="1" lang="ja-JP" altLang="en-US"/>
               <a:t>マスター タイトルの書式設定</a:t>
             </a:r>
+            <a:endParaRPr kumimoji="1" lang="ja-JP" altLang="en-US"/>
           </a:p>
         </p:txBody>
       </p:sp>
@@ -1469,6 +1466,7 @@
               <a:rPr kumimoji="1" lang="ja-JP" altLang="en-US"/>
               <a:t>マスター テキストの書式設定</a:t>
             </a:r>
+            <a:endParaRPr kumimoji="1" lang="ja-JP" altLang="en-US"/>
           </a:p>
         </p:txBody>
       </p:sp>
@@ -1489,7 +1487,6 @@
           <a:p>
             <a:fld id="{14C5B98E-B881-44C6-965E-C4CBF4BD5DE0}" type="datetimeFigureOut">
               <a:rPr kumimoji="1" lang="ja-JP" altLang="en-US" smtClean="0"/>
-              <a:t>2023/10/20</a:t>
             </a:fld>
             <a:endParaRPr kumimoji="1" lang="ja-JP" altLang="en-US"/>
           </a:p>
@@ -1531,7 +1528,6 @@
           <a:p>
             <a:fld id="{B261B85B-3F11-4807-BF0A-089ABAB91E6D}" type="slidenum">
               <a:rPr kumimoji="1" lang="ja-JP" altLang="en-US" smtClean="0"/>
-              <a:t>‹#›</a:t>
             </a:fld>
             <a:endParaRPr kumimoji="1" lang="ja-JP" altLang="en-US"/>
           </a:p>
@@ -1581,6 +1577,7 @@
               <a:rPr kumimoji="1" lang="ja-JP" altLang="en-US"/>
               <a:t>マスター タイトルの書式設定</a:t>
             </a:r>
+            <a:endParaRPr kumimoji="1" lang="ja-JP" altLang="en-US"/>
           </a:p>
         </p:txBody>
       </p:sp>
@@ -1609,6 +1606,7 @@
               <a:rPr kumimoji="1" lang="ja-JP" altLang="en-US"/>
               <a:t>マスター テキストの書式設定</a:t>
             </a:r>
+            <a:endParaRPr kumimoji="1" lang="ja-JP" altLang="en-US"/>
           </a:p>
           <a:p>
             <a:pPr lvl="1"/>
@@ -1624,6 +1622,7 @@
               <a:rPr kumimoji="1" lang="ja-JP" altLang="en-US"/>
               <a:t>レベル</a:t>
             </a:r>
+            <a:endParaRPr kumimoji="1" lang="ja-JP" altLang="en-US"/>
           </a:p>
           <a:p>
             <a:pPr lvl="2"/>
@@ -1639,6 +1638,7 @@
               <a:rPr kumimoji="1" lang="ja-JP" altLang="en-US"/>
               <a:t>レベル</a:t>
             </a:r>
+            <a:endParaRPr kumimoji="1" lang="ja-JP" altLang="en-US"/>
           </a:p>
           <a:p>
             <a:pPr lvl="3"/>
@@ -1654,6 +1654,7 @@
               <a:rPr kumimoji="1" lang="ja-JP" altLang="en-US"/>
               <a:t>レベル</a:t>
             </a:r>
+            <a:endParaRPr kumimoji="1" lang="ja-JP" altLang="en-US"/>
           </a:p>
           <a:p>
             <a:pPr lvl="4"/>
@@ -1669,6 +1670,7 @@
               <a:rPr kumimoji="1" lang="ja-JP" altLang="en-US"/>
               <a:t>レベル</a:t>
             </a:r>
+            <a:endParaRPr kumimoji="1" lang="ja-JP" altLang="en-US"/>
           </a:p>
         </p:txBody>
       </p:sp>
@@ -1697,6 +1699,7 @@
               <a:rPr kumimoji="1" lang="ja-JP" altLang="en-US"/>
               <a:t>マスター テキストの書式設定</a:t>
             </a:r>
+            <a:endParaRPr kumimoji="1" lang="ja-JP" altLang="en-US"/>
           </a:p>
           <a:p>
             <a:pPr lvl="1"/>
@@ -1712,6 +1715,7 @@
               <a:rPr kumimoji="1" lang="ja-JP" altLang="en-US"/>
               <a:t>レベル</a:t>
             </a:r>
+            <a:endParaRPr kumimoji="1" lang="ja-JP" altLang="en-US"/>
           </a:p>
           <a:p>
             <a:pPr lvl="2"/>
@@ -1727,6 +1731,7 @@
               <a:rPr kumimoji="1" lang="ja-JP" altLang="en-US"/>
               <a:t>レベル</a:t>
             </a:r>
+            <a:endParaRPr kumimoji="1" lang="ja-JP" altLang="en-US"/>
           </a:p>
           <a:p>
             <a:pPr lvl="3"/>
@@ -1742,6 +1747,7 @@
               <a:rPr kumimoji="1" lang="ja-JP" altLang="en-US"/>
               <a:t>レベル</a:t>
             </a:r>
+            <a:endParaRPr kumimoji="1" lang="ja-JP" altLang="en-US"/>
           </a:p>
           <a:p>
             <a:pPr lvl="4"/>
@@ -1757,6 +1763,7 @@
               <a:rPr kumimoji="1" lang="ja-JP" altLang="en-US"/>
               <a:t>レベル</a:t>
             </a:r>
+            <a:endParaRPr kumimoji="1" lang="ja-JP" altLang="en-US"/>
           </a:p>
         </p:txBody>
       </p:sp>
@@ -1777,7 +1784,6 @@
           <a:p>
             <a:fld id="{14C5B98E-B881-44C6-965E-C4CBF4BD5DE0}" type="datetimeFigureOut">
               <a:rPr kumimoji="1" lang="ja-JP" altLang="en-US" smtClean="0"/>
-              <a:t>2023/10/20</a:t>
             </a:fld>
             <a:endParaRPr kumimoji="1" lang="ja-JP" altLang="en-US"/>
           </a:p>
@@ -1819,7 +1825,6 @@
           <a:p>
             <a:fld id="{B261B85B-3F11-4807-BF0A-089ABAB91E6D}" type="slidenum">
               <a:rPr kumimoji="1" lang="ja-JP" altLang="en-US" smtClean="0"/>
-              <a:t>‹#›</a:t>
             </a:fld>
             <a:endParaRPr kumimoji="1" lang="ja-JP" altLang="en-US"/>
           </a:p>
@@ -1874,6 +1879,7 @@
               <a:rPr kumimoji="1" lang="ja-JP" altLang="en-US"/>
               <a:t>マスター タイトルの書式設定</a:t>
             </a:r>
+            <a:endParaRPr kumimoji="1" lang="ja-JP" altLang="en-US"/>
           </a:p>
         </p:txBody>
       </p:sp>
@@ -1939,6 +1945,7 @@
               <a:rPr kumimoji="1" lang="ja-JP" altLang="en-US"/>
               <a:t>マスター テキストの書式設定</a:t>
             </a:r>
+            <a:endParaRPr kumimoji="1" lang="ja-JP" altLang="en-US"/>
           </a:p>
         </p:txBody>
       </p:sp>
@@ -1967,6 +1974,7 @@
               <a:rPr kumimoji="1" lang="ja-JP" altLang="en-US"/>
               <a:t>マスター テキストの書式設定</a:t>
             </a:r>
+            <a:endParaRPr kumimoji="1" lang="ja-JP" altLang="en-US"/>
           </a:p>
           <a:p>
             <a:pPr lvl="1"/>
@@ -1982,6 +1990,7 @@
               <a:rPr kumimoji="1" lang="ja-JP" altLang="en-US"/>
               <a:t>レベル</a:t>
             </a:r>
+            <a:endParaRPr kumimoji="1" lang="ja-JP" altLang="en-US"/>
           </a:p>
           <a:p>
             <a:pPr lvl="2"/>
@@ -1997,6 +2006,7 @@
               <a:rPr kumimoji="1" lang="ja-JP" altLang="en-US"/>
               <a:t>レベル</a:t>
             </a:r>
+            <a:endParaRPr kumimoji="1" lang="ja-JP" altLang="en-US"/>
           </a:p>
           <a:p>
             <a:pPr lvl="3"/>
@@ -2012,6 +2022,7 @@
               <a:rPr kumimoji="1" lang="ja-JP" altLang="en-US"/>
               <a:t>レベル</a:t>
             </a:r>
+            <a:endParaRPr kumimoji="1" lang="ja-JP" altLang="en-US"/>
           </a:p>
           <a:p>
             <a:pPr lvl="4"/>
@@ -2027,6 +2038,7 @@
               <a:rPr kumimoji="1" lang="ja-JP" altLang="en-US"/>
               <a:t>レベル</a:t>
             </a:r>
+            <a:endParaRPr kumimoji="1" lang="ja-JP" altLang="en-US"/>
           </a:p>
         </p:txBody>
       </p:sp>
@@ -2092,6 +2104,7 @@
               <a:rPr kumimoji="1" lang="ja-JP" altLang="en-US"/>
               <a:t>マスター テキストの書式設定</a:t>
             </a:r>
+            <a:endParaRPr kumimoji="1" lang="ja-JP" altLang="en-US"/>
           </a:p>
         </p:txBody>
       </p:sp>
@@ -2120,6 +2133,7 @@
               <a:rPr kumimoji="1" lang="ja-JP" altLang="en-US"/>
               <a:t>マスター テキストの書式設定</a:t>
             </a:r>
+            <a:endParaRPr kumimoji="1" lang="ja-JP" altLang="en-US"/>
           </a:p>
           <a:p>
             <a:pPr lvl="1"/>
@@ -2135,6 +2149,7 @@
               <a:rPr kumimoji="1" lang="ja-JP" altLang="en-US"/>
               <a:t>レベル</a:t>
             </a:r>
+            <a:endParaRPr kumimoji="1" lang="ja-JP" altLang="en-US"/>
           </a:p>
           <a:p>
             <a:pPr lvl="2"/>
@@ -2150,6 +2165,7 @@
               <a:rPr kumimoji="1" lang="ja-JP" altLang="en-US"/>
               <a:t>レベル</a:t>
             </a:r>
+            <a:endParaRPr kumimoji="1" lang="ja-JP" altLang="en-US"/>
           </a:p>
           <a:p>
             <a:pPr lvl="3"/>
@@ -2165,6 +2181,7 @@
               <a:rPr kumimoji="1" lang="ja-JP" altLang="en-US"/>
               <a:t>レベル</a:t>
             </a:r>
+            <a:endParaRPr kumimoji="1" lang="ja-JP" altLang="en-US"/>
           </a:p>
           <a:p>
             <a:pPr lvl="4"/>
@@ -2180,6 +2197,7 @@
               <a:rPr kumimoji="1" lang="ja-JP" altLang="en-US"/>
               <a:t>レベル</a:t>
             </a:r>
+            <a:endParaRPr kumimoji="1" lang="ja-JP" altLang="en-US"/>
           </a:p>
         </p:txBody>
       </p:sp>
@@ -2200,7 +2218,6 @@
           <a:p>
             <a:fld id="{14C5B98E-B881-44C6-965E-C4CBF4BD5DE0}" type="datetimeFigureOut">
               <a:rPr kumimoji="1" lang="ja-JP" altLang="en-US" smtClean="0"/>
-              <a:t>2023/10/20</a:t>
             </a:fld>
             <a:endParaRPr kumimoji="1" lang="ja-JP" altLang="en-US"/>
           </a:p>
@@ -2242,7 +2259,6 @@
           <a:p>
             <a:fld id="{B261B85B-3F11-4807-BF0A-089ABAB91E6D}" type="slidenum">
               <a:rPr kumimoji="1" lang="ja-JP" altLang="en-US" smtClean="0"/>
-              <a:t>‹#›</a:t>
             </a:fld>
             <a:endParaRPr kumimoji="1" lang="ja-JP" altLang="en-US"/>
           </a:p>
@@ -2292,6 +2308,7 @@
               <a:rPr kumimoji="1" lang="ja-JP" altLang="en-US"/>
               <a:t>マスター タイトルの書式設定</a:t>
             </a:r>
+            <a:endParaRPr kumimoji="1" lang="ja-JP" altLang="en-US"/>
           </a:p>
         </p:txBody>
       </p:sp>
@@ -2312,7 +2329,6 @@
           <a:p>
             <a:fld id="{14C5B98E-B881-44C6-965E-C4CBF4BD5DE0}" type="datetimeFigureOut">
               <a:rPr kumimoji="1" lang="ja-JP" altLang="en-US" smtClean="0"/>
-              <a:t>2023/10/20</a:t>
             </a:fld>
             <a:endParaRPr kumimoji="1" lang="ja-JP" altLang="en-US"/>
           </a:p>
@@ -2354,7 +2370,6 @@
           <a:p>
             <a:fld id="{B261B85B-3F11-4807-BF0A-089ABAB91E6D}" type="slidenum">
               <a:rPr kumimoji="1" lang="ja-JP" altLang="en-US" smtClean="0"/>
-              <a:t>‹#›</a:t>
             </a:fld>
             <a:endParaRPr kumimoji="1" lang="ja-JP" altLang="en-US"/>
           </a:p>
@@ -2402,7 +2417,6 @@
           <a:p>
             <a:fld id="{14C5B98E-B881-44C6-965E-C4CBF4BD5DE0}" type="datetimeFigureOut">
               <a:rPr kumimoji="1" lang="ja-JP" altLang="en-US" smtClean="0"/>
-              <a:t>2023/10/20</a:t>
             </a:fld>
             <a:endParaRPr kumimoji="1" lang="ja-JP" altLang="en-US"/>
           </a:p>
@@ -2444,7 +2458,6 @@
           <a:p>
             <a:fld id="{B261B85B-3F11-4807-BF0A-089ABAB91E6D}" type="slidenum">
               <a:rPr kumimoji="1" lang="ja-JP" altLang="en-US" smtClean="0"/>
-              <a:t>‹#›</a:t>
             </a:fld>
             <a:endParaRPr kumimoji="1" lang="ja-JP" altLang="en-US"/>
           </a:p>
@@ -2503,6 +2516,7 @@
               <a:rPr kumimoji="1" lang="ja-JP" altLang="en-US"/>
               <a:t>マスター タイトルの書式設定</a:t>
             </a:r>
+            <a:endParaRPr kumimoji="1" lang="ja-JP" altLang="en-US"/>
           </a:p>
         </p:txBody>
       </p:sp>
@@ -2629,6 +2643,7 @@
               <a:rPr kumimoji="1" lang="ja-JP" altLang="en-US"/>
               <a:t>マスター テキストの書式設定</a:t>
             </a:r>
+            <a:endParaRPr kumimoji="1" lang="ja-JP" altLang="en-US"/>
           </a:p>
         </p:txBody>
       </p:sp>
@@ -2649,7 +2664,6 @@
           <a:p>
             <a:fld id="{14C5B98E-B881-44C6-965E-C4CBF4BD5DE0}" type="datetimeFigureOut">
               <a:rPr kumimoji="1" lang="ja-JP" altLang="en-US" smtClean="0"/>
-              <a:t>2023/10/20</a:t>
             </a:fld>
             <a:endParaRPr kumimoji="1" lang="ja-JP" altLang="en-US"/>
           </a:p>
@@ -2691,7 +2705,6 @@
           <a:p>
             <a:fld id="{B261B85B-3F11-4807-BF0A-089ABAB91E6D}" type="slidenum">
               <a:rPr kumimoji="1" lang="ja-JP" altLang="en-US" smtClean="0"/>
-              <a:t>‹#›</a:t>
             </a:fld>
             <a:endParaRPr kumimoji="1" lang="ja-JP" altLang="en-US"/>
           </a:p>
@@ -2752,6 +2765,7 @@
               <a:rPr lang="ja-JP"/>
               <a:t>マスター タイトルの書式設定</a:t>
             </a:r>
+            <a:endParaRPr lang="ja-JP"/>
           </a:p>
         </p:txBody>
       </p:sp>
@@ -2840,6 +2854,7 @@
               <a:rPr kumimoji="1" lang="ja-JP" altLang="en-US" dirty="0"/>
               <a:t>マスター テキストの書式設定</a:t>
             </a:r>
+            <a:endParaRPr kumimoji="1" lang="ja-JP" altLang="en-US" dirty="0"/>
           </a:p>
           <a:p>
             <a:pPr marL="685800" lvl="1" indent="-228600" algn="l" defTabSz="914400" rtl="0" eaLnBrk="1" latinLnBrk="0" hangingPunct="1">
@@ -2856,6 +2871,7 @@
               <a:rPr kumimoji="1" lang="ja-JP" altLang="en-US" dirty="0"/>
               <a:t>第 2 レベル</a:t>
             </a:r>
+            <a:endParaRPr kumimoji="1" lang="ja-JP" altLang="en-US" dirty="0"/>
           </a:p>
           <a:p>
             <a:pPr marL="1143000" lvl="2" indent="-228600" algn="l" defTabSz="914400" rtl="0" eaLnBrk="1" latinLnBrk="0" hangingPunct="1">
@@ -2880,6 +2896,7 @@
               <a:rPr kumimoji="1" lang="ja-JP" altLang="en-US" dirty="0"/>
               <a:t>レベル</a:t>
             </a:r>
+            <a:endParaRPr kumimoji="1" lang="ja-JP" altLang="en-US" dirty="0"/>
           </a:p>
           <a:p>
             <a:pPr marL="1600200" lvl="3" indent="-228600" algn="l" defTabSz="914400" rtl="0" eaLnBrk="1" latinLnBrk="0" hangingPunct="1">
@@ -2904,6 +2921,7 @@
               <a:rPr kumimoji="1" lang="ja-JP" altLang="en-US" dirty="0"/>
               <a:t>レベル</a:t>
             </a:r>
+            <a:endParaRPr kumimoji="1" lang="ja-JP" altLang="en-US" dirty="0"/>
           </a:p>
           <a:p>
             <a:pPr marL="2057400" lvl="4" indent="-228600" algn="l" defTabSz="914400" rtl="0" eaLnBrk="1" latinLnBrk="0" hangingPunct="1">
@@ -2928,6 +2946,7 @@
               <a:rPr kumimoji="1" lang="ja-JP" altLang="en-US" dirty="0"/>
               <a:t>レベル</a:t>
             </a:r>
+            <a:endParaRPr kumimoji="1" lang="ja-JP" altLang="en-US" dirty="0"/>
           </a:p>
         </p:txBody>
       </p:sp>
@@ -2948,7 +2967,6 @@
           <a:p>
             <a:fld id="{760FBDFE-C587-4B4C-A407-44438C67B59E}" type="datetimeFigureOut">
               <a:rPr lang="en-US" altLang="ja-JP" smtClean="0"/>
-              <a:t>10/20/2023</a:t>
             </a:fld>
             <a:endParaRPr lang="ja-JP"/>
           </a:p>
@@ -2990,7 +3008,6 @@
           <a:p>
             <a:fld id="{49AE70B2-8BF9-45C0-BB95-33D1B9D3A854}" type="slidenum">
               <a:rPr lang="en-US" altLang="ja-JP" smtClean="0"/>
-              <a:t>‹#›</a:t>
             </a:fld>
             <a:endParaRPr lang="ja-JP"/>
           </a:p>
@@ -3055,6 +3072,7 @@
               <a:rPr kumimoji="1" lang="ja-JP" altLang="en-US"/>
               <a:t>マスター タイトルの書式設定</a:t>
             </a:r>
+            <a:endParaRPr kumimoji="1" lang="ja-JP" altLang="en-US"/>
           </a:p>
         </p:txBody>
       </p:sp>
@@ -3088,6 +3106,7 @@
               <a:rPr kumimoji="1" lang="ja-JP" altLang="en-US"/>
               <a:t>マスター テキストの書式設定</a:t>
             </a:r>
+            <a:endParaRPr kumimoji="1" lang="ja-JP" altLang="en-US"/>
           </a:p>
           <a:p>
             <a:pPr lvl="1"/>
@@ -3103,6 +3122,7 @@
               <a:rPr kumimoji="1" lang="ja-JP" altLang="en-US"/>
               <a:t>レベル</a:t>
             </a:r>
+            <a:endParaRPr kumimoji="1" lang="ja-JP" altLang="en-US"/>
           </a:p>
           <a:p>
             <a:pPr lvl="2"/>
@@ -3118,6 +3138,7 @@
               <a:rPr kumimoji="1" lang="ja-JP" altLang="en-US"/>
               <a:t>レベル</a:t>
             </a:r>
+            <a:endParaRPr kumimoji="1" lang="ja-JP" altLang="en-US"/>
           </a:p>
           <a:p>
             <a:pPr lvl="3"/>
@@ -3133,6 +3154,7 @@
               <a:rPr kumimoji="1" lang="ja-JP" altLang="en-US"/>
               <a:t>レベル</a:t>
             </a:r>
+            <a:endParaRPr kumimoji="1" lang="ja-JP" altLang="en-US"/>
           </a:p>
           <a:p>
             <a:pPr lvl="4"/>
@@ -3148,6 +3170,7 @@
               <a:rPr kumimoji="1" lang="ja-JP" altLang="en-US"/>
               <a:t>レベル</a:t>
             </a:r>
+            <a:endParaRPr kumimoji="1" lang="ja-JP" altLang="en-US"/>
           </a:p>
         </p:txBody>
       </p:sp>
@@ -3186,7 +3209,6 @@
           <a:p>
             <a:fld id="{14C5B98E-B881-44C6-965E-C4CBF4BD5DE0}" type="datetimeFigureOut">
               <a:rPr kumimoji="1" lang="ja-JP" altLang="en-US" smtClean="0"/>
-              <a:t>2023/10/20</a:t>
             </a:fld>
             <a:endParaRPr kumimoji="1" lang="ja-JP" altLang="en-US"/>
           </a:p>
@@ -3264,7 +3286,6 @@
           <a:p>
             <a:fld id="{B261B85B-3F11-4807-BF0A-089ABAB91E6D}" type="slidenum">
               <a:rPr kumimoji="1" lang="ja-JP" altLang="en-US" smtClean="0"/>
-              <a:t>‹#›</a:t>
             </a:fld>
             <a:endParaRPr kumimoji="1" lang="ja-JP" altLang="en-US"/>
           </a:p>
@@ -3617,8 +3638,11 @@
           <a:p>
             <a:r>
               <a:rPr kumimoji="1" lang="ja-JP" altLang="en-US" dirty="0">
-                <a:latin typeface="FOT-Popハッピネス Std EB" panose="02020900000000000000" charset="-128"/>
-                <a:ea typeface="FOT-Popハッピネス Std EB" panose="02020900000000000000" charset="-128"/>
+                <a:solidFill>
+                  <a:srgbClr val="FF0000"/>
+                </a:solidFill>
+                <a:latin typeface="なぎの" charset="-120"/>
+                <a:ea typeface="なぎの" charset="-120"/>
               </a:rPr>
               <a:t>🍅</a:t>
             </a:r>
@@ -3629,11 +3653,20 @@
                     <a:lumMod val="75000"/>
                   </a:schemeClr>
                 </a:solidFill>
-                <a:latin typeface="FOT-Popハッピネス Std EB" panose="02020900000000000000" charset="-128"/>
-                <a:ea typeface="FOT-Popハッピネス Std EB" panose="02020900000000000000" charset="-128"/>
+                <a:latin typeface="なぎの" charset="-120"/>
+                <a:ea typeface="なぎの" charset="-120"/>
               </a:rPr>
               <a:t>くんのひきこもり脱出ゲーム</a:t>
             </a:r>
+            <a:endParaRPr kumimoji="1" lang="ja-JP" altLang="en-US" dirty="0">
+              <a:solidFill>
+                <a:schemeClr val="tx2">
+                  <a:lumMod val="75000"/>
+                </a:schemeClr>
+              </a:solidFill>
+              <a:latin typeface="なぎの" charset="-120"/>
+              <a:ea typeface="なぎの" charset="-120"/>
+            </a:endParaRPr>
           </a:p>
         </p:txBody>
       </p:sp>
@@ -3665,17 +3698,17 @@
                 <a:solidFill>
                   <a:schemeClr val="accent6"/>
                 </a:solidFill>
-                <a:latin typeface="FOT-Popハッピネス Std EB" panose="02020900000000000000" charset="-128"/>
-                <a:ea typeface="FOT-Popハッピネス Std EB" panose="02020900000000000000" charset="-128"/>
-                <a:cs typeface="FOT-Popハッピネス Std EB" panose="02020900000000000000" charset="-128"/>
+                <a:latin typeface="なぎの" charset="-120"/>
+                <a:ea typeface="なぎの" charset="-120"/>
+                <a:cs typeface="なぎの" charset="-120"/>
               </a:rPr>
               <a:t>ジャンル</a:t>
             </a:r>
             <a:r>
               <a:rPr lang="en-US" altLang="ja-JP" sz="3200" dirty="0">
-                <a:latin typeface="FOT-Popハッピネス Std EB" panose="02020900000000000000" charset="-128"/>
-                <a:ea typeface="FOT-Popハッピネス Std EB" panose="02020900000000000000" charset="-128"/>
-                <a:cs typeface="FOT-Popハッピネス Std EB" panose="02020900000000000000" charset="-128"/>
+                <a:latin typeface="なぎの" charset="-120"/>
+                <a:ea typeface="なぎの" charset="-120"/>
+                <a:cs typeface="なぎの" charset="-120"/>
               </a:rPr>
               <a:t>		</a:t>
             </a:r>
@@ -3686,9 +3719,9 @@
                     <a:lumMod val="75000"/>
                   </a:schemeClr>
                 </a:solidFill>
-                <a:latin typeface="FOT-Popハッピネス Std EB" panose="02020900000000000000" charset="-128"/>
-                <a:ea typeface="FOT-Popハッピネス Std EB" panose="02020900000000000000" charset="-128"/>
-                <a:cs typeface="FOT-Popハッピネス Std EB" panose="02020900000000000000" charset="-128"/>
+                <a:latin typeface="なぎの" charset="-120"/>
+                <a:ea typeface="なぎの" charset="-120"/>
+                <a:cs typeface="なぎの" charset="-120"/>
               </a:rPr>
               <a:t>2D</a:t>
             </a:r>
@@ -3699,12 +3732,22 @@
                     <a:lumMod val="75000"/>
                   </a:schemeClr>
                 </a:solidFill>
-                <a:latin typeface="FOT-Popハッピネス Std EB" panose="02020900000000000000" charset="-128"/>
-                <a:ea typeface="FOT-Popハッピネス Std EB" panose="02020900000000000000" charset="-128"/>
-                <a:cs typeface="FOT-Popハッピネス Std EB" panose="02020900000000000000" charset="-128"/>
+                <a:latin typeface="なぎの" charset="-120"/>
+                <a:ea typeface="なぎの" charset="-120"/>
+                <a:cs typeface="なぎの" charset="-120"/>
               </a:rPr>
               <a:t>横スクロールアクション</a:t>
             </a:r>
+            <a:endParaRPr lang="ja-JP" altLang="en-US" sz="3200" dirty="0">
+              <a:solidFill>
+                <a:schemeClr val="tx2">
+                  <a:lumMod val="75000"/>
+                </a:schemeClr>
+              </a:solidFill>
+              <a:latin typeface="なぎの" charset="-120"/>
+              <a:ea typeface="なぎの" charset="-120"/>
+              <a:cs typeface="なぎの" charset="-120"/>
+            </a:endParaRPr>
           </a:p>
           <a:p>
             <a:pPr algn="l"/>
@@ -3713,17 +3756,17 @@
                 <a:solidFill>
                   <a:srgbClr val="7030A0"/>
                 </a:solidFill>
-                <a:latin typeface="FOT-Popハッピネス Std EB" panose="02020900000000000000" charset="-128"/>
-                <a:ea typeface="FOT-Popハッピネス Std EB" panose="02020900000000000000" charset="-128"/>
-                <a:cs typeface="FOT-Popハッピネス Std EB" panose="02020900000000000000" charset="-128"/>
+                <a:latin typeface="なぎの" charset="-120"/>
+                <a:ea typeface="なぎの" charset="-120"/>
+                <a:cs typeface="なぎの" charset="-120"/>
               </a:rPr>
               <a:t>コンセプト</a:t>
             </a:r>
             <a:r>
               <a:rPr lang="en-US" altLang="ja-JP" sz="3200" dirty="0">
-                <a:latin typeface="FOT-Popハッピネス Std EB" panose="02020900000000000000" charset="-128"/>
-                <a:ea typeface="FOT-Popハッピネス Std EB" panose="02020900000000000000" charset="-128"/>
-                <a:cs typeface="FOT-Popハッピネス Std EB" panose="02020900000000000000" charset="-128"/>
+                <a:latin typeface="なぎの" charset="-120"/>
+                <a:ea typeface="なぎの" charset="-120"/>
+                <a:cs typeface="なぎの" charset="-120"/>
               </a:rPr>
               <a:t>	</a:t>
             </a:r>
@@ -3734,13 +3777,24 @@
                     <a:lumMod val="75000"/>
                   </a:schemeClr>
                 </a:solidFill>
-                <a:latin typeface="FOT-Popハッピネス Std EB" panose="02020900000000000000" charset="-128"/>
-                <a:ea typeface="FOT-Popハッピネス Std EB" panose="02020900000000000000" charset="-128"/>
-                <a:cs typeface="FOT-Popハッピネス Std EB" panose="02020900000000000000" charset="-128"/>
+                <a:latin typeface="なぎの" charset="-120"/>
+                <a:ea typeface="なぎの" charset="-120"/>
+                <a:cs typeface="なぎの" charset="-120"/>
                 <a:sym typeface="+mn-ea"/>
               </a:rPr>
               <a:t>精神力増強トレーニングゲーム・改</a:t>
             </a:r>
+            <a:endParaRPr lang="ja-JP" altLang="en-US" sz="3200" dirty="0">
+              <a:solidFill>
+                <a:schemeClr val="tx2">
+                  <a:lumMod val="75000"/>
+                </a:schemeClr>
+              </a:solidFill>
+              <a:latin typeface="なぎの" charset="-120"/>
+              <a:ea typeface="なぎの" charset="-120"/>
+              <a:cs typeface="なぎの" charset="-120"/>
+              <a:sym typeface="+mn-ea"/>
+            </a:endParaRPr>
           </a:p>
           <a:p>
             <a:pPr algn="l"/>
@@ -3749,18 +3803,18 @@
                 <a:solidFill>
                   <a:schemeClr val="accent5"/>
                 </a:solidFill>
-                <a:latin typeface="FOT-Popハッピネス Std EB" panose="02020900000000000000" charset="-128"/>
-                <a:ea typeface="FOT-Popハッピネス Std EB" panose="02020900000000000000" charset="-128"/>
-                <a:cs typeface="FOT-Popハッピネス Std EB" panose="02020900000000000000" charset="-128"/>
+                <a:latin typeface="なぎの" charset="-120"/>
+                <a:ea typeface="なぎの" charset="-120"/>
+                <a:cs typeface="なぎの" charset="-120"/>
                 <a:sym typeface="+mn-ea"/>
               </a:rPr>
               <a:t>ターゲット</a:t>
             </a:r>
             <a:r>
               <a:rPr lang="en-US" altLang="ja-JP" sz="3200" dirty="0">
-                <a:latin typeface="FOT-Popハッピネス Std EB" panose="02020900000000000000" charset="-128"/>
-                <a:ea typeface="FOT-Popハッピネス Std EB" panose="02020900000000000000" charset="-128"/>
-                <a:cs typeface="FOT-Popハッピネス Std EB" panose="02020900000000000000" charset="-128"/>
+                <a:latin typeface="なぎの" charset="-120"/>
+                <a:ea typeface="なぎの" charset="-120"/>
+                <a:cs typeface="なぎの" charset="-120"/>
                 <a:sym typeface="+mn-ea"/>
               </a:rPr>
               <a:t>	</a:t>
@@ -3772,9 +3826,9 @@
                     <a:lumMod val="75000"/>
                   </a:schemeClr>
                 </a:solidFill>
-                <a:latin typeface="FOT-Popハッピネス Std EB" panose="02020900000000000000" charset="-128"/>
-                <a:ea typeface="FOT-Popハッピネス Std EB" panose="02020900000000000000" charset="-128"/>
-                <a:cs typeface="FOT-Popハッピネス Std EB" panose="02020900000000000000" charset="-128"/>
+                <a:latin typeface="なぎの" charset="-120"/>
+                <a:ea typeface="なぎの" charset="-120"/>
+                <a:cs typeface="なぎの" charset="-120"/>
                 <a:sym typeface="+mn-ea"/>
               </a:rPr>
               <a:t>メンタルトレーニングをしたい人</a:t>
@@ -3785,9 +3839,9 @@
                   <a:lumMod val="75000"/>
                 </a:schemeClr>
               </a:solidFill>
-              <a:latin typeface="FOT-Popハッピネス Std EB" panose="02020900000000000000" charset="-128"/>
-              <a:ea typeface="FOT-Popハッピネス Std EB" panose="02020900000000000000" charset="-128"/>
-              <a:cs typeface="FOT-Popハッピネス Std EB" panose="02020900000000000000" charset="-128"/>
+              <a:latin typeface="なぎの" charset="-120"/>
+              <a:ea typeface="なぎの" charset="-120"/>
+              <a:cs typeface="なぎの" charset="-120"/>
               <a:sym typeface="+mn-ea"/>
             </a:endParaRPr>
           </a:p>
@@ -3802,7 +3856,7 @@
           <p:nvPr/>
         </p:nvPicPr>
         <p:blipFill>
-          <a:blip r:embed="rId3"/>
+          <a:blip r:embed="rId1"/>
           <a:srcRect b="33173"/>
           <a:stretch>
             <a:fillRect/>
@@ -3892,12 +3946,38 @@
           <a:p>
             <a:pPr algn="ctr"/>
             <a:r>
-              <a:rPr lang="en-US" altLang="ja-JP" sz="4000">
-                <a:latin typeface="FOT-Popハッピネス Std EB" panose="02020900000000000000" charset="-128"/>
-                <a:ea typeface="FOT-Popハッピネス Std EB" panose="02020900000000000000" charset="-128"/>
-              </a:rPr>
-              <a:t>Untitled</a:t>
-            </a:r>
+              <a:rPr lang="ja-JP" altLang="en-US" sz="3200">
+                <a:solidFill>
+                  <a:schemeClr val="tx2">
+                    <a:lumMod val="75000"/>
+                  </a:schemeClr>
+                </a:solidFill>
+                <a:latin typeface="なぎの" charset="-120"/>
+                <a:ea typeface="なぎの" charset="-120"/>
+              </a:rPr>
+              <a:t>一通の手紙、旅立ちの合図。</a:t>
+            </a:r>
+            <a:r>
+              <a:rPr lang="ja-JP" altLang="en-US" sz="3200" strike="sngStrike">
+                <a:solidFill>
+                  <a:schemeClr val="tx2">
+                    <a:lumMod val="75000"/>
+                  </a:schemeClr>
+                </a:solidFill>
+                <a:latin typeface="なぎの" charset="-120"/>
+                <a:ea typeface="なぎの" charset="-120"/>
+              </a:rPr>
+              <a:t>新たな世界へ躍り込む。</a:t>
+            </a:r>
+            <a:endParaRPr lang="ja-JP" altLang="en-US" sz="3200" strike="sngStrike">
+              <a:solidFill>
+                <a:schemeClr val="tx2">
+                  <a:lumMod val="75000"/>
+                </a:schemeClr>
+              </a:solidFill>
+              <a:latin typeface="なぎの" charset="-120"/>
+              <a:ea typeface="なぎの" charset="-120"/>
+            </a:endParaRPr>
           </a:p>
         </p:txBody>
       </p:sp>
@@ -3932,24 +4012,12 @@
                   </a:schemeClr>
                 </a:solidFill>
                 <a:effectLst/>
-                <a:latin typeface="FOT-Popハッピネス Std EB" panose="02020900000000000000" pitchFamily="18" charset="-128"/>
-                <a:ea typeface="FOT-Popハッピネス Std EB" panose="02020900000000000000" pitchFamily="18" charset="-128"/>
-              </a:rPr>
-              <a:t>部屋の前に一通の手紙</a:t>
-            </a:r>
-            <a:endParaRPr lang="en-US" altLang="ja-JP" sz="2400" b="0" i="0" dirty="0">
-              <a:solidFill>
-                <a:schemeClr val="tx2">
-                  <a:lumMod val="75000"/>
-                </a:schemeClr>
-              </a:solidFill>
-              <a:effectLst/>
-              <a:latin typeface="FOT-Popハッピネス Std EB" panose="02020900000000000000" pitchFamily="18" charset="-128"/>
-              <a:ea typeface="FOT-Popハッピネス Std EB" panose="02020900000000000000" pitchFamily="18" charset="-128"/>
-            </a:endParaRPr>
-          </a:p>
-          <a:p>
-            <a:pPr algn="l"/>
+                <a:latin typeface="なぎの" charset="-120"/>
+                <a:ea typeface="なぎの" charset="-120"/>
+                <a:cs typeface="なぎの" charset="-120"/>
+              </a:rPr>
+              <a:t>ステージ内に仕掛けられたたくさんの試練</a:t>
+            </a:r>
             <a:r>
               <a:rPr lang="ja-JP" altLang="en-US" sz="2400" b="0" i="0" dirty="0">
                 <a:solidFill>
@@ -3958,24 +4026,12 @@
                   </a:schemeClr>
                 </a:solidFill>
                 <a:effectLst/>
-                <a:latin typeface="FOT-Popハッピネス Std EB" panose="02020900000000000000" pitchFamily="18" charset="-128"/>
-                <a:ea typeface="FOT-Popハッピネス Std EB" panose="02020900000000000000" pitchFamily="18" charset="-128"/>
-              </a:rPr>
-              <a:t>未来への旅立ちの合図</a:t>
-            </a:r>
-            <a:endParaRPr lang="en-US" altLang="ja-JP" sz="2400" b="0" i="0" dirty="0">
-              <a:solidFill>
-                <a:schemeClr val="tx2">
-                  <a:lumMod val="75000"/>
-                </a:schemeClr>
-              </a:solidFill>
-              <a:effectLst/>
-              <a:latin typeface="FOT-Popハッピネス Std EB" panose="02020900000000000000" pitchFamily="18" charset="-128"/>
-              <a:ea typeface="FOT-Popハッピネス Std EB" panose="02020900000000000000" pitchFamily="18" charset="-128"/>
-            </a:endParaRPr>
-          </a:p>
-          <a:p>
-            <a:pPr algn="l"/>
+                <a:latin typeface="なぎの" charset="-120"/>
+                <a:ea typeface="なぎの" charset="-120"/>
+                <a:cs typeface="なぎの" charset="-120"/>
+              </a:rPr>
+              <a:t>。</a:t>
+            </a:r>
             <a:endParaRPr lang="ja-JP" altLang="en-US" sz="2400" b="0" i="0" dirty="0">
               <a:solidFill>
                 <a:schemeClr val="tx2">
@@ -3983,8 +4039,9 @@
                 </a:schemeClr>
               </a:solidFill>
               <a:effectLst/>
-              <a:latin typeface="FOT-Popハッピネス Std EB" panose="02020900000000000000" pitchFamily="18" charset="-128"/>
-              <a:ea typeface="FOT-Popハッピネス Std EB" panose="02020900000000000000" pitchFamily="18" charset="-128"/>
+              <a:latin typeface="なぎの" charset="-120"/>
+              <a:ea typeface="なぎの" charset="-120"/>
+              <a:cs typeface="なぎの" charset="-120"/>
             </a:endParaRPr>
           </a:p>
           <a:p>
@@ -3997,24 +4054,12 @@
                   </a:schemeClr>
                 </a:solidFill>
                 <a:effectLst/>
-                <a:latin typeface="FOT-Popハッピネス Std EB" panose="02020900000000000000" pitchFamily="18" charset="-128"/>
-                <a:ea typeface="FOT-Popハッピネス Std EB" panose="02020900000000000000" pitchFamily="18" charset="-128"/>
-              </a:rPr>
-              <a:t>これからは自分の手で稼がかなければ</a:t>
-            </a:r>
-            <a:endParaRPr lang="en-US" altLang="ja-JP" sz="2400" b="0" i="0" dirty="0">
-              <a:solidFill>
-                <a:schemeClr val="tx2">
-                  <a:lumMod val="75000"/>
-                </a:schemeClr>
-              </a:solidFill>
-              <a:effectLst/>
-              <a:latin typeface="FOT-Popハッピネス Std EB" panose="02020900000000000000" pitchFamily="18" charset="-128"/>
-              <a:ea typeface="FOT-Popハッピネス Std EB" panose="02020900000000000000" pitchFamily="18" charset="-128"/>
-            </a:endParaRPr>
-          </a:p>
-          <a:p>
-            <a:pPr algn="l"/>
+                <a:latin typeface="なぎの" charset="-120"/>
+                <a:ea typeface="なぎの" charset="-120"/>
+                <a:cs typeface="なぎの" charset="-120"/>
+              </a:rPr>
+              <a:t>越えた先には明るい未来</a:t>
+            </a:r>
             <a:r>
               <a:rPr lang="ja-JP" altLang="en-US" sz="2400" b="0" i="0" dirty="0">
                 <a:solidFill>
@@ -4023,24 +4068,12 @@
                   </a:schemeClr>
                 </a:solidFill>
                 <a:effectLst/>
-                <a:latin typeface="FOT-Popハッピネス Std EB" panose="02020900000000000000" pitchFamily="18" charset="-128"/>
-                <a:ea typeface="FOT-Popハッピネス Std EB" panose="02020900000000000000" pitchFamily="18" charset="-128"/>
-              </a:rPr>
-              <a:t>生きていくための糧を</a:t>
-            </a:r>
-            <a:endParaRPr lang="en-US" altLang="ja-JP" sz="2400" b="0" i="0" dirty="0">
-              <a:solidFill>
-                <a:schemeClr val="tx2">
-                  <a:lumMod val="75000"/>
-                </a:schemeClr>
-              </a:solidFill>
-              <a:effectLst/>
-              <a:latin typeface="FOT-Popハッピネス Std EB" panose="02020900000000000000" pitchFamily="18" charset="-128"/>
-              <a:ea typeface="FOT-Popハッピネス Std EB" panose="02020900000000000000" pitchFamily="18" charset="-128"/>
-            </a:endParaRPr>
-          </a:p>
-          <a:p>
-            <a:pPr algn="l"/>
+                <a:latin typeface="なぎの" charset="-120"/>
+                <a:ea typeface="なぎの" charset="-120"/>
+                <a:cs typeface="なぎの" charset="-120"/>
+              </a:rPr>
+              <a:t>が。</a:t>
+            </a:r>
             <a:endParaRPr lang="ja-JP" altLang="en-US" sz="2400" b="0" i="0" dirty="0">
               <a:solidFill>
                 <a:schemeClr val="tx2">
@@ -4048,25 +4081,10 @@
                 </a:schemeClr>
               </a:solidFill>
               <a:effectLst/>
-              <a:latin typeface="FOT-Popハッピネス Std EB" panose="02020900000000000000" pitchFamily="18" charset="-128"/>
-              <a:ea typeface="FOT-Popハッピネス Std EB" panose="02020900000000000000" pitchFamily="18" charset="-128"/>
+              <a:latin typeface="なぎの" charset="-120"/>
+              <a:ea typeface="なぎの" charset="-120"/>
+              <a:cs typeface="なぎの" charset="-120"/>
             </a:endParaRPr>
-          </a:p>
-          <a:p>
-            <a:pPr algn="l"/>
-            <a:r>
-              <a:rPr lang="ja-JP" altLang="en-US" sz="2400" b="0" i="0" dirty="0">
-                <a:solidFill>
-                  <a:schemeClr val="tx2">
-                    <a:lumMod val="75000"/>
-                  </a:schemeClr>
-                </a:solidFill>
-                <a:effectLst/>
-                <a:latin typeface="FOT-Popハッピネス Std EB" panose="02020900000000000000" pitchFamily="18" charset="-128"/>
-                <a:ea typeface="FOT-Popハッピネス Std EB" panose="02020900000000000000" pitchFamily="18" charset="-128"/>
-              </a:rPr>
-              <a:t>ステージ内に仕掛けられたたくさんの試練 それを乗り越えて就職を目指そう</a:t>
-            </a:r>
           </a:p>
         </p:txBody>
       </p:sp>
@@ -4079,7 +4097,7 @@
           <p:nvPr/>
         </p:nvPicPr>
         <p:blipFill>
-          <a:blip r:embed="rId2"/>
+          <a:blip r:embed="rId1"/>
           <a:srcRect l="7" r="7"/>
           <a:stretch>
             <a:fillRect/>
@@ -4111,7 +4129,7 @@
           <p:nvPr/>
         </p:nvPicPr>
         <p:blipFill>
-          <a:blip r:embed="rId3"/>
+          <a:blip r:embed="rId2"/>
           <a:stretch>
             <a:fillRect/>
           </a:stretch>
@@ -4126,57 +4144,6 @@
           </a:prstGeom>
         </p:spPr>
       </p:pic>
-      <p:sp>
-        <p:nvSpPr>
-          <p:cNvPr id="10" name="テキストボックス 9"/>
-          <p:cNvSpPr txBox="1"/>
-          <p:nvPr/>
-        </p:nvSpPr>
-        <p:spPr>
-          <a:xfrm>
-            <a:off x="374650" y="5329509"/>
-            <a:ext cx="7254240" cy="829945"/>
-          </a:xfrm>
-          <a:prstGeom prst="rect">
-            <a:avLst/>
-          </a:prstGeom>
-          <a:noFill/>
-        </p:spPr>
-        <p:txBody>
-          <a:bodyPr wrap="square" rtlCol="0">
-            <a:spAutoFit/>
-          </a:bodyPr>
-          <a:lstStyle/>
-          <a:p>
-            <a:r>
-              <a:rPr lang="ja-JP" altLang="en-US" sz="2400" dirty="0">
-                <a:solidFill>
-                  <a:schemeClr val="tx2">
-                    <a:lumMod val="75000"/>
-                  </a:schemeClr>
-                </a:solidFill>
-                <a:latin typeface="FOT-Popハッピネス Std EB" panose="02020900000000000000" charset="-128"/>
-                <a:ea typeface="FOT-Popハッピネス Std EB" panose="02020900000000000000" charset="-128"/>
-              </a:rPr>
-              <a:t>全三話</a:t>
-            </a:r>
-          </a:p>
-          <a:p>
-            <a:r>
-              <a:rPr lang="ja-JP" altLang="en-US" sz="2400" dirty="0">
-                <a:solidFill>
-                  <a:schemeClr val="tx2">
-                    <a:lumMod val="75000"/>
-                  </a:schemeClr>
-                </a:solidFill>
-                <a:latin typeface="FOT-Popハッピネス Std EB" panose="02020900000000000000" charset="-128"/>
-                <a:ea typeface="FOT-Popハッピネス Std EB" panose="02020900000000000000" charset="-128"/>
-              </a:rPr>
-              <a:t>ステージ選択制</a:t>
-            </a:r>
-          </a:p>
-        </p:txBody>
-      </p:sp>
     </p:spTree>
   </p:cSld>
   <p:clrMapOvr>
@@ -4212,78 +4179,147 @@
       </p:grpSpPr>
       <p:sp>
         <p:nvSpPr>
-          <p:cNvPr id="2" name="タイトル 1"/>
-          <p:cNvSpPr>
-            <a:spLocks noGrp="1"/>
-          </p:cNvSpPr>
-          <p:nvPr>
-            <p:ph type="title"/>
-          </p:nvPr>
+          <p:cNvPr id="4" name="タイトル 1"/>
+          <p:cNvSpPr>
+            <a:spLocks noGrp="1"/>
+          </p:cNvSpPr>
+          <p:nvPr/>
         </p:nvSpPr>
         <p:spPr>
           <a:xfrm>
-            <a:off x="838200" y="136525"/>
+            <a:off x="838200" y="295275"/>
             <a:ext cx="10515600" cy="591820"/>
           </a:xfrm>
+          <a:prstGeom prst="rect">
+            <a:avLst/>
+          </a:prstGeom>
         </p:spPr>
         <p:txBody>
-          <a:bodyPr>
+          <a:bodyPr vert="horz" lIns="91440" tIns="45720" rIns="91440" bIns="45720" rtlCol="0" anchor="ctr"/>
+          <a:lstStyle>
+            <a:lvl1pPr algn="l" defTabSz="914400" rtl="0" eaLnBrk="1" latinLnBrk="0" hangingPunct="1">
+              <a:lnSpc>
+                <a:spcPct val="90000"/>
+              </a:lnSpc>
+              <a:spcBef>
+                <a:spcPct val="0"/>
+              </a:spcBef>
+              <a:buNone/>
+              <a:defRPr kumimoji="1" sz="4400" kern="1200">
+                <a:solidFill>
+                  <a:schemeClr val="tx1"/>
+                </a:solidFill>
+                <a:latin typeface="+mj-lt"/>
+                <a:ea typeface="+mj-ea"/>
+                <a:cs typeface="+mj-cs"/>
+              </a:defRPr>
+            </a:lvl1pPr>
+          </a:lstStyle>
+          <a:p>
+            <a:pPr algn="ctr"/>
+            <a:endParaRPr lang="en-US" altLang="ja-JP" sz="4000">
+              <a:latin typeface="FOT-Popハッピネス Std EB" panose="02020900000000000000" charset="-128"/>
+              <a:ea typeface="FOT-Popハッピネス Std EB" panose="02020900000000000000" charset="-128"/>
+            </a:endParaRPr>
+          </a:p>
+        </p:txBody>
+      </p:sp>
+      <p:sp>
+        <p:nvSpPr>
+          <p:cNvPr id="6" name="テキストボックス 5"/>
+          <p:cNvSpPr txBox="1"/>
+          <p:nvPr/>
+        </p:nvSpPr>
+        <p:spPr>
+          <a:xfrm>
+            <a:off x="379730" y="2231390"/>
+            <a:ext cx="7148195" cy="4267200"/>
+          </a:xfrm>
+          <a:prstGeom prst="rect">
+            <a:avLst/>
+          </a:prstGeom>
+          <a:noFill/>
+        </p:spPr>
+        <p:txBody>
+          <a:bodyPr wrap="square" rtlCol="0">
             <a:noAutofit/>
           </a:bodyPr>
           <a:lstStyle/>
           <a:p>
-            <a:pPr algn="ctr"/>
-            <a:r>
-              <a:rPr lang="ja-JP" altLang="en-US" sz="4000" dirty="0">
+            <a:pPr algn="l"/>
+            <a:r>
+              <a:rPr lang="ja-JP" altLang="en-US" sz="2400" b="0" i="0" dirty="0">
                 <a:solidFill>
                   <a:schemeClr val="tx2">
                     <a:lumMod val="75000"/>
                   </a:schemeClr>
                 </a:solidFill>
-                <a:latin typeface="FOT-Popハッピネス Std EB" panose="02020900000000000000" charset="-128"/>
-                <a:ea typeface="FOT-Popハッピネス Std EB" panose="02020900000000000000" charset="-128"/>
-              </a:rPr>
-              <a:t>操作方法</a:t>
-            </a:r>
+                <a:effectLst/>
+                <a:latin typeface="なぎの" charset="-120"/>
+                <a:ea typeface="なぎの" charset="-120"/>
+              </a:rPr>
+              <a:t>アクションの説明</a:t>
+            </a:r>
+            <a:r>
+              <a:rPr lang="ja-JP" altLang="en-US" sz="2400" b="0" i="0" dirty="0">
+                <a:solidFill>
+                  <a:schemeClr val="tx2">
+                    <a:lumMod val="75000"/>
+                  </a:schemeClr>
+                </a:solidFill>
+                <a:effectLst/>
+                <a:latin typeface="なぎの" charset="-120"/>
+                <a:ea typeface="なぎの" charset="-120"/>
+              </a:rPr>
+              <a:t>などーーーーーーーーー</a:t>
+            </a:r>
+            <a:endParaRPr lang="ja-JP" altLang="en-US" sz="2400" b="0" i="0" dirty="0">
+              <a:solidFill>
+                <a:schemeClr val="tx2">
+                  <a:lumMod val="75000"/>
+                </a:schemeClr>
+              </a:solidFill>
+              <a:effectLst/>
+              <a:latin typeface="なぎの" charset="-120"/>
+              <a:ea typeface="なぎの" charset="-120"/>
+            </a:endParaRPr>
           </a:p>
         </p:txBody>
       </p:sp>
       <p:pic>
         <p:nvPicPr>
-          <p:cNvPr id="7" name="図形 6" descr="D:\desktop\keyboard.pngkeyboard"/>
+          <p:cNvPr id="9" name="図形 8" descr="mamaplant"/>
           <p:cNvPicPr>
             <a:picLocks noChangeAspect="1"/>
           </p:cNvPicPr>
           <p:nvPr/>
         </p:nvPicPr>
         <p:blipFill>
-          <a:blip r:embed="rId2"/>
-          <a:srcRect/>
+          <a:blip r:embed="rId1"/>
           <a:stretch>
             <a:fillRect/>
           </a:stretch>
         </p:blipFill>
         <p:spPr>
           <a:xfrm>
-            <a:off x="2575878" y="738823"/>
-            <a:ext cx="7040880" cy="2710180"/>
+            <a:off x="11109642" y="222114"/>
+            <a:ext cx="856615" cy="856615"/>
           </a:xfrm>
           <a:prstGeom prst="rect">
             <a:avLst/>
           </a:prstGeom>
-          <a:effectLst/>
         </p:spPr>
       </p:pic>
       <p:sp>
         <p:nvSpPr>
-          <p:cNvPr id="8" name="テキストボックス 7"/>
+          <p:cNvPr id="2" name="テキストボックス 1"/>
           <p:cNvSpPr txBox="1"/>
           <p:nvPr/>
         </p:nvSpPr>
         <p:spPr>
           <a:xfrm>
-            <a:off x="1849755" y="3647440"/>
-            <a:ext cx="8491855" cy="2677656"/>
+            <a:off x="379730" y="295275"/>
+            <a:ext cx="7148195" cy="1936206"/>
           </a:xfrm>
           <a:prstGeom prst="rect">
             <a:avLst/>
@@ -4292,427 +4328,59 @@
         </p:spPr>
         <p:txBody>
           <a:bodyPr wrap="square" rtlCol="0">
-            <a:spAutoFit/>
+            <a:noAutofit/>
           </a:bodyPr>
-          <a:lstStyle/>
-          <a:p>
-            <a:r>
-              <a:rPr lang="en-US" altLang="ja-JP" sz="2800" dirty="0">
-                <a:ln w="3175">
-                  <a:noFill/>
-                </a:ln>
-                <a:solidFill>
-                  <a:schemeClr val="accent2"/>
-                </a:solidFill>
-                <a:effectLst/>
-                <a:latin typeface="FOT-Popハッピネス Std EB" panose="02020900000000000000" charset="-128"/>
-                <a:ea typeface="FOT-Popハッピネス Std EB" panose="02020900000000000000" charset="-128"/>
-                <a:cs typeface="FOT-Popハッピネス Std EB" panose="02020900000000000000" charset="-128"/>
-              </a:rPr>
-              <a:t>E</a:t>
-            </a:r>
-            <a:r>
-              <a:rPr lang="en-US" altLang="ja-JP" sz="2800" dirty="0">
-                <a:ln w="3175">
-                  <a:noFill/>
-                </a:ln>
-                <a:solidFill>
-                  <a:schemeClr val="accent2"/>
-                </a:solidFill>
-                <a:latin typeface="FOT-Popハッピネス Std EB" panose="02020900000000000000" charset="-128"/>
-                <a:ea typeface="FOT-Popハッピネス Std EB" panose="02020900000000000000" charset="-128"/>
-                <a:cs typeface="FOT-Popハッピネス Std EB" panose="02020900000000000000" charset="-128"/>
-              </a:rPr>
-              <a:t>sc</a:t>
-            </a:r>
-            <a:r>
-              <a:rPr lang="en-US" altLang="ja-JP" sz="2800" dirty="0">
-                <a:latin typeface="FOT-Popハッピネス Std EB" panose="02020900000000000000" charset="-128"/>
-                <a:ea typeface="FOT-Popハッピネス Std EB" panose="02020900000000000000" charset="-128"/>
-                <a:cs typeface="FOT-Popハッピネス Std EB" panose="02020900000000000000" charset="-128"/>
-              </a:rPr>
-              <a:t> </a:t>
-            </a:r>
-            <a:r>
-              <a:rPr lang="ja-JP" altLang="en-US" sz="2800" dirty="0">
+          <a:p>
+            <a:pPr algn="l"/>
+            <a:r>
+              <a:rPr lang="ja-JP" altLang="en-US" sz="2400" i="0" dirty="0">
                 <a:solidFill>
                   <a:schemeClr val="tx2">
                     <a:lumMod val="75000"/>
                   </a:schemeClr>
                 </a:solidFill>
-                <a:latin typeface="FOT-Popハッピネス Std EB" panose="02020900000000000000" charset="-128"/>
-                <a:ea typeface="FOT-Popハッピネス Std EB" panose="02020900000000000000" charset="-128"/>
-                <a:cs typeface="FOT-Popハッピネス Std EB" panose="02020900000000000000" charset="-128"/>
-              </a:rPr>
-              <a:t>ポーズ</a:t>
-            </a:r>
-            <a:r>
-              <a:rPr lang="en-US" altLang="ja-JP" sz="2800" dirty="0">
-                <a:solidFill>
-                  <a:schemeClr val="tx2">
-                    <a:lumMod val="75000"/>
-                  </a:schemeClr>
-                </a:solidFill>
-                <a:latin typeface="FOT-Popハッピネス Std EB" panose="02020900000000000000" charset="-128"/>
-                <a:ea typeface="FOT-Popハッピネス Std EB" panose="02020900000000000000" charset="-128"/>
-                <a:cs typeface="FOT-Popハッピネス Std EB" panose="02020900000000000000" charset="-128"/>
-              </a:rPr>
-              <a:t>	</a:t>
-            </a:r>
-            <a:r>
-              <a:rPr lang="en-US" altLang="ja-JP" sz="2800" dirty="0">
-                <a:latin typeface="FOT-Popハッピネス Std EB" panose="02020900000000000000" charset="-128"/>
-                <a:ea typeface="FOT-Popハッピネス Std EB" panose="02020900000000000000" charset="-128"/>
-                <a:cs typeface="FOT-Popハッピネス Std EB" panose="02020900000000000000" charset="-128"/>
-              </a:rPr>
-              <a:t>	</a:t>
-            </a:r>
-            <a:r>
-              <a:rPr lang="en-US" altLang="ja-JP" sz="2800" dirty="0">
-                <a:solidFill>
-                  <a:srgbClr val="FF0000"/>
-                </a:solidFill>
-                <a:latin typeface="FOT-Popハッピネス Std EB" panose="02020900000000000000" charset="-128"/>
-                <a:ea typeface="FOT-Popハッピネス Std EB" panose="02020900000000000000" charset="-128"/>
-                <a:cs typeface="FOT-Popハッピネス Std EB" panose="02020900000000000000" charset="-128"/>
-              </a:rPr>
-              <a:t>W</a:t>
-            </a:r>
-            <a:r>
-              <a:rPr lang="en-US" altLang="ja-JP" sz="2800" dirty="0">
-                <a:latin typeface="FOT-Popハッピネス Std EB" panose="02020900000000000000" charset="-128"/>
-                <a:ea typeface="FOT-Popハッピネス Std EB" panose="02020900000000000000" charset="-128"/>
-                <a:cs typeface="FOT-Popハッピネス Std EB" panose="02020900000000000000" charset="-128"/>
-              </a:rPr>
-              <a:t> </a:t>
-            </a:r>
-            <a:r>
-              <a:rPr lang="ja-JP" altLang="en-US" sz="2800" dirty="0">
-                <a:solidFill>
-                  <a:schemeClr val="tx2">
-                    <a:lumMod val="75000"/>
-                  </a:schemeClr>
-                </a:solidFill>
-                <a:latin typeface="FOT-Popハッピネス Std EB" panose="02020900000000000000" charset="-128"/>
-                <a:ea typeface="FOT-Popハッピネス Std EB" panose="02020900000000000000" charset="-128"/>
-                <a:cs typeface="FOT-Popハッピネス Std EB" panose="02020900000000000000" charset="-128"/>
-              </a:rPr>
-              <a:t>ジャンプ</a:t>
-            </a:r>
-            <a:r>
-              <a:rPr lang="en-US" altLang="ja-JP" sz="2800" dirty="0">
-                <a:latin typeface="FOT-Popハッピネス Std EB" panose="02020900000000000000" charset="-128"/>
-                <a:ea typeface="FOT-Popハッピネス Std EB" panose="02020900000000000000" charset="-128"/>
-                <a:cs typeface="FOT-Popハッピネス Std EB" panose="02020900000000000000" charset="-128"/>
-              </a:rPr>
-              <a:t>	</a:t>
-            </a:r>
-            <a:r>
-              <a:rPr lang="en-US" altLang="ja-JP" sz="2800" dirty="0">
-                <a:solidFill>
-                  <a:srgbClr val="0070C0"/>
-                </a:solidFill>
-                <a:latin typeface="FOT-Popハッピネス Std EB" panose="02020900000000000000" charset="-128"/>
-                <a:ea typeface="FOT-Popハッピネス Std EB" panose="02020900000000000000" charset="-128"/>
-                <a:cs typeface="FOT-Popハッピネス Std EB" panose="02020900000000000000" charset="-128"/>
-                <a:sym typeface="+mn-ea"/>
-              </a:rPr>
-              <a:t>I</a:t>
-            </a:r>
-            <a:r>
-              <a:rPr lang="en-US" altLang="ja-JP" sz="2800" dirty="0">
-                <a:latin typeface="FOT-Popハッピネス Std EB" panose="02020900000000000000" charset="-128"/>
-                <a:ea typeface="FOT-Popハッピネス Std EB" panose="02020900000000000000" charset="-128"/>
-                <a:cs typeface="FOT-Popハッピネス Std EB" panose="02020900000000000000" charset="-128"/>
-                <a:sym typeface="+mn-ea"/>
-              </a:rPr>
-              <a:t> </a:t>
-            </a:r>
-            <a:r>
-              <a:rPr lang="ja-JP" altLang="en-US" sz="2800" dirty="0">
-                <a:solidFill>
-                  <a:schemeClr val="tx2">
-                    <a:lumMod val="75000"/>
-                  </a:schemeClr>
-                </a:solidFill>
-                <a:latin typeface="FOT-Popハッピネス Std EB" panose="02020900000000000000" charset="-128"/>
-                <a:ea typeface="FOT-Popハッピネス Std EB" panose="02020900000000000000" charset="-128"/>
-                <a:cs typeface="FOT-Popハッピネス Std EB" panose="02020900000000000000" charset="-128"/>
-                <a:sym typeface="+mn-ea"/>
-              </a:rPr>
-              <a:t>ズームイン</a:t>
-            </a:r>
-            <a:endParaRPr lang="ja-JP" altLang="en-US" sz="2800" dirty="0">
+                <a:effectLst/>
+                <a:latin typeface="なぎの" charset="-120"/>
+                <a:ea typeface="なぎの" charset="-120"/>
+              </a:rPr>
+              <a:t>ステージ選択制で全三話</a:t>
+            </a:r>
+            <a:endParaRPr lang="ja-JP" altLang="en-US" sz="2400" i="0" dirty="0">
               <a:solidFill>
                 <a:schemeClr val="tx2">
                   <a:lumMod val="75000"/>
                 </a:schemeClr>
               </a:solidFill>
-              <a:latin typeface="FOT-Popハッピネス Std EB" panose="02020900000000000000" charset="-128"/>
-              <a:ea typeface="FOT-Popハッピネス Std EB" panose="02020900000000000000" charset="-128"/>
-              <a:cs typeface="FOT-Popハッピネス Std EB" panose="02020900000000000000" charset="-128"/>
+              <a:effectLst/>
+              <a:latin typeface="なぎの" charset="-120"/>
+              <a:ea typeface="なぎの" charset="-120"/>
             </a:endParaRPr>
           </a:p>
           <a:p>
-            <a:r>
-              <a:rPr lang="en-US" altLang="ja-JP" sz="2800" dirty="0">
-                <a:solidFill>
-                  <a:srgbClr val="FF0000"/>
-                </a:solidFill>
-                <a:latin typeface="FOT-Popハッピネス Std EB" panose="02020900000000000000" charset="-128"/>
-                <a:ea typeface="FOT-Popハッピネス Std EB" panose="02020900000000000000" charset="-128"/>
-                <a:cs typeface="FOT-Popハッピネス Std EB" panose="02020900000000000000" charset="-128"/>
-              </a:rPr>
-              <a:t>			A</a:t>
-            </a:r>
-            <a:r>
-              <a:rPr lang="en-US" altLang="ja-JP" sz="2800" dirty="0">
-                <a:latin typeface="FOT-Popハッピネス Std EB" panose="02020900000000000000" charset="-128"/>
-                <a:ea typeface="FOT-Popハッピネス Std EB" panose="02020900000000000000" charset="-128"/>
-                <a:cs typeface="FOT-Popハッピネス Std EB" panose="02020900000000000000" charset="-128"/>
-              </a:rPr>
-              <a:t> </a:t>
-            </a:r>
-            <a:r>
-              <a:rPr lang="ja-JP" altLang="en-US" sz="2800" dirty="0">
+            <a:pPr algn="l"/>
+            <a:r>
+              <a:rPr lang="ja-JP" altLang="en-US" sz="2400" i="0" dirty="0">
                 <a:solidFill>
                   <a:schemeClr val="tx2">
                     <a:lumMod val="75000"/>
                   </a:schemeClr>
                 </a:solidFill>
-                <a:latin typeface="FOT-Popハッピネス Std EB" panose="02020900000000000000" charset="-128"/>
-                <a:ea typeface="FOT-Popハッピネス Std EB" panose="02020900000000000000" charset="-128"/>
-                <a:cs typeface="FOT-Popハッピネス Std EB" panose="02020900000000000000" charset="-128"/>
-              </a:rPr>
-              <a:t>左移動</a:t>
-            </a:r>
-            <a:r>
-              <a:rPr lang="en-US" altLang="ja-JP" sz="2800" dirty="0">
-                <a:latin typeface="FOT-Popハッピネス Std EB" panose="02020900000000000000" charset="-128"/>
-                <a:ea typeface="FOT-Popハッピネス Std EB" panose="02020900000000000000" charset="-128"/>
-                <a:cs typeface="FOT-Popハッピネス Std EB" panose="02020900000000000000" charset="-128"/>
-              </a:rPr>
-              <a:t>		</a:t>
-            </a:r>
-            <a:r>
-              <a:rPr lang="en-US" altLang="ja-JP" sz="2800" dirty="0">
-                <a:solidFill>
-                  <a:srgbClr val="0070C0"/>
-                </a:solidFill>
-                <a:latin typeface="FOT-Popハッピネス Std EB" panose="02020900000000000000" charset="-128"/>
-                <a:ea typeface="FOT-Popハッピネス Std EB" panose="02020900000000000000" charset="-128"/>
-                <a:cs typeface="FOT-Popハッピネス Std EB" panose="02020900000000000000" charset="-128"/>
-                <a:sym typeface="+mn-ea"/>
-              </a:rPr>
-              <a:t>O</a:t>
-            </a:r>
-            <a:r>
-              <a:rPr lang="en-US" altLang="ja-JP" sz="2800" dirty="0">
-                <a:latin typeface="FOT-Popハッピネス Std EB" panose="02020900000000000000" charset="-128"/>
-                <a:ea typeface="FOT-Popハッピネス Std EB" panose="02020900000000000000" charset="-128"/>
-                <a:cs typeface="FOT-Popハッピネス Std EB" panose="02020900000000000000" charset="-128"/>
-                <a:sym typeface="+mn-ea"/>
-              </a:rPr>
-              <a:t> </a:t>
-            </a:r>
-            <a:r>
-              <a:rPr lang="ja-JP" altLang="en-US" sz="2800" dirty="0">
-                <a:solidFill>
-                  <a:schemeClr val="tx2">
-                    <a:lumMod val="75000"/>
-                  </a:schemeClr>
-                </a:solidFill>
-                <a:latin typeface="FOT-Popハッピネス Std EB" panose="02020900000000000000" charset="-128"/>
-                <a:ea typeface="FOT-Popハッピネス Std EB" panose="02020900000000000000" charset="-128"/>
-                <a:cs typeface="FOT-Popハッピネス Std EB" panose="02020900000000000000" charset="-128"/>
-                <a:sym typeface="+mn-ea"/>
-              </a:rPr>
-              <a:t>ズームアウト</a:t>
-            </a:r>
-            <a:endParaRPr lang="en-US" altLang="ja-JP" sz="2800" dirty="0">
+                <a:effectLst/>
+                <a:latin typeface="なぎの" charset="-120"/>
+                <a:ea typeface="なぎの" charset="-120"/>
+              </a:rPr>
+              <a:t>徐々に難しくなっていく</a:t>
+            </a:r>
+            <a:endParaRPr lang="ja-JP" altLang="en-US" sz="2400" i="0" dirty="0">
               <a:solidFill>
                 <a:schemeClr val="tx2">
                   <a:lumMod val="75000"/>
                 </a:schemeClr>
               </a:solidFill>
-              <a:latin typeface="FOT-Popハッピネス Std EB" panose="02020900000000000000" charset="-128"/>
-              <a:ea typeface="FOT-Popハッピネス Std EB" panose="02020900000000000000" charset="-128"/>
-              <a:cs typeface="FOT-Popハッピネス Std EB" panose="02020900000000000000" charset="-128"/>
+              <a:effectLst/>
+              <a:latin typeface="なぎの" charset="-120"/>
+              <a:ea typeface="なぎの" charset="-120"/>
             </a:endParaRPr>
-          </a:p>
-          <a:p>
-            <a:r>
-              <a:rPr lang="en-US" altLang="ja-JP" sz="2800" dirty="0">
-                <a:solidFill>
-                  <a:srgbClr val="FF0000"/>
-                </a:solidFill>
-                <a:latin typeface="FOT-Popハッピネス Std EB" panose="02020900000000000000" charset="-128"/>
-                <a:ea typeface="FOT-Popハッピネス Std EB" panose="02020900000000000000" charset="-128"/>
-                <a:cs typeface="FOT-Popハッピネス Std EB" panose="02020900000000000000" charset="-128"/>
-              </a:rPr>
-              <a:t>			D</a:t>
-            </a:r>
-            <a:r>
-              <a:rPr lang="en-US" altLang="ja-JP" sz="2800" dirty="0">
-                <a:latin typeface="FOT-Popハッピネス Std EB" panose="02020900000000000000" charset="-128"/>
-                <a:ea typeface="FOT-Popハッピネス Std EB" panose="02020900000000000000" charset="-128"/>
-                <a:cs typeface="FOT-Popハッピネス Std EB" panose="02020900000000000000" charset="-128"/>
-              </a:rPr>
-              <a:t> </a:t>
-            </a:r>
-            <a:r>
-              <a:rPr lang="ja-JP" altLang="en-US" sz="2800" dirty="0">
-                <a:solidFill>
-                  <a:schemeClr val="tx2">
-                    <a:lumMod val="75000"/>
-                  </a:schemeClr>
-                </a:solidFill>
-                <a:latin typeface="FOT-Popハッピネス Std EB" panose="02020900000000000000" charset="-128"/>
-                <a:ea typeface="FOT-Popハッピネス Std EB" panose="02020900000000000000" charset="-128"/>
-                <a:cs typeface="FOT-Popハッピネス Std EB" panose="02020900000000000000" charset="-128"/>
-              </a:rPr>
-              <a:t>右移動</a:t>
-            </a:r>
-          </a:p>
-          <a:p>
-            <a:endParaRPr lang="ja-JP" altLang="en-US" sz="2800" dirty="0">
-              <a:latin typeface="FOT-Popハッピネス Std EB" panose="02020900000000000000" charset="-128"/>
-              <a:ea typeface="FOT-Popハッピネス Std EB" panose="02020900000000000000" charset="-128"/>
-              <a:cs typeface="FOT-Popハッピネス Std EB" panose="02020900000000000000" charset="-128"/>
-            </a:endParaRPr>
-          </a:p>
-          <a:p>
-            <a:r>
-              <a:rPr lang="en-US" altLang="ja-JP" sz="2800" dirty="0">
-                <a:solidFill>
-                  <a:srgbClr val="00B050"/>
-                </a:solidFill>
-                <a:latin typeface="FOT-Popハッピネス Std EB" panose="02020900000000000000" charset="-128"/>
-                <a:ea typeface="FOT-Popハッピネス Std EB" panose="02020900000000000000" charset="-128"/>
-                <a:cs typeface="FOT-Popハッピネス Std EB" panose="02020900000000000000" charset="-128"/>
-                <a:sym typeface="+mn-ea"/>
-              </a:rPr>
-              <a:t>J</a:t>
-            </a:r>
-            <a:r>
-              <a:rPr lang="en-US" altLang="ja-JP" sz="2800" dirty="0">
-                <a:latin typeface="FOT-Popハッピネス Std EB" panose="02020900000000000000" charset="-128"/>
-                <a:ea typeface="FOT-Popハッピネス Std EB" panose="02020900000000000000" charset="-128"/>
-                <a:cs typeface="FOT-Popハッピネス Std EB" panose="02020900000000000000" charset="-128"/>
-                <a:sym typeface="+mn-ea"/>
-              </a:rPr>
-              <a:t> </a:t>
-            </a:r>
-            <a:r>
-              <a:rPr lang="ja-JP" altLang="en-US" sz="2800" dirty="0">
-                <a:solidFill>
-                  <a:schemeClr val="tx2">
-                    <a:lumMod val="75000"/>
-                  </a:schemeClr>
-                </a:solidFill>
-                <a:latin typeface="FOT-Popハッピネス Std EB" panose="02020900000000000000" charset="-128"/>
-                <a:ea typeface="FOT-Popハッピネス Std EB" panose="02020900000000000000" charset="-128"/>
-                <a:cs typeface="FOT-Popハッピネス Std EB" panose="02020900000000000000" charset="-128"/>
-                <a:sym typeface="+mn-ea"/>
-              </a:rPr>
-              <a:t>アクション</a:t>
-            </a:r>
-            <a:r>
-              <a:rPr lang="en-US" altLang="ja-JP" sz="2800" dirty="0">
-                <a:solidFill>
-                  <a:schemeClr val="tx2">
-                    <a:lumMod val="75000"/>
-                  </a:schemeClr>
-                </a:solidFill>
-                <a:latin typeface="FOT-Popハッピネス Std EB" panose="02020900000000000000" charset="-128"/>
-                <a:ea typeface="FOT-Popハッピネス Std EB" panose="02020900000000000000" charset="-128"/>
-                <a:cs typeface="FOT-Popハッピネス Std EB" panose="02020900000000000000" charset="-128"/>
-                <a:sym typeface="+mn-ea"/>
-              </a:rPr>
-              <a:t>	</a:t>
-            </a:r>
-            <a:r>
-              <a:rPr lang="ja-JP" altLang="en-US" sz="2800" dirty="0">
-                <a:solidFill>
-                  <a:schemeClr val="tx2">
-                    <a:lumMod val="75000"/>
-                  </a:schemeClr>
-                </a:solidFill>
-                <a:latin typeface="FOT-Popハッピネス Std EB" panose="02020900000000000000" charset="-128"/>
-                <a:ea typeface="FOT-Popハッピネス Std EB" panose="02020900000000000000" charset="-128"/>
-                <a:cs typeface="FOT-Popハッピネス Std EB" panose="02020900000000000000" charset="-128"/>
-                <a:sym typeface="+mn-ea"/>
-              </a:rPr>
-              <a:t>レバーなどのギミックを起動する</a:t>
-            </a:r>
-          </a:p>
-          <a:p>
-            <a:r>
-              <a:rPr lang="en-US" altLang="ja-JP" sz="2800" dirty="0" err="1">
-                <a:solidFill>
-                  <a:srgbClr val="00B050"/>
-                </a:solidFill>
-                <a:latin typeface="FOT-Popハッピネス Std EB" panose="02020900000000000000" charset="-128"/>
-                <a:ea typeface="FOT-Popハッピネス Std EB" panose="02020900000000000000" charset="-128"/>
-                <a:cs typeface="FOT-Popハッピネス Std EB" panose="02020900000000000000" charset="-128"/>
-                <a:sym typeface="+mn-ea"/>
-              </a:rPr>
-              <a:t>Spc</a:t>
-            </a:r>
-            <a:r>
-              <a:rPr lang="en-US" altLang="ja-JP" sz="2800" dirty="0">
-                <a:solidFill>
-                  <a:schemeClr val="tx1"/>
-                </a:solidFill>
-                <a:latin typeface="FOT-Popハッピネス Std EB" panose="02020900000000000000" charset="-128"/>
-                <a:ea typeface="FOT-Popハッピネス Std EB" panose="02020900000000000000" charset="-128"/>
-                <a:cs typeface="FOT-Popハッピネス Std EB" panose="02020900000000000000" charset="-128"/>
-                <a:sym typeface="+mn-ea"/>
-              </a:rPr>
-              <a:t> </a:t>
-            </a:r>
-            <a:r>
-              <a:rPr lang="ja-JP" altLang="en-US" sz="2800" dirty="0">
-                <a:solidFill>
-                  <a:schemeClr val="tx2">
-                    <a:lumMod val="75000"/>
-                  </a:schemeClr>
-                </a:solidFill>
-                <a:latin typeface="FOT-Popハッピネス Std EB" panose="02020900000000000000" charset="-128"/>
-                <a:ea typeface="FOT-Popハッピネス Std EB" panose="02020900000000000000" charset="-128"/>
-                <a:cs typeface="FOT-Popハッピネス Std EB" panose="02020900000000000000" charset="-128"/>
-                <a:sym typeface="+mn-ea"/>
-              </a:rPr>
-              <a:t>戻る</a:t>
-            </a:r>
-            <a:r>
-              <a:rPr lang="en-US" altLang="ja-JP" sz="2800" dirty="0">
-                <a:solidFill>
-                  <a:schemeClr val="tx2">
-                    <a:lumMod val="75000"/>
-                  </a:schemeClr>
-                </a:solidFill>
-                <a:latin typeface="FOT-Popハッピネス Std EB" panose="02020900000000000000" charset="-128"/>
-                <a:ea typeface="FOT-Popハッピネス Std EB" panose="02020900000000000000" charset="-128"/>
-                <a:cs typeface="FOT-Popハッピネス Std EB" panose="02020900000000000000" charset="-128"/>
-                <a:sym typeface="+mn-ea"/>
-              </a:rPr>
-              <a:t>	</a:t>
-            </a:r>
-            <a:r>
-              <a:rPr lang="ja-JP" altLang="en-US" sz="2800" dirty="0">
-                <a:solidFill>
-                  <a:schemeClr val="tx2">
-                    <a:lumMod val="75000"/>
-                  </a:schemeClr>
-                </a:solidFill>
-                <a:latin typeface="FOT-Popハッピネス Std EB" panose="02020900000000000000" charset="-128"/>
-                <a:ea typeface="FOT-Popハッピネス Std EB" panose="02020900000000000000" charset="-128"/>
-                <a:cs typeface="FOT-Popハッピネス Std EB" panose="02020900000000000000" charset="-128"/>
-                <a:sym typeface="+mn-ea"/>
-              </a:rPr>
-              <a:t>チェックポイントに戻る</a:t>
-            </a:r>
           </a:p>
         </p:txBody>
       </p:sp>
@@ -4751,14 +4419,87 @@
       </p:grpSpPr>
       <p:sp>
         <p:nvSpPr>
-          <p:cNvPr id="6" name="テキストボックス 5"/>
+          <p:cNvPr id="2" name="タイトル 1"/>
+          <p:cNvSpPr>
+            <a:spLocks noGrp="1"/>
+          </p:cNvSpPr>
+          <p:nvPr>
+            <p:ph type="title"/>
+          </p:nvPr>
+        </p:nvSpPr>
+        <p:spPr>
+          <a:xfrm>
+            <a:off x="838200" y="136525"/>
+            <a:ext cx="10515600" cy="591820"/>
+          </a:xfrm>
+        </p:spPr>
+        <p:txBody>
+          <a:bodyPr>
+            <a:noAutofit/>
+          </a:bodyPr>
+          <a:lstStyle/>
+          <a:p>
+            <a:pPr algn="ctr"/>
+            <a:r>
+              <a:rPr lang="ja-JP" altLang="en-US" sz="4000" dirty="0">
+                <a:solidFill>
+                  <a:schemeClr val="tx2">
+                    <a:lumMod val="75000"/>
+                  </a:schemeClr>
+                </a:solidFill>
+                <a:latin typeface="なぎの" charset="-120"/>
+                <a:ea typeface="なぎの" charset="-120"/>
+              </a:rPr>
+              <a:t>操作方法</a:t>
+            </a:r>
+            <a:endParaRPr lang="ja-JP" altLang="en-US" sz="4000" dirty="0">
+              <a:solidFill>
+                <a:schemeClr val="tx2">
+                  <a:lumMod val="75000"/>
+                </a:schemeClr>
+              </a:solidFill>
+              <a:latin typeface="なぎの" charset="-120"/>
+              <a:ea typeface="なぎの" charset="-120"/>
+            </a:endParaRPr>
+          </a:p>
+        </p:txBody>
+      </p:sp>
+      <p:pic>
+        <p:nvPicPr>
+          <p:cNvPr id="7" name="図形 6" descr="D:\desktop\keyboard.pngkeyboard"/>
+          <p:cNvPicPr>
+            <a:picLocks noChangeAspect="1"/>
+          </p:cNvPicPr>
+          <p:nvPr/>
+        </p:nvPicPr>
+        <p:blipFill>
+          <a:blip r:embed="rId1"/>
+          <a:srcRect/>
+          <a:stretch>
+            <a:fillRect/>
+          </a:stretch>
+        </p:blipFill>
+        <p:spPr>
+          <a:xfrm>
+            <a:off x="2575878" y="738823"/>
+            <a:ext cx="7040880" cy="2710180"/>
+          </a:xfrm>
+          <a:prstGeom prst="rect">
+            <a:avLst/>
+          </a:prstGeom>
+          <a:effectLst/>
+        </p:spPr>
+      </p:pic>
+      <p:sp>
+        <p:nvSpPr>
+          <p:cNvPr id="8" name="テキストボックス 7"/>
           <p:cNvSpPr txBox="1"/>
           <p:nvPr/>
         </p:nvSpPr>
         <p:spPr>
           <a:xfrm>
-            <a:off x="898842" y="1322705"/>
-            <a:ext cx="10394315" cy="3785652"/>
+            <a:off x="1849755" y="3647440"/>
+            <a:ext cx="8491855" cy="2922905"/>
           </a:xfrm>
           <a:prstGeom prst="rect">
             <a:avLst/>
@@ -4771,49 +4512,55 @@
           </a:bodyPr>
           <a:lstStyle/>
           <a:p>
-            <a:pPr algn="ctr"/>
-            <a:r>
-              <a:rPr lang="ja-JP" altLang="en-US" sz="4400" dirty="0">
+            <a:r>
+              <a:rPr lang="en-US" altLang="ja-JP" sz="2800" dirty="0">
+                <a:ln w="3175">
+                  <a:noFill/>
+                </a:ln>
+                <a:solidFill>
+                  <a:schemeClr val="accent2"/>
+                </a:solidFill>
+                <a:effectLst/>
+                <a:latin typeface="なぎの" charset="-120"/>
+                <a:ea typeface="なぎの" charset="-120"/>
+                <a:cs typeface="なぎの" charset="-120"/>
+              </a:rPr>
+              <a:t>E</a:t>
+            </a:r>
+            <a:r>
+              <a:rPr lang="en-US" altLang="ja-JP" sz="2800" dirty="0">
+                <a:ln w="3175">
+                  <a:noFill/>
+                </a:ln>
+                <a:solidFill>
+                  <a:schemeClr val="accent2"/>
+                </a:solidFill>
+                <a:latin typeface="なぎの" charset="-120"/>
+                <a:ea typeface="なぎの" charset="-120"/>
+                <a:cs typeface="なぎの" charset="-120"/>
+              </a:rPr>
+              <a:t>sc</a:t>
+            </a:r>
+            <a:r>
+              <a:rPr lang="en-US" altLang="ja-JP" sz="2800" dirty="0">
+                <a:latin typeface="なぎの" charset="-120"/>
+                <a:ea typeface="なぎの" charset="-120"/>
+                <a:cs typeface="なぎの" charset="-120"/>
+              </a:rPr>
+              <a:t> </a:t>
+            </a:r>
+            <a:r>
+              <a:rPr lang="ja-JP" altLang="en-US" sz="2800" dirty="0">
                 <a:solidFill>
                   <a:schemeClr val="tx2">
                     <a:lumMod val="75000"/>
                   </a:schemeClr>
                 </a:solidFill>
-                <a:latin typeface="FOT-Popハッピネス Std EB" panose="02020900000000000000" charset="-128"/>
-                <a:ea typeface="FOT-Popハッピネス Std EB" panose="02020900000000000000" charset="-128"/>
-                <a:cs typeface="FOT-Popハッピネス Std EB" panose="02020900000000000000" charset="-128"/>
-              </a:rPr>
-              <a:t>特別感謝</a:t>
-            </a:r>
-          </a:p>
-          <a:p>
-            <a:r>
-              <a:rPr lang="ja-JP" altLang="en-US" sz="2800" dirty="0">
-                <a:solidFill>
-                  <a:schemeClr val="tx1">
-                    <a:lumMod val="65000"/>
-                    <a:lumOff val="35000"/>
-                  </a:schemeClr>
-                </a:solidFill>
-                <a:latin typeface="FOT-Popハッピネス Std EB" panose="02020900000000000000" charset="-128"/>
-                <a:ea typeface="FOT-Popハッピネス Std EB" panose="02020900000000000000" charset="-128"/>
-                <a:cs typeface="FOT-Popハッピネス Std EB" panose="02020900000000000000" charset="-128"/>
-              </a:rPr>
-              <a:t>ゲームエンジン</a:t>
-            </a:r>
-            <a:r>
-              <a:rPr lang="en-US" altLang="ja-JP" sz="2800" dirty="0">
-                <a:solidFill>
-                  <a:schemeClr val="tx1">
-                    <a:lumMod val="65000"/>
-                    <a:lumOff val="35000"/>
-                  </a:schemeClr>
-                </a:solidFill>
-                <a:latin typeface="FOT-Popハッピネス Std EB" panose="02020900000000000000" charset="-128"/>
-                <a:ea typeface="FOT-Popハッピネス Std EB" panose="02020900000000000000" charset="-128"/>
-                <a:cs typeface="FOT-Popハッピネス Std EB" panose="02020900000000000000" charset="-128"/>
-              </a:rPr>
-              <a:t>	</a:t>
+                <a:latin typeface="なぎの" charset="-120"/>
+                <a:ea typeface="なぎの" charset="-120"/>
+                <a:cs typeface="なぎの" charset="-120"/>
+              </a:rPr>
+              <a:t>ポーズ</a:t>
             </a:r>
             <a:r>
               <a:rPr lang="en-US" altLang="ja-JP" sz="2800" dirty="0">
@@ -4822,92 +4569,181 @@
                     <a:lumMod val="75000"/>
                   </a:schemeClr>
                 </a:solidFill>
-                <a:latin typeface="FOT-Popハッピネス Std EB" panose="02020900000000000000" charset="-128"/>
-                <a:ea typeface="FOT-Popハッピネス Std EB" panose="02020900000000000000" charset="-128"/>
-                <a:cs typeface="FOT-Popハッピネス Std EB" panose="02020900000000000000" charset="-128"/>
-              </a:rPr>
-              <a:t>Unity</a:t>
-            </a:r>
-          </a:p>
-          <a:p>
-            <a:endParaRPr lang="ja-JP" altLang="en-US" sz="2800" dirty="0">
-              <a:solidFill>
-                <a:srgbClr val="C00000"/>
-              </a:solidFill>
-              <a:latin typeface="FOT-Popハッピネス Std EB" panose="02020900000000000000" charset="-128"/>
-              <a:ea typeface="FOT-Popハッピネス Std EB" panose="02020900000000000000" charset="-128"/>
-              <a:cs typeface="FOT-Popハッピネス Std EB" panose="02020900000000000000" charset="-128"/>
-            </a:endParaRPr>
-          </a:p>
-          <a:p>
+                <a:latin typeface="なぎの" charset="-120"/>
+                <a:ea typeface="なぎの" charset="-120"/>
+                <a:cs typeface="なぎの" charset="-120"/>
+              </a:rPr>
+              <a:t>	</a:t>
+            </a:r>
+            <a:r>
+              <a:rPr lang="en-US" altLang="ja-JP" sz="2800" dirty="0">
+                <a:latin typeface="なぎの" charset="-120"/>
+                <a:ea typeface="なぎの" charset="-120"/>
+                <a:cs typeface="なぎの" charset="-120"/>
+              </a:rPr>
+              <a:t>	</a:t>
+            </a:r>
+            <a:r>
+              <a:rPr lang="en-US" altLang="ja-JP" sz="2800" dirty="0">
+                <a:solidFill>
+                  <a:srgbClr val="FF0000"/>
+                </a:solidFill>
+                <a:latin typeface="なぎの" charset="-120"/>
+                <a:ea typeface="なぎの" charset="-120"/>
+                <a:cs typeface="なぎの" charset="-120"/>
+              </a:rPr>
+              <a:t>W</a:t>
+            </a:r>
+            <a:r>
+              <a:rPr lang="en-US" altLang="ja-JP" sz="2800" dirty="0">
+                <a:latin typeface="なぎの" charset="-120"/>
+                <a:ea typeface="なぎの" charset="-120"/>
+                <a:cs typeface="なぎの" charset="-120"/>
+              </a:rPr>
+              <a:t> </a:t>
+            </a:r>
             <a:r>
               <a:rPr lang="ja-JP" altLang="en-US" sz="2800" dirty="0">
-                <a:solidFill>
-                  <a:srgbClr val="C00000"/>
-                </a:solidFill>
-                <a:latin typeface="FOT-Popハッピネス Std EB" panose="02020900000000000000" charset="-128"/>
-                <a:ea typeface="FOT-Popハッピネス Std EB" panose="02020900000000000000" charset="-128"/>
-                <a:cs typeface="FOT-Popハッピネス Std EB" panose="02020900000000000000" charset="-128"/>
-              </a:rPr>
-              <a:t>使用ツール</a:t>
-            </a:r>
-            <a:r>
-              <a:rPr lang="en-US" altLang="ja-JP" sz="2800" dirty="0">
-                <a:solidFill>
-                  <a:srgbClr val="C00000"/>
-                </a:solidFill>
-                <a:latin typeface="FOT-Popハッピネス Std EB" panose="02020900000000000000" charset="-128"/>
-                <a:ea typeface="FOT-Popハッピネス Std EB" panose="02020900000000000000" charset="-128"/>
-                <a:cs typeface="FOT-Popハッピネス Std EB" panose="02020900000000000000" charset="-128"/>
-              </a:rPr>
-              <a:t>	</a:t>
-            </a:r>
-            <a:r>
-              <a:rPr lang="en-US" altLang="ja-JP" sz="2800" dirty="0">
-                <a:latin typeface="FOT-Popハッピネス Std EB" panose="02020900000000000000" charset="-128"/>
-                <a:ea typeface="FOT-Popハッピネス Std EB" panose="02020900000000000000" charset="-128"/>
-                <a:cs typeface="FOT-Popハッピネス Std EB" panose="02020900000000000000" charset="-128"/>
-              </a:rPr>
-              <a:t>	</a:t>
-            </a:r>
-            <a:r>
-              <a:rPr lang="en-US" altLang="ja-JP" sz="2800" dirty="0" err="1">
                 <a:solidFill>
                   <a:schemeClr val="tx2">
                     <a:lumMod val="75000"/>
                   </a:schemeClr>
                 </a:solidFill>
-                <a:latin typeface="FOT-Popハッピネス Std EB" panose="02020900000000000000" charset="-128"/>
-                <a:ea typeface="FOT-Popハッピネス Std EB" panose="02020900000000000000" charset="-128"/>
-                <a:cs typeface="FOT-Popハッピネス Std EB" panose="02020900000000000000" charset="-128"/>
-              </a:rPr>
-              <a:t>Neovim</a:t>
+                <a:latin typeface="なぎの" charset="-120"/>
+                <a:ea typeface="なぎの" charset="-120"/>
+                <a:cs typeface="なぎの" charset="-120"/>
+              </a:rPr>
+              <a:t>ジャンプ</a:t>
             </a:r>
             <a:r>
               <a:rPr lang="en-US" altLang="ja-JP" sz="2800" dirty="0">
+                <a:latin typeface="なぎの" charset="-120"/>
+                <a:ea typeface="なぎの" charset="-120"/>
+                <a:cs typeface="なぎの" charset="-120"/>
+              </a:rPr>
+              <a:t>		</a:t>
+            </a:r>
+            <a:r>
+              <a:rPr lang="en-US" altLang="ja-JP" sz="2800" dirty="0">
+                <a:solidFill>
+                  <a:srgbClr val="0070C0"/>
+                </a:solidFill>
+                <a:latin typeface="なぎの" charset="-120"/>
+                <a:ea typeface="なぎの" charset="-120"/>
+                <a:cs typeface="なぎの" charset="-120"/>
+                <a:sym typeface="+mn-ea"/>
+              </a:rPr>
+              <a:t>I</a:t>
+            </a:r>
+            <a:r>
+              <a:rPr lang="en-US" altLang="ja-JP" sz="2800" dirty="0">
+                <a:latin typeface="なぎの" charset="-120"/>
+                <a:ea typeface="なぎの" charset="-120"/>
+                <a:cs typeface="なぎの" charset="-120"/>
+                <a:sym typeface="+mn-ea"/>
+              </a:rPr>
+              <a:t> </a:t>
+            </a:r>
+            <a:r>
+              <a:rPr lang="ja-JP" altLang="en-US" sz="2800" dirty="0">
                 <a:solidFill>
                   <a:schemeClr val="tx2">
                     <a:lumMod val="75000"/>
                   </a:schemeClr>
                 </a:solidFill>
-                <a:latin typeface="FOT-Popハッピネス Std EB" panose="02020900000000000000" charset="-128"/>
-                <a:ea typeface="FOT-Popハッピネス Std EB" panose="02020900000000000000" charset="-128"/>
-                <a:cs typeface="FOT-Popハッピネス Std EB" panose="02020900000000000000" charset="-128"/>
-              </a:rPr>
-              <a:t> with </a:t>
-            </a:r>
-            <a:r>
-              <a:rPr lang="en-US" altLang="ja-JP" sz="2800" dirty="0" err="1">
+                <a:latin typeface="なぎの" charset="-120"/>
+                <a:ea typeface="なぎの" charset="-120"/>
+                <a:cs typeface="なぎの" charset="-120"/>
+                <a:sym typeface="+mn-ea"/>
+              </a:rPr>
+              <a:t>ズームイン</a:t>
+            </a:r>
+            <a:endParaRPr lang="ja-JP" altLang="en-US" sz="2800" dirty="0">
+              <a:solidFill>
+                <a:schemeClr val="tx2">
+                  <a:lumMod val="75000"/>
+                </a:schemeClr>
+              </a:solidFill>
+              <a:latin typeface="なぎの" charset="-120"/>
+              <a:ea typeface="なぎの" charset="-120"/>
+              <a:cs typeface="なぎの" charset="-120"/>
+            </a:endParaRPr>
+          </a:p>
+          <a:p>
+            <a:r>
+              <a:rPr lang="en-US" altLang="ja-JP" sz="2800" dirty="0">
+                <a:solidFill>
+                  <a:srgbClr val="FF0000"/>
+                </a:solidFill>
+                <a:latin typeface="なぎの" charset="-120"/>
+                <a:ea typeface="なぎの" charset="-120"/>
+                <a:cs typeface="なぎの" charset="-120"/>
+              </a:rPr>
+              <a:t>			A</a:t>
+            </a:r>
+            <a:r>
+              <a:rPr lang="en-US" altLang="ja-JP" sz="2800" dirty="0">
+                <a:latin typeface="なぎの" charset="-120"/>
+                <a:ea typeface="なぎの" charset="-120"/>
+                <a:cs typeface="なぎの" charset="-120"/>
+              </a:rPr>
+              <a:t> </a:t>
+            </a:r>
+            <a:r>
+              <a:rPr lang="ja-JP" altLang="en-US" sz="2800" dirty="0">
                 <a:solidFill>
                   <a:schemeClr val="tx2">
                     <a:lumMod val="75000"/>
                   </a:schemeClr>
                 </a:solidFill>
-                <a:latin typeface="FOT-Popハッピネス Std EB" panose="02020900000000000000" charset="-128"/>
-                <a:ea typeface="FOT-Popハッピネス Std EB" panose="02020900000000000000" charset="-128"/>
-                <a:cs typeface="FOT-Popハッピネス Std EB" panose="02020900000000000000" charset="-128"/>
-              </a:rPr>
-              <a:t>VSCode</a:t>
+                <a:latin typeface="なぎの" charset="-120"/>
+                <a:ea typeface="なぎの" charset="-120"/>
+                <a:cs typeface="なぎの" charset="-120"/>
+              </a:rPr>
+              <a:t>左移動</a:t>
+            </a:r>
+            <a:r>
+              <a:rPr lang="en-US" altLang="ja-JP" sz="2800" dirty="0">
+                <a:latin typeface="なぎの" charset="-120"/>
+                <a:ea typeface="なぎの" charset="-120"/>
+                <a:cs typeface="なぎの" charset="-120"/>
+              </a:rPr>
+              <a:t>		</a:t>
+            </a:r>
+            <a:r>
+              <a:rPr lang="en-US" altLang="ja-JP" sz="2800" dirty="0">
+                <a:solidFill>
+                  <a:srgbClr val="0070C0"/>
+                </a:solidFill>
+                <a:latin typeface="なぎの" charset="-120"/>
+                <a:ea typeface="なぎの" charset="-120"/>
+                <a:cs typeface="なぎの" charset="-120"/>
+                <a:sym typeface="+mn-ea"/>
+              </a:rPr>
+              <a:t>O</a:t>
+            </a:r>
+            <a:r>
+              <a:rPr lang="en-US" altLang="ja-JP" sz="2800" dirty="0">
+                <a:latin typeface="なぎの" charset="-120"/>
+                <a:ea typeface="なぎの" charset="-120"/>
+                <a:cs typeface="なぎの" charset="-120"/>
+                <a:sym typeface="+mn-ea"/>
+              </a:rPr>
+              <a:t> </a:t>
+            </a:r>
+            <a:r>
+              <a:rPr lang="ja-JP" altLang="en-US" sz="2800" dirty="0">
+                <a:solidFill>
+                  <a:schemeClr val="tx2">
+                    <a:lumMod val="75000"/>
+                  </a:schemeClr>
+                </a:solidFill>
+                <a:latin typeface="なぎの" charset="-120"/>
+                <a:ea typeface="なぎの" charset="-120"/>
+                <a:cs typeface="なぎの" charset="-120"/>
+                <a:sym typeface="+mn-ea"/>
+              </a:rPr>
+              <a:t>ズームアウト</a:t>
             </a:r>
             <a:endParaRPr lang="en-US" altLang="ja-JP" sz="2800" dirty="0">
               <a:solidFill>
@@ -4915,42 +4751,98 @@
                   <a:lumMod val="75000"/>
                 </a:schemeClr>
               </a:solidFill>
-              <a:latin typeface="FOT-Popハッピネス Std EB" panose="02020900000000000000" charset="-128"/>
-              <a:ea typeface="FOT-Popハッピネス Std EB" panose="02020900000000000000" charset="-128"/>
-              <a:cs typeface="FOT-Popハッピネス Std EB" panose="02020900000000000000" charset="-128"/>
+              <a:latin typeface="なぎの" charset="-120"/>
+              <a:ea typeface="なぎの" charset="-120"/>
+              <a:cs typeface="なぎの" charset="-120"/>
             </a:endParaRPr>
           </a:p>
           <a:p>
             <a:r>
               <a:rPr lang="en-US" altLang="ja-JP" sz="2800" dirty="0">
+                <a:solidFill>
+                  <a:srgbClr val="FF0000"/>
+                </a:solidFill>
+                <a:latin typeface="なぎの" charset="-120"/>
+                <a:ea typeface="なぎの" charset="-120"/>
+                <a:cs typeface="なぎの" charset="-120"/>
+              </a:rPr>
+              <a:t>			D</a:t>
+            </a:r>
+            <a:r>
+              <a:rPr lang="en-US" altLang="ja-JP" sz="2800" dirty="0">
+                <a:latin typeface="なぎの" charset="-120"/>
+                <a:ea typeface="なぎの" charset="-120"/>
+                <a:cs typeface="なぎの" charset="-120"/>
+              </a:rPr>
+              <a:t> </a:t>
+            </a:r>
+            <a:r>
+              <a:rPr lang="ja-JP" altLang="en-US" sz="2800" dirty="0">
                 <a:solidFill>
                   <a:schemeClr val="tx2">
                     <a:lumMod val="75000"/>
                   </a:schemeClr>
                 </a:solidFill>
-                <a:latin typeface="FOT-Popハッピネス Std EB" panose="02020900000000000000" charset="-128"/>
-                <a:ea typeface="FOT-Popハッピネス Std EB" panose="02020900000000000000" charset="-128"/>
-                <a:cs typeface="FOT-Popハッピネス Std EB" panose="02020900000000000000" charset="-128"/>
-              </a:rPr>
-              <a:t>			GIMP</a:t>
-            </a:r>
+                <a:latin typeface="なぎの" charset="-120"/>
+                <a:ea typeface="なぎの" charset="-120"/>
+                <a:cs typeface="なぎの" charset="-120"/>
+              </a:rPr>
+              <a:t>右移動</a:t>
+            </a:r>
+            <a:endParaRPr lang="ja-JP" altLang="en-US" sz="2800" dirty="0">
+              <a:solidFill>
+                <a:schemeClr val="tx2">
+                  <a:lumMod val="75000"/>
+                </a:schemeClr>
+              </a:solidFill>
+              <a:latin typeface="なぎの" charset="-120"/>
+              <a:ea typeface="なぎの" charset="-120"/>
+              <a:cs typeface="なぎの" charset="-120"/>
+            </a:endParaRPr>
+          </a:p>
+          <a:p>
+            <a:endParaRPr lang="ja-JP" altLang="en-US" sz="2800" dirty="0">
+              <a:latin typeface="なぎの" charset="-120"/>
+              <a:ea typeface="なぎの" charset="-120"/>
+              <a:cs typeface="なぎの" charset="-120"/>
+            </a:endParaRPr>
           </a:p>
           <a:p>
             <a:r>
               <a:rPr lang="en-US" altLang="ja-JP" sz="2800" dirty="0">
+                <a:solidFill>
+                  <a:srgbClr val="00B050"/>
+                </a:solidFill>
+                <a:latin typeface="なぎの" charset="-120"/>
+                <a:ea typeface="なぎの" charset="-120"/>
+                <a:cs typeface="なぎの" charset="-120"/>
+                <a:sym typeface="+mn-ea"/>
+              </a:rPr>
+              <a:t>J</a:t>
+            </a:r>
+            <a:r>
+              <a:rPr lang="en-US" altLang="ja-JP" sz="2800" dirty="0">
+                <a:latin typeface="なぎの" charset="-120"/>
+                <a:ea typeface="なぎの" charset="-120"/>
+                <a:cs typeface="なぎの" charset="-120"/>
+                <a:sym typeface="+mn-ea"/>
+              </a:rPr>
+              <a:t> </a:t>
+            </a:r>
+            <a:r>
+              <a:rPr lang="ja-JP" altLang="en-US" sz="2800" dirty="0">
                 <a:solidFill>
                   <a:schemeClr val="tx2">
                     <a:lumMod val="75000"/>
                   </a:schemeClr>
                 </a:solidFill>
-                <a:latin typeface="FOT-Popハッピネス Std EB" panose="02020900000000000000" charset="-128"/>
-                <a:ea typeface="FOT-Popハッピネス Std EB" panose="02020900000000000000" charset="-128"/>
-                <a:cs typeface="FOT-Popハッピネス Std EB" panose="02020900000000000000" charset="-128"/>
-              </a:rPr>
-              <a:t>			Git</a:t>
-            </a:r>
-          </a:p>
-          <a:p>
+                <a:latin typeface="なぎの" charset="-120"/>
+                <a:ea typeface="なぎの" charset="-120"/>
+                <a:cs typeface="なぎの" charset="-120"/>
+                <a:sym typeface="+mn-ea"/>
+              </a:rPr>
+              <a:t>アクション</a:t>
+            </a:r>
             <a:r>
               <a:rPr lang="en-US" altLang="ja-JP" sz="2800" dirty="0">
                 <a:solidFill>
@@ -4958,40 +4850,237 @@
                     <a:lumMod val="75000"/>
                   </a:schemeClr>
                 </a:solidFill>
-                <a:latin typeface="FOT-Popハッピネス Std EB" panose="02020900000000000000" charset="-128"/>
-                <a:ea typeface="FOT-Popハッピネス Std EB" panose="02020900000000000000" charset="-128"/>
-                <a:cs typeface="FOT-Popハッピネス Std EB" panose="02020900000000000000" charset="-128"/>
-              </a:rPr>
-              <a:t>			Google Bard</a:t>
-            </a:r>
-          </a:p>
-          <a:p>
-            <a:r>
-              <a:rPr lang="en-US" altLang="ja-JP" sz="2800" dirty="0">
+                <a:latin typeface="なぎの" charset="-120"/>
+                <a:ea typeface="なぎの" charset="-120"/>
+                <a:cs typeface="なぎの" charset="-120"/>
+                <a:sym typeface="+mn-ea"/>
+              </a:rPr>
+              <a:t>	</a:t>
+            </a:r>
+            <a:r>
+              <a:rPr lang="ja-JP" altLang="en-US" sz="2800" dirty="0">
                 <a:solidFill>
                   <a:schemeClr val="tx2">
                     <a:lumMod val="75000"/>
                   </a:schemeClr>
                 </a:solidFill>
-                <a:latin typeface="FOT-Popハッピネス Std EB" panose="02020900000000000000" charset="-128"/>
-                <a:ea typeface="FOT-Popハッピネス Std EB" panose="02020900000000000000" charset="-128"/>
-                <a:cs typeface="FOT-Popハッピネス Std EB" panose="02020900000000000000" charset="-128"/>
-              </a:rPr>
-              <a:t>			Notion</a:t>
-            </a:r>
-          </a:p>
-        </p:txBody>
-      </p:sp>
-      <p:sp>
-        <p:nvSpPr>
-          <p:cNvPr id="2" name="テキストボックス 5"/>
+                <a:latin typeface="なぎの" charset="-120"/>
+                <a:ea typeface="なぎの" charset="-120"/>
+                <a:cs typeface="なぎの" charset="-120"/>
+                <a:sym typeface="+mn-ea"/>
+              </a:rPr>
+              <a:t>決定や</a:t>
+            </a:r>
+            <a:r>
+              <a:rPr lang="ja-JP" altLang="en-US" sz="2800" dirty="0">
+                <a:solidFill>
+                  <a:schemeClr val="tx2">
+                    <a:lumMod val="75000"/>
+                  </a:schemeClr>
+                </a:solidFill>
+                <a:latin typeface="なぎの" charset="-120"/>
+                <a:ea typeface="なぎの" charset="-120"/>
+                <a:cs typeface="なぎの" charset="-120"/>
+                <a:sym typeface="+mn-ea"/>
+              </a:rPr>
+              <a:t>、ギミックを起動する</a:t>
+            </a:r>
+            <a:endParaRPr lang="ja-JP" altLang="en-US" sz="2800" dirty="0">
+              <a:solidFill>
+                <a:schemeClr val="tx2">
+                  <a:lumMod val="75000"/>
+                </a:schemeClr>
+              </a:solidFill>
+              <a:latin typeface="なぎの" charset="-120"/>
+              <a:ea typeface="なぎの" charset="-120"/>
+              <a:cs typeface="なぎの" charset="-120"/>
+              <a:sym typeface="+mn-ea"/>
+            </a:endParaRPr>
+          </a:p>
+          <a:p>
+            <a:r>
+              <a:rPr lang="en-US" altLang="ja-JP" sz="2800" dirty="0" err="1">
+                <a:solidFill>
+                  <a:srgbClr val="00B050"/>
+                </a:solidFill>
+                <a:latin typeface="なぎの" charset="-120"/>
+                <a:ea typeface="なぎの" charset="-120"/>
+                <a:cs typeface="なぎの" charset="-120"/>
+                <a:sym typeface="+mn-ea"/>
+              </a:rPr>
+              <a:t>Spc</a:t>
+            </a:r>
+            <a:r>
+              <a:rPr lang="en-US" altLang="ja-JP" sz="2800" dirty="0">
+                <a:solidFill>
+                  <a:schemeClr val="tx1"/>
+                </a:solidFill>
+                <a:latin typeface="なぎの" charset="-120"/>
+                <a:ea typeface="なぎの" charset="-120"/>
+                <a:cs typeface="なぎの" charset="-120"/>
+                <a:sym typeface="+mn-ea"/>
+              </a:rPr>
+              <a:t> </a:t>
+            </a:r>
+            <a:r>
+              <a:rPr lang="ja-JP" altLang="en-US" sz="2800" dirty="0">
+                <a:solidFill>
+                  <a:schemeClr val="tx2">
+                    <a:lumMod val="75000"/>
+                  </a:schemeClr>
+                </a:solidFill>
+                <a:latin typeface="なぎの" charset="-120"/>
+                <a:ea typeface="なぎの" charset="-120"/>
+                <a:cs typeface="なぎの" charset="-120"/>
+                <a:sym typeface="+mn-ea"/>
+              </a:rPr>
+              <a:t>戻る</a:t>
+            </a:r>
+            <a:r>
+              <a:rPr lang="en-US" altLang="ja-JP" sz="2800" dirty="0">
+                <a:solidFill>
+                  <a:schemeClr val="tx2">
+                    <a:lumMod val="75000"/>
+                  </a:schemeClr>
+                </a:solidFill>
+                <a:latin typeface="なぎの" charset="-120"/>
+                <a:ea typeface="なぎの" charset="-120"/>
+                <a:cs typeface="なぎの" charset="-120"/>
+                <a:sym typeface="+mn-ea"/>
+              </a:rPr>
+              <a:t>		</a:t>
+            </a:r>
+            <a:r>
+              <a:rPr lang="ja-JP" altLang="en-US" sz="2800" dirty="0">
+                <a:solidFill>
+                  <a:schemeClr val="tx2">
+                    <a:lumMod val="75000"/>
+                  </a:schemeClr>
+                </a:solidFill>
+                <a:latin typeface="なぎの" charset="-120"/>
+                <a:ea typeface="なぎの" charset="-120"/>
+                <a:cs typeface="なぎの" charset="-120"/>
+                <a:sym typeface="+mn-ea"/>
+              </a:rPr>
+              <a:t>チェックポイントに戻る</a:t>
+            </a:r>
+            <a:endParaRPr lang="ja-JP" altLang="en-US" sz="2800" dirty="0">
+              <a:solidFill>
+                <a:schemeClr val="tx2">
+                  <a:lumMod val="75000"/>
+                </a:schemeClr>
+              </a:solidFill>
+              <a:latin typeface="なぎの" charset="-120"/>
+              <a:ea typeface="なぎの" charset="-120"/>
+              <a:cs typeface="なぎの" charset="-120"/>
+              <a:sym typeface="+mn-ea"/>
+            </a:endParaRPr>
+          </a:p>
+          <a:p>
+            <a:pPr>
+              <a:lnSpc>
+                <a:spcPct val="100000"/>
+              </a:lnSpc>
+            </a:pPr>
+            <a:r>
+              <a:rPr lang="en-US" altLang="ja-JP" sz="1600" dirty="0">
+                <a:solidFill>
+                  <a:schemeClr val="tx2">
+                    <a:lumMod val="75000"/>
+                  </a:schemeClr>
+                </a:solidFill>
+                <a:latin typeface="なぎの" charset="-120"/>
+                <a:ea typeface="なぎの" charset="-120"/>
+                <a:cs typeface="なぎの" charset="-120"/>
+                <a:sym typeface="+mn-ea"/>
+              </a:rPr>
+              <a:t>※</a:t>
+            </a:r>
+            <a:r>
+              <a:rPr lang="ja-JP" altLang="en-US" sz="1600" dirty="0">
+                <a:solidFill>
+                  <a:schemeClr val="tx2">
+                    <a:lumMod val="75000"/>
+                  </a:schemeClr>
+                </a:solidFill>
+                <a:latin typeface="なぎの" charset="-120"/>
+                <a:ea typeface="なぎの" charset="-120"/>
+                <a:cs typeface="なぎの" charset="-120"/>
+                <a:sym typeface="+mn-ea"/>
+              </a:rPr>
+              <a:t>ゲーム内からもポーズメニューを</a:t>
+            </a:r>
+            <a:r>
+              <a:rPr lang="ja-JP" altLang="en-US" sz="1600" dirty="0">
+                <a:solidFill>
+                  <a:schemeClr val="tx2">
+                    <a:lumMod val="75000"/>
+                  </a:schemeClr>
+                </a:solidFill>
+                <a:latin typeface="なぎの" charset="-120"/>
+                <a:ea typeface="なぎの" charset="-120"/>
+                <a:cs typeface="なぎの" charset="-120"/>
+                <a:sym typeface="+mn-ea"/>
+              </a:rPr>
+              <a:t>開くことで操作方法を確認できます。</a:t>
+            </a:r>
+            <a:endParaRPr lang="ja-JP" altLang="en-US" sz="1600" dirty="0">
+              <a:solidFill>
+                <a:schemeClr val="tx2">
+                  <a:lumMod val="75000"/>
+                </a:schemeClr>
+              </a:solidFill>
+              <a:latin typeface="なぎの" charset="-120"/>
+              <a:ea typeface="なぎの" charset="-120"/>
+              <a:cs typeface="なぎの" charset="-120"/>
+              <a:sym typeface="+mn-ea"/>
+            </a:endParaRPr>
+          </a:p>
+        </p:txBody>
+      </p:sp>
+    </p:spTree>
+  </p:cSld>
+  <p:clrMapOvr>
+    <a:masterClrMapping/>
+  </p:clrMapOvr>
+</p:sld>
+</file>
+
+<file path=ppt/slides/slide5.xml><?xml version="1.0" encoding="utf-8"?>
+<p:sld xmlns:a="http://schemas.openxmlformats.org/drawingml/2006/main" xmlns:r="http://schemas.openxmlformats.org/officeDocument/2006/relationships" xmlns:p="http://schemas.openxmlformats.org/presentationml/2006/main">
+  <p:cSld>
+    <p:bg>
+      <p:bgPr>
+        <a:solidFill>
+          <a:srgbClr val="FFFF00"/>
+        </a:solidFill>
+        <a:effectLst/>
+      </p:bgPr>
+    </p:bg>
+    <p:spTree>
+      <p:nvGrpSpPr>
+        <p:cNvPr id="1" name=""/>
+        <p:cNvGrpSpPr/>
+        <p:nvPr/>
+      </p:nvGrpSpPr>
+      <p:grpSpPr>
+        <a:xfrm>
+          <a:off x="0" y="0"/>
+          <a:ext cx="0" cy="0"/>
+          <a:chOff x="0" y="0"/>
+          <a:chExt cx="0" cy="0"/>
+        </a:xfrm>
+      </p:grpSpPr>
+      <p:sp>
+        <p:nvSpPr>
+          <p:cNvPr id="6" name="テキストボックス 5"/>
           <p:cNvSpPr txBox="1"/>
           <p:nvPr/>
         </p:nvSpPr>
         <p:spPr>
           <a:xfrm>
-            <a:off x="899160" y="642640"/>
-            <a:ext cx="10394315" cy="523220"/>
+            <a:off x="898525" y="518795"/>
+            <a:ext cx="10394315" cy="4589780"/>
           </a:xfrm>
           <a:prstGeom prst="rect">
             <a:avLst/>
@@ -5000,34 +5089,278 @@
         </p:spPr>
         <p:txBody>
           <a:bodyPr wrap="square" rtlCol="0">
-            <a:spAutoFit/>
+            <a:noAutofit/>
           </a:bodyPr>
           <a:lstStyle/>
           <a:p>
-            <a:r>
-              <a:rPr lang="ja-JP" altLang="en-US" sz="2800" dirty="0">
-                <a:solidFill>
-                  <a:schemeClr val="accent5"/>
-                </a:solidFill>
-                <a:latin typeface="FOT-Popハッピネス Std EB" panose="02020900000000000000" charset="-128"/>
-                <a:ea typeface="FOT-Popハッピネス Std EB" panose="02020900000000000000" charset="-128"/>
-                <a:cs typeface="FOT-Popハッピネス Std EB" panose="02020900000000000000" charset="-128"/>
-              </a:rPr>
-              <a:t>制作期間</a:t>
-            </a:r>
-            <a:r>
-              <a:rPr lang="en-US" altLang="ja-JP" sz="2800" dirty="0">
+            <a:pPr algn="ctr"/>
+            <a:r>
+              <a:rPr lang="ja-JP" altLang="en-US" sz="4400" dirty="0">
                 <a:solidFill>
                   <a:schemeClr val="tx2">
                     <a:lumMod val="75000"/>
                   </a:schemeClr>
                 </a:solidFill>
-                <a:latin typeface="FOT-Popハッピネス Std EB" panose="02020900000000000000" charset="-128"/>
-                <a:ea typeface="FOT-Popハッピネス Std EB" panose="02020900000000000000" charset="-128"/>
-                <a:cs typeface="FOT-Popハッピネス Std EB" panose="02020900000000000000" charset="-128"/>
-              </a:rPr>
-              <a:t>		2023/9/13 ~ 2024/1/26</a:t>
-            </a:r>
+                <a:latin typeface="なぎの" charset="-120"/>
+                <a:ea typeface="なぎの" charset="-120"/>
+                <a:cs typeface="なぎの" charset="-120"/>
+              </a:rPr>
+              <a:t>特別感謝</a:t>
+            </a:r>
+            <a:endParaRPr lang="ja-JP" altLang="en-US" sz="4400" dirty="0">
+              <a:solidFill>
+                <a:schemeClr val="tx2">
+                  <a:lumMod val="75000"/>
+                </a:schemeClr>
+              </a:solidFill>
+              <a:latin typeface="なぎの" charset="-120"/>
+              <a:ea typeface="なぎの" charset="-120"/>
+              <a:cs typeface="なぎの" charset="-120"/>
+            </a:endParaRPr>
+          </a:p>
+          <a:p>
+            <a:r>
+              <a:rPr lang="ja-JP" altLang="en-US" sz="2800" dirty="0">
+                <a:solidFill>
+                  <a:schemeClr val="tx1">
+                    <a:lumMod val="65000"/>
+                    <a:lumOff val="35000"/>
+                  </a:schemeClr>
+                </a:solidFill>
+                <a:latin typeface="なぎの" charset="-120"/>
+                <a:ea typeface="なぎの" charset="-120"/>
+                <a:cs typeface="なぎの" charset="-120"/>
+              </a:rPr>
+              <a:t>ゲームエンジン</a:t>
+            </a:r>
+            <a:r>
+              <a:rPr lang="en-US" altLang="ja-JP" sz="2800" dirty="0">
+                <a:solidFill>
+                  <a:schemeClr val="tx1">
+                    <a:lumMod val="65000"/>
+                    <a:lumOff val="35000"/>
+                  </a:schemeClr>
+                </a:solidFill>
+                <a:latin typeface="なぎの" charset="-120"/>
+                <a:ea typeface="なぎの" charset="-120"/>
+                <a:cs typeface="なぎの" charset="-120"/>
+              </a:rPr>
+              <a:t>	</a:t>
+            </a:r>
+            <a:r>
+              <a:rPr lang="en-US" altLang="ja-JP" sz="2800" dirty="0">
+                <a:solidFill>
+                  <a:schemeClr val="tx2">
+                    <a:lumMod val="75000"/>
+                  </a:schemeClr>
+                </a:solidFill>
+                <a:latin typeface="なぎの" charset="-120"/>
+                <a:ea typeface="なぎの" charset="-120"/>
+                <a:cs typeface="なぎの" charset="-120"/>
+              </a:rPr>
+              <a:t>Unity</a:t>
+            </a:r>
+            <a:endParaRPr lang="en-US" altLang="ja-JP" sz="2800" dirty="0">
+              <a:solidFill>
+                <a:schemeClr val="tx2">
+                  <a:lumMod val="75000"/>
+                </a:schemeClr>
+              </a:solidFill>
+              <a:latin typeface="なぎの" charset="-120"/>
+              <a:ea typeface="なぎの" charset="-120"/>
+              <a:cs typeface="なぎの" charset="-120"/>
+            </a:endParaRPr>
+          </a:p>
+          <a:p>
+            <a:endParaRPr lang="ja-JP" altLang="en-US" sz="2800" dirty="0">
+              <a:solidFill>
+                <a:srgbClr val="C00000"/>
+              </a:solidFill>
+              <a:latin typeface="なぎの" charset="-120"/>
+              <a:ea typeface="なぎの" charset="-120"/>
+              <a:cs typeface="なぎの" charset="-120"/>
+            </a:endParaRPr>
+          </a:p>
+          <a:p>
+            <a:r>
+              <a:rPr lang="ja-JP" altLang="en-US" sz="2800" dirty="0">
+                <a:solidFill>
+                  <a:srgbClr val="C00000"/>
+                </a:solidFill>
+                <a:latin typeface="なぎの" charset="-120"/>
+                <a:ea typeface="なぎの" charset="-120"/>
+                <a:cs typeface="なぎの" charset="-120"/>
+              </a:rPr>
+              <a:t>使用ツール</a:t>
+            </a:r>
+            <a:r>
+              <a:rPr lang="en-US" altLang="ja-JP" sz="2800" dirty="0">
+                <a:solidFill>
+                  <a:srgbClr val="C00000"/>
+                </a:solidFill>
+                <a:latin typeface="なぎの" charset="-120"/>
+                <a:ea typeface="なぎの" charset="-120"/>
+                <a:cs typeface="なぎの" charset="-120"/>
+              </a:rPr>
+              <a:t>	</a:t>
+            </a:r>
+            <a:r>
+              <a:rPr lang="en-US" altLang="ja-JP" sz="2800" dirty="0">
+                <a:latin typeface="なぎの" charset="-120"/>
+                <a:ea typeface="なぎの" charset="-120"/>
+                <a:cs typeface="なぎの" charset="-120"/>
+              </a:rPr>
+              <a:t>	</a:t>
+            </a:r>
+            <a:r>
+              <a:rPr lang="en-US" altLang="ja-JP" sz="2800" dirty="0" err="1">
+                <a:solidFill>
+                  <a:schemeClr val="tx2">
+                    <a:lumMod val="75000"/>
+                  </a:schemeClr>
+                </a:solidFill>
+                <a:latin typeface="なぎの" charset="-120"/>
+                <a:ea typeface="なぎの" charset="-120"/>
+                <a:cs typeface="なぎの" charset="-120"/>
+              </a:rPr>
+              <a:t>Neovim</a:t>
+            </a:r>
+            <a:r>
+              <a:rPr lang="en-US" altLang="ja-JP" sz="2800" dirty="0">
+                <a:solidFill>
+                  <a:schemeClr val="tx2">
+                    <a:lumMod val="75000"/>
+                  </a:schemeClr>
+                </a:solidFill>
+                <a:latin typeface="なぎの" charset="-120"/>
+                <a:ea typeface="なぎの" charset="-120"/>
+                <a:cs typeface="なぎの" charset="-120"/>
+              </a:rPr>
+              <a:t> with </a:t>
+            </a:r>
+            <a:r>
+              <a:rPr lang="en-US" altLang="ja-JP" sz="2800" dirty="0" err="1">
+                <a:solidFill>
+                  <a:schemeClr val="tx2">
+                    <a:lumMod val="75000"/>
+                  </a:schemeClr>
+                </a:solidFill>
+                <a:latin typeface="なぎの" charset="-120"/>
+                <a:ea typeface="なぎの" charset="-120"/>
+                <a:cs typeface="なぎの" charset="-120"/>
+              </a:rPr>
+              <a:t>VSCode</a:t>
+            </a:r>
+            <a:endParaRPr lang="en-US" altLang="ja-JP" sz="2800" dirty="0">
+              <a:solidFill>
+                <a:schemeClr val="tx2">
+                  <a:lumMod val="75000"/>
+                </a:schemeClr>
+              </a:solidFill>
+              <a:latin typeface="なぎの" charset="-120"/>
+              <a:ea typeface="なぎの" charset="-120"/>
+              <a:cs typeface="なぎの" charset="-120"/>
+            </a:endParaRPr>
+          </a:p>
+          <a:p>
+            <a:r>
+              <a:rPr lang="en-US" altLang="ja-JP" sz="2800" dirty="0">
+                <a:solidFill>
+                  <a:schemeClr val="tx2">
+                    <a:lumMod val="75000"/>
+                  </a:schemeClr>
+                </a:solidFill>
+                <a:latin typeface="なぎの" charset="-120"/>
+                <a:ea typeface="なぎの" charset="-120"/>
+                <a:cs typeface="なぎの" charset="-120"/>
+              </a:rPr>
+              <a:t>			GIMP</a:t>
+            </a:r>
+            <a:endParaRPr lang="en-US" altLang="ja-JP" sz="2800" dirty="0">
+              <a:solidFill>
+                <a:schemeClr val="tx2">
+                  <a:lumMod val="75000"/>
+                </a:schemeClr>
+              </a:solidFill>
+              <a:latin typeface="なぎの" charset="-120"/>
+              <a:ea typeface="なぎの" charset="-120"/>
+              <a:cs typeface="なぎの" charset="-120"/>
+            </a:endParaRPr>
+          </a:p>
+          <a:p>
+            <a:r>
+              <a:rPr lang="en-US" altLang="ja-JP" sz="2800" dirty="0">
+                <a:solidFill>
+                  <a:schemeClr val="tx2">
+                    <a:lumMod val="75000"/>
+                  </a:schemeClr>
+                </a:solidFill>
+                <a:latin typeface="なぎの" charset="-120"/>
+                <a:ea typeface="なぎの" charset="-120"/>
+                <a:cs typeface="なぎの" charset="-120"/>
+              </a:rPr>
+              <a:t>			Git</a:t>
+            </a:r>
+            <a:endParaRPr lang="en-US" altLang="ja-JP" sz="2800" dirty="0">
+              <a:solidFill>
+                <a:schemeClr val="tx2">
+                  <a:lumMod val="75000"/>
+                </a:schemeClr>
+              </a:solidFill>
+              <a:latin typeface="なぎの" charset="-120"/>
+              <a:ea typeface="なぎの" charset="-120"/>
+              <a:cs typeface="なぎの" charset="-120"/>
+            </a:endParaRPr>
+          </a:p>
+          <a:p>
+            <a:r>
+              <a:rPr lang="en-US" altLang="ja-JP" sz="2800" dirty="0">
+                <a:solidFill>
+                  <a:schemeClr val="tx2">
+                    <a:lumMod val="75000"/>
+                  </a:schemeClr>
+                </a:solidFill>
+                <a:latin typeface="なぎの" charset="-120"/>
+                <a:ea typeface="なぎの" charset="-120"/>
+                <a:cs typeface="なぎの" charset="-120"/>
+              </a:rPr>
+              <a:t>			Google Bard</a:t>
+            </a:r>
+            <a:endParaRPr lang="en-US" altLang="ja-JP" sz="2800" dirty="0">
+              <a:solidFill>
+                <a:schemeClr val="tx2">
+                  <a:lumMod val="75000"/>
+                </a:schemeClr>
+              </a:solidFill>
+              <a:latin typeface="なぎの" charset="-120"/>
+              <a:ea typeface="なぎの" charset="-120"/>
+              <a:cs typeface="なぎの" charset="-120"/>
+            </a:endParaRPr>
+          </a:p>
+          <a:p>
+            <a:r>
+              <a:rPr lang="en-US" altLang="ja-JP" sz="2800" dirty="0">
+                <a:solidFill>
+                  <a:schemeClr val="tx2">
+                    <a:lumMod val="75000"/>
+                  </a:schemeClr>
+                </a:solidFill>
+                <a:latin typeface="なぎの" charset="-120"/>
+                <a:ea typeface="なぎの" charset="-120"/>
+                <a:cs typeface="なぎの" charset="-120"/>
+              </a:rPr>
+              <a:t>			Notion</a:t>
+            </a:r>
+            <a:endParaRPr lang="en-US" altLang="ja-JP" sz="2800" dirty="0">
+              <a:solidFill>
+                <a:schemeClr val="tx2">
+                  <a:lumMod val="75000"/>
+                </a:schemeClr>
+              </a:solidFill>
+              <a:latin typeface="なぎの" charset="-120"/>
+              <a:ea typeface="なぎの" charset="-120"/>
+              <a:cs typeface="なぎの" charset="-120"/>
+            </a:endParaRPr>
           </a:p>
         </p:txBody>
       </p:sp>
@@ -5290,8 +5623,6 @@
       </a:bgFillStyleLst>
     </a:fmtScheme>
   </a:themeElements>
-  <a:objectDefaults/>
-  <a:extraClrSchemeLst/>
   <a:extLst>
     <a:ext uri="{05A4C25C-085E-4340-85A3-A5531E510DB2}">
       <thm15:themeFamily xmlns:thm15="http://schemas.microsoft.com/office/thememl/2012/main" name="Office Theme" id="{62F939B6-93AF-4DB8-9C6B-D6C7DFDC589F}" vid="{4A3C46E8-61CC-4603-A589-7422A47A8E4A}"/>
@@ -5551,8 +5882,6 @@
       </a:bgFillStyleLst>
     </a:fmtScheme>
   </a:themeElements>
-  <a:objectDefaults/>
-  <a:extraClrSchemeLst/>
   <a:extLst>
     <a:ext uri="{05A4C25C-085E-4340-85A3-A5531E510DB2}">
       <thm15:themeFamily xmlns:thm15="http://schemas.microsoft.com/office/thememl/2012/main" name="Office Theme" id="{62F939B6-93AF-4DB8-9C6B-D6C7DFDC589F}" vid="{4A3C46E8-61CC-4603-A589-7422A47A8E4A}"/>
@@ -5812,8 +6141,6 @@
       </a:bgFillStyleLst>
     </a:fmtScheme>
   </a:themeElements>
-  <a:objectDefaults/>
-  <a:extraClrSchemeLst/>
   <a:extLst>
     <a:ext uri="{05A4C25C-085E-4340-85A3-A5531E510DB2}">
       <thm15:themeFamily xmlns:thm15="http://schemas.microsoft.com/office/thememl/2012/main" name="Office Theme" id="{62F939B6-93AF-4DB8-9C6B-D6C7DFDC589F}" vid="{4A3C46E8-61CC-4603-A589-7422A47A8E4A}"/>

</xml_diff>

<commit_message>
update: rewrite kikakusho, wip mama
</commit_message>
<xml_diff>
--- a/kikaku/potato_kikakusho.pptx
+++ b/kikaku/potato_kikakusho.pptx
@@ -8,14 +8,13 @@
     <p:notesMasterId r:id="rId4"/>
   </p:notesMasterIdLst>
   <p:handoutMasterIdLst>
-    <p:handoutMasterId r:id="rId9"/>
+    <p:handoutMasterId r:id="rId8"/>
   </p:handoutMasterIdLst>
   <p:sldIdLst>
     <p:sldId id="256" r:id="rId3"/>
     <p:sldId id="259" r:id="rId5"/>
     <p:sldId id="262" r:id="rId6"/>
     <p:sldId id="257" r:id="rId7"/>
-    <p:sldId id="258" r:id="rId8"/>
   </p:sldIdLst>
   <p:sldSz cx="12192000" cy="6858000"/>
   <p:notesSz cx="6858000" cy="9144000"/>
@@ -3990,7 +3989,7 @@
         <p:spPr>
           <a:xfrm>
             <a:off x="374650" y="1259840"/>
-            <a:ext cx="7148195" cy="1936206"/>
+            <a:ext cx="7333615" cy="5046980"/>
           </a:xfrm>
           <a:prstGeom prst="rect">
             <a:avLst/>
@@ -4005,7 +4004,7 @@
           <a:p>
             <a:pPr algn="l"/>
             <a:r>
-              <a:rPr lang="ja-JP" altLang="en-US" sz="2400" b="0" i="0" dirty="0">
+              <a:rPr lang="en-US" altLang="ja-JP" sz="2400" b="0" i="0" dirty="0">
                 <a:solidFill>
                   <a:schemeClr val="tx2">
                     <a:lumMod val="75000"/>
@@ -4016,7 +4015,7 @@
                 <a:ea typeface="なぎの" charset="-120"/>
                 <a:cs typeface="なぎの" charset="-120"/>
               </a:rPr>
-              <a:t>ステージ内に仕掛けられたたくさんの試練</a:t>
+              <a:t>2031/9/30(</a:t>
             </a:r>
             <a:r>
               <a:rPr lang="ja-JP" altLang="en-US" sz="2400" b="0" i="0" dirty="0">
@@ -4030,7 +4029,21 @@
                 <a:ea typeface="なぎの" charset="-120"/>
                 <a:cs typeface="なぎの" charset="-120"/>
               </a:rPr>
-              <a:t>。</a:t>
+              <a:t>火</a:t>
+            </a:r>
+            <a:r>
+              <a:rPr lang="en-US" altLang="ja-JP" sz="2400" b="0" i="0" dirty="0">
+                <a:solidFill>
+                  <a:schemeClr val="tx2">
+                    <a:lumMod val="75000"/>
+                  </a:schemeClr>
+                </a:solidFill>
+                <a:effectLst/>
+                <a:latin typeface="なぎの" charset="-120"/>
+                <a:ea typeface="なぎの" charset="-120"/>
+                <a:cs typeface="なぎの" charset="-120"/>
+              </a:rPr>
+              <a:t>)</a:t>
             </a:r>
             <a:endParaRPr lang="ja-JP" altLang="en-US" sz="2400" b="0" i="0" dirty="0">
               <a:solidFill>
@@ -4047,7 +4060,7 @@
           <a:p>
             <a:pPr algn="l"/>
             <a:r>
-              <a:rPr lang="ja-JP" altLang="en-US" sz="2400" b="0" i="0" dirty="0">
+              <a:rPr lang="ja-JP" altLang="en-US" sz="2000" b="0" i="0" dirty="0">
                 <a:solidFill>
                   <a:schemeClr val="tx2">
                     <a:lumMod val="75000"/>
@@ -4058,10 +4071,38 @@
                 <a:ea typeface="なぎの" charset="-120"/>
                 <a:cs typeface="なぎの" charset="-120"/>
               </a:rPr>
-              <a:t>越えた先には明るい未来</a:t>
-            </a:r>
-            <a:r>
-              <a:rPr lang="ja-JP" altLang="en-US" sz="2400" b="0" i="0" dirty="0">
+              <a:t>なんか今日起きたら手紙おいてあったからウッキウキで読み始めたんやけど、えっぐいこと書いてるって。</a:t>
+            </a:r>
+            <a:endParaRPr lang="ja-JP" altLang="en-US" sz="2000" b="0" i="0" dirty="0">
+              <a:solidFill>
+                <a:schemeClr val="tx2">
+                  <a:lumMod val="75000"/>
+                </a:schemeClr>
+              </a:solidFill>
+              <a:effectLst/>
+              <a:latin typeface="なぎの" charset="-120"/>
+              <a:ea typeface="なぎの" charset="-120"/>
+              <a:cs typeface="なぎの" charset="-120"/>
+            </a:endParaRPr>
+          </a:p>
+          <a:p>
+            <a:pPr algn="l"/>
+            <a:endParaRPr lang="ja-JP" altLang="en-US" sz="2000" b="0" i="0" dirty="0">
+              <a:solidFill>
+                <a:schemeClr val="tx2">
+                  <a:lumMod val="75000"/>
+                </a:schemeClr>
+              </a:solidFill>
+              <a:effectLst/>
+              <a:latin typeface="なぎの" charset="-120"/>
+              <a:ea typeface="なぎの" charset="-120"/>
+              <a:cs typeface="なぎの" charset="-120"/>
+            </a:endParaRPr>
+          </a:p>
+          <a:p>
+            <a:pPr algn="l"/>
+            <a:r>
+              <a:rPr lang="ja-JP" altLang="en-US" sz="2000" b="0" i="0" dirty="0">
                 <a:solidFill>
                   <a:schemeClr val="tx2">
                     <a:lumMod val="75000"/>
@@ -4072,9 +4113,248 @@
                 <a:ea typeface="なぎの" charset="-120"/>
                 <a:cs typeface="なぎの" charset="-120"/>
               </a:rPr>
-              <a:t>が。</a:t>
-            </a:r>
-            <a:endParaRPr lang="ja-JP" altLang="en-US" sz="2400" b="0" i="0" dirty="0">
+              <a:t>「もういい年なんだからこれからは自分でどうにかしなさい」こーれやばいで。</a:t>
+            </a:r>
+            <a:endParaRPr lang="ja-JP" altLang="en-US" sz="2000" b="0" i="0" dirty="0">
+              <a:solidFill>
+                <a:schemeClr val="tx2">
+                  <a:lumMod val="75000"/>
+                </a:schemeClr>
+              </a:solidFill>
+              <a:effectLst/>
+              <a:latin typeface="なぎの" charset="-120"/>
+              <a:ea typeface="なぎの" charset="-120"/>
+              <a:cs typeface="なぎの" charset="-120"/>
+            </a:endParaRPr>
+          </a:p>
+          <a:p>
+            <a:pPr algn="l"/>
+            <a:endParaRPr lang="ja-JP" altLang="en-US" sz="2000" dirty="0">
+              <a:solidFill>
+                <a:schemeClr val="tx2">
+                  <a:lumMod val="75000"/>
+                </a:schemeClr>
+              </a:solidFill>
+              <a:effectLst/>
+              <a:latin typeface="なぎの" charset="-120"/>
+              <a:ea typeface="なぎの" charset="-120"/>
+              <a:cs typeface="なぎの" charset="-120"/>
+              <a:sym typeface="+mn-ea"/>
+            </a:endParaRPr>
+          </a:p>
+          <a:p>
+            <a:pPr algn="l"/>
+            <a:r>
+              <a:rPr lang="ja-JP" altLang="en-US" sz="2000" b="0" i="0" dirty="0">
+                <a:solidFill>
+                  <a:schemeClr val="tx2">
+                    <a:lumMod val="75000"/>
+                  </a:schemeClr>
+                </a:solidFill>
+                <a:effectLst/>
+                <a:latin typeface="なぎの" charset="-120"/>
+                <a:ea typeface="なぎの" charset="-120"/>
+                <a:cs typeface="なぎの" charset="-120"/>
+              </a:rPr>
+              <a:t>朝から最悪や</a:t>
+            </a:r>
+            <a:r>
+              <a:rPr lang="en-US" altLang="ja-JP" sz="2000" b="0" i="0" dirty="0">
+                <a:solidFill>
+                  <a:schemeClr val="tx2">
+                    <a:lumMod val="75000"/>
+                  </a:schemeClr>
+                </a:solidFill>
+                <a:effectLst/>
+                <a:latin typeface="なぎの" charset="-120"/>
+                <a:ea typeface="なぎの" charset="-120"/>
+                <a:cs typeface="なぎの" charset="-120"/>
+              </a:rPr>
+              <a:t>…</a:t>
+            </a:r>
+            <a:r>
+              <a:rPr lang="ja-JP" altLang="en-US" sz="2000" b="0" i="0" dirty="0">
+                <a:solidFill>
+                  <a:schemeClr val="tx2">
+                    <a:lumMod val="75000"/>
+                  </a:schemeClr>
+                </a:solidFill>
+                <a:effectLst/>
+                <a:latin typeface="なぎの" charset="-120"/>
+                <a:ea typeface="なぎの" charset="-120"/>
+                <a:cs typeface="なぎの" charset="-120"/>
+              </a:rPr>
+              <a:t>これからどうしたらええの？</a:t>
+            </a:r>
+            <a:endParaRPr lang="ja-JP" altLang="en-US" sz="2000" b="0" i="0" dirty="0">
+              <a:solidFill>
+                <a:schemeClr val="tx2">
+                  <a:lumMod val="75000"/>
+                </a:schemeClr>
+              </a:solidFill>
+              <a:effectLst/>
+              <a:latin typeface="なぎの" charset="-120"/>
+              <a:ea typeface="なぎの" charset="-120"/>
+              <a:cs typeface="なぎの" charset="-120"/>
+            </a:endParaRPr>
+          </a:p>
+          <a:p>
+            <a:pPr algn="l"/>
+            <a:r>
+              <a:rPr lang="ja-JP" altLang="en-US" sz="2000" b="0" i="0" dirty="0">
+                <a:solidFill>
+                  <a:schemeClr val="tx2">
+                    <a:lumMod val="75000"/>
+                  </a:schemeClr>
+                </a:solidFill>
+                <a:effectLst/>
+                <a:latin typeface="なぎの" charset="-120"/>
+                <a:ea typeface="なぎの" charset="-120"/>
+                <a:cs typeface="なぎの" charset="-120"/>
+              </a:rPr>
+              <a:t>今までアイツにいろいろやってもろてたから自分じゃどうもできんで</a:t>
+            </a:r>
+            <a:r>
+              <a:rPr lang="en-US" altLang="ja-JP" sz="2000" b="0" i="0" dirty="0">
+                <a:solidFill>
+                  <a:schemeClr val="tx2">
+                    <a:lumMod val="75000"/>
+                  </a:schemeClr>
+                </a:solidFill>
+                <a:effectLst/>
+                <a:latin typeface="なぎの" charset="-120"/>
+                <a:ea typeface="なぎの" charset="-120"/>
+                <a:cs typeface="なぎの" charset="-120"/>
+              </a:rPr>
+              <a:t>…</a:t>
+            </a:r>
+            <a:endParaRPr lang="en-US" altLang="ja-JP" sz="2000" b="0" i="0" dirty="0">
+              <a:solidFill>
+                <a:schemeClr val="tx2">
+                  <a:lumMod val="75000"/>
+                </a:schemeClr>
+              </a:solidFill>
+              <a:effectLst/>
+              <a:latin typeface="なぎの" charset="-120"/>
+              <a:ea typeface="なぎの" charset="-120"/>
+              <a:cs typeface="なぎの" charset="-120"/>
+            </a:endParaRPr>
+          </a:p>
+          <a:p>
+            <a:pPr algn="l"/>
+            <a:endParaRPr lang="en-US" altLang="ja-JP" sz="2000" b="0" i="0" dirty="0">
+              <a:solidFill>
+                <a:schemeClr val="tx2">
+                  <a:lumMod val="75000"/>
+                </a:schemeClr>
+              </a:solidFill>
+              <a:effectLst/>
+              <a:latin typeface="なぎの" charset="-120"/>
+              <a:ea typeface="なぎの" charset="-120"/>
+              <a:cs typeface="なぎの" charset="-120"/>
+            </a:endParaRPr>
+          </a:p>
+          <a:p>
+            <a:pPr algn="l"/>
+            <a:r>
+              <a:rPr lang="ja-JP" altLang="en-US" sz="2000" b="0" i="0" dirty="0">
+                <a:solidFill>
+                  <a:schemeClr val="tx2">
+                    <a:lumMod val="75000"/>
+                  </a:schemeClr>
+                </a:solidFill>
+                <a:effectLst/>
+                <a:latin typeface="なぎの" charset="-120"/>
+                <a:ea typeface="なぎの" charset="-120"/>
+                <a:cs typeface="なぎの" charset="-120"/>
+              </a:rPr>
+              <a:t>こんなことなるとかだれがわかんねん</a:t>
+            </a:r>
+            <a:endParaRPr lang="ja-JP" altLang="en-US" sz="2000" b="0" i="0" dirty="0">
+              <a:solidFill>
+                <a:schemeClr val="tx2">
+                  <a:lumMod val="75000"/>
+                </a:schemeClr>
+              </a:solidFill>
+              <a:effectLst/>
+              <a:latin typeface="なぎの" charset="-120"/>
+              <a:ea typeface="なぎの" charset="-120"/>
+              <a:cs typeface="なぎの" charset="-120"/>
+            </a:endParaRPr>
+          </a:p>
+          <a:p>
+            <a:pPr algn="l"/>
+            <a:r>
+              <a:rPr lang="ja-JP" altLang="en-US" sz="2000" b="0" i="0" dirty="0">
+                <a:solidFill>
+                  <a:schemeClr val="tx2">
+                    <a:lumMod val="75000"/>
+                  </a:schemeClr>
+                </a:solidFill>
+                <a:effectLst/>
+                <a:latin typeface="なぎの" charset="-120"/>
+                <a:ea typeface="なぎの" charset="-120"/>
+                <a:cs typeface="なぎの" charset="-120"/>
+              </a:rPr>
+              <a:t>いきなりじゃなくて予告してくれや</a:t>
+            </a:r>
+            <a:endParaRPr lang="ja-JP" altLang="en-US" sz="2000" b="0" i="0" dirty="0">
+              <a:solidFill>
+                <a:schemeClr val="tx2">
+                  <a:lumMod val="75000"/>
+                </a:schemeClr>
+              </a:solidFill>
+              <a:effectLst/>
+              <a:latin typeface="なぎの" charset="-120"/>
+              <a:ea typeface="なぎの" charset="-120"/>
+              <a:cs typeface="なぎの" charset="-120"/>
+            </a:endParaRPr>
+          </a:p>
+          <a:p>
+            <a:pPr algn="l"/>
+            <a:endParaRPr lang="ja-JP" altLang="en-US" sz="2000" b="0" i="0" dirty="0">
+              <a:solidFill>
+                <a:schemeClr val="tx2">
+                  <a:lumMod val="75000"/>
+                </a:schemeClr>
+              </a:solidFill>
+              <a:effectLst/>
+              <a:latin typeface="なぎの" charset="-120"/>
+              <a:ea typeface="なぎの" charset="-120"/>
+              <a:cs typeface="なぎの" charset="-120"/>
+            </a:endParaRPr>
+          </a:p>
+          <a:p>
+            <a:pPr algn="l"/>
+            <a:r>
+              <a:rPr lang="ja-JP" altLang="en-US" sz="2000" b="0" i="0" dirty="0">
+                <a:solidFill>
+                  <a:schemeClr val="tx2">
+                    <a:lumMod val="75000"/>
+                  </a:schemeClr>
+                </a:solidFill>
+                <a:effectLst/>
+                <a:latin typeface="なぎの" charset="-120"/>
+                <a:ea typeface="なぎの" charset="-120"/>
+                <a:cs typeface="なぎの" charset="-120"/>
+              </a:rPr>
+              <a:t>こんどハローワークみたいなんいってみるかー</a:t>
+            </a:r>
+            <a:r>
+              <a:rPr lang="en-US" altLang="ja-JP" sz="2000" b="0" i="0" dirty="0">
+                <a:solidFill>
+                  <a:schemeClr val="tx2">
+                    <a:lumMod val="75000"/>
+                  </a:schemeClr>
+                </a:solidFill>
+                <a:effectLst/>
+                <a:latin typeface="なぎの" charset="-120"/>
+                <a:ea typeface="なぎの" charset="-120"/>
+                <a:cs typeface="なぎの" charset="-120"/>
+              </a:rPr>
+              <a:t>…</a:t>
+            </a:r>
+            <a:endParaRPr lang="en-US" altLang="ja-JP" sz="2000" b="0" i="0" dirty="0">
               <a:solidFill>
                 <a:schemeClr val="tx2">
                   <a:lumMod val="75000"/>
@@ -4232,8 +4512,8 @@
         </p:nvSpPr>
         <p:spPr>
           <a:xfrm>
-            <a:off x="379730" y="2231390"/>
-            <a:ext cx="7148195" cy="4267200"/>
+            <a:off x="375920" y="2162175"/>
+            <a:ext cx="11439525" cy="4267200"/>
           </a:xfrm>
           <a:prstGeom prst="rect">
             <a:avLst/>
@@ -4258,7 +4538,7 @@
                 <a:latin typeface="なぎの" charset="-120"/>
                 <a:ea typeface="なぎの" charset="-120"/>
               </a:rPr>
-              <a:t>アクションの説明</a:t>
+              <a:t>アクションの説明などーーーーーーーーー画像も</a:t>
             </a:r>
             <a:r>
               <a:rPr lang="ja-JP" altLang="en-US" sz="2400" b="0" i="0" dirty="0">
@@ -4271,7 +4551,85 @@
                 <a:latin typeface="なぎの" charset="-120"/>
                 <a:ea typeface="なぎの" charset="-120"/>
               </a:rPr>
-              <a:t>などーーーーーーーーー</a:t>
+              <a:t>交えて</a:t>
+            </a:r>
+            <a:endParaRPr lang="ja-JP" altLang="en-US" sz="2400" b="0" i="0" dirty="0">
+              <a:solidFill>
+                <a:schemeClr val="tx2">
+                  <a:lumMod val="75000"/>
+                </a:schemeClr>
+              </a:solidFill>
+              <a:effectLst/>
+              <a:latin typeface="なぎの" charset="-120"/>
+              <a:ea typeface="なぎの" charset="-120"/>
+            </a:endParaRPr>
+          </a:p>
+          <a:p>
+            <a:pPr algn="l"/>
+            <a:endParaRPr lang="ja-JP" altLang="en-US" sz="2400" b="0" i="0" dirty="0">
+              <a:solidFill>
+                <a:schemeClr val="tx2">
+                  <a:lumMod val="75000"/>
+                </a:schemeClr>
+              </a:solidFill>
+              <a:effectLst/>
+              <a:latin typeface="なぎの" charset="-120"/>
+              <a:ea typeface="なぎの" charset="-120"/>
+            </a:endParaRPr>
+          </a:p>
+          <a:p>
+            <a:pPr algn="l"/>
+            <a:r>
+              <a:rPr lang="ja-JP" altLang="en-US" sz="2400" b="0" i="0" dirty="0">
+                <a:solidFill>
+                  <a:schemeClr val="tx2">
+                    <a:lumMod val="75000"/>
+                  </a:schemeClr>
+                </a:solidFill>
+                <a:effectLst/>
+                <a:latin typeface="なぎの" charset="-120"/>
+                <a:ea typeface="なぎの" charset="-120"/>
+              </a:rPr>
+              <a:t>特定のエリアで一定時間止まってしまうと</a:t>
+            </a:r>
+            <a:r>
+              <a:rPr lang="en-US" altLang="ja-JP" sz="2400" b="0" i="0" dirty="0">
+                <a:solidFill>
+                  <a:schemeClr val="tx2">
+                    <a:lumMod val="75000"/>
+                  </a:schemeClr>
+                </a:solidFill>
+                <a:effectLst/>
+                <a:latin typeface="なぎの" charset="-120"/>
+                <a:ea typeface="なぎの" charset="-120"/>
+              </a:rPr>
+              <a:t>…</a:t>
+            </a:r>
+            <a:r>
+              <a:rPr lang="ja-JP" altLang="en-US" sz="2400" b="0" i="0" dirty="0">
+                <a:solidFill>
+                  <a:schemeClr val="tx2">
+                    <a:lumMod val="75000"/>
+                  </a:schemeClr>
+                </a:solidFill>
+                <a:effectLst/>
+                <a:latin typeface="なぎの" charset="-120"/>
+                <a:ea typeface="なぎの" charset="-120"/>
+              </a:rPr>
+              <a:t>（ママ監視</a:t>
+            </a:r>
+            <a:r>
+              <a:rPr lang="ja-JP" altLang="en-US" sz="2400" b="0" i="0" dirty="0">
+                <a:solidFill>
+                  <a:schemeClr val="tx2">
+                    <a:lumMod val="75000"/>
+                  </a:schemeClr>
+                </a:solidFill>
+                <a:effectLst/>
+                <a:latin typeface="なぎの" charset="-120"/>
+                <a:ea typeface="なぎの" charset="-120"/>
+              </a:rPr>
+              <a:t>ゾーン）</a:t>
             </a:r>
             <a:endParaRPr lang="ja-JP" altLang="en-US" sz="2400" b="0" i="0" dirty="0">
               <a:solidFill>
@@ -4319,7 +4677,7 @@
         <p:spPr>
           <a:xfrm>
             <a:off x="379730" y="295275"/>
-            <a:ext cx="7148195" cy="1936206"/>
+            <a:ext cx="10629265" cy="1936115"/>
           </a:xfrm>
           <a:prstGeom prst="rect">
             <a:avLst/>
@@ -4369,7 +4727,59 @@
                 <a:latin typeface="なぎの" charset="-120"/>
                 <a:ea typeface="なぎの" charset="-120"/>
               </a:rPr>
-              <a:t>徐々に難しくなっていく</a:t>
+              <a:t>徐々に難易度が上がっていく</a:t>
+            </a:r>
+            <a:r>
+              <a:rPr lang="ja-JP" altLang="en-US" sz="2400" i="0" dirty="0">
+                <a:solidFill>
+                  <a:schemeClr val="tx2">
+                    <a:lumMod val="75000"/>
+                  </a:schemeClr>
+                </a:solidFill>
+                <a:effectLst/>
+                <a:latin typeface="なぎの" charset="-120"/>
+                <a:ea typeface="なぎの" charset="-120"/>
+              </a:rPr>
+              <a:t>ため</a:t>
+            </a:r>
+            <a:endParaRPr lang="ja-JP" altLang="en-US" sz="2400" i="0" dirty="0">
+              <a:solidFill>
+                <a:schemeClr val="tx2">
+                  <a:lumMod val="75000"/>
+                </a:schemeClr>
+              </a:solidFill>
+              <a:effectLst/>
+              <a:latin typeface="なぎの" charset="-120"/>
+              <a:ea typeface="なぎの" charset="-120"/>
+            </a:endParaRPr>
+          </a:p>
+          <a:p>
+            <a:pPr algn="l"/>
+            <a:r>
+              <a:rPr lang="ja-JP" altLang="en-US" sz="2400" i="0" dirty="0">
+                <a:solidFill>
+                  <a:schemeClr val="tx2">
+                    <a:lumMod val="75000"/>
+                  </a:schemeClr>
+                </a:solidFill>
+                <a:effectLst/>
+                <a:latin typeface="なぎの" charset="-120"/>
+                <a:ea typeface="なぎの" charset="-120"/>
+              </a:rPr>
+              <a:t>序盤のうちにこの悪戯に適応できるかが</a:t>
+            </a:r>
+            <a:r>
+              <a:rPr lang="ja-JP" altLang="en-US" sz="2400" i="0" dirty="0">
+                <a:solidFill>
+                  <a:schemeClr val="tx2">
+                    <a:lumMod val="75000"/>
+                  </a:schemeClr>
+                </a:solidFill>
+                <a:effectLst/>
+                <a:latin typeface="なぎの" charset="-120"/>
+                <a:ea typeface="なぎの" charset="-120"/>
+              </a:rPr>
+              <a:t>カギ</a:t>
             </a:r>
             <a:endParaRPr lang="ja-JP" altLang="en-US" sz="2400" i="0" dirty="0">
               <a:solidFill>
@@ -5034,332 +5444,6 @@
               <a:ea typeface="なぎの" charset="-120"/>
               <a:cs typeface="なぎの" charset="-120"/>
               <a:sym typeface="+mn-ea"/>
-            </a:endParaRPr>
-          </a:p>
-        </p:txBody>
-      </p:sp>
-    </p:spTree>
-  </p:cSld>
-  <p:clrMapOvr>
-    <a:masterClrMapping/>
-  </p:clrMapOvr>
-</p:sld>
-</file>
-
-<file path=ppt/slides/slide5.xml><?xml version="1.0" encoding="utf-8"?>
-<p:sld xmlns:a="http://schemas.openxmlformats.org/drawingml/2006/main" xmlns:r="http://schemas.openxmlformats.org/officeDocument/2006/relationships" xmlns:p="http://schemas.openxmlformats.org/presentationml/2006/main">
-  <p:cSld>
-    <p:bg>
-      <p:bgPr>
-        <a:solidFill>
-          <a:srgbClr val="FFFF00"/>
-        </a:solidFill>
-        <a:effectLst/>
-      </p:bgPr>
-    </p:bg>
-    <p:spTree>
-      <p:nvGrpSpPr>
-        <p:cNvPr id="1" name=""/>
-        <p:cNvGrpSpPr/>
-        <p:nvPr/>
-      </p:nvGrpSpPr>
-      <p:grpSpPr>
-        <a:xfrm>
-          <a:off x="0" y="0"/>
-          <a:ext cx="0" cy="0"/>
-          <a:chOff x="0" y="0"/>
-          <a:chExt cx="0" cy="0"/>
-        </a:xfrm>
-      </p:grpSpPr>
-      <p:sp>
-        <p:nvSpPr>
-          <p:cNvPr id="6" name="テキストボックス 5"/>
-          <p:cNvSpPr txBox="1"/>
-          <p:nvPr/>
-        </p:nvSpPr>
-        <p:spPr>
-          <a:xfrm>
-            <a:off x="898525" y="518795"/>
-            <a:ext cx="10394315" cy="4589780"/>
-          </a:xfrm>
-          <a:prstGeom prst="rect">
-            <a:avLst/>
-          </a:prstGeom>
-          <a:noFill/>
-        </p:spPr>
-        <p:txBody>
-          <a:bodyPr wrap="square" rtlCol="0">
-            <a:noAutofit/>
-          </a:bodyPr>
-          <a:lstStyle/>
-          <a:p>
-            <a:pPr algn="ctr"/>
-            <a:r>
-              <a:rPr lang="ja-JP" altLang="en-US" sz="4400" dirty="0">
-                <a:solidFill>
-                  <a:schemeClr val="tx2">
-                    <a:lumMod val="75000"/>
-                  </a:schemeClr>
-                </a:solidFill>
-                <a:latin typeface="なぎの" charset="-120"/>
-                <a:ea typeface="なぎの" charset="-120"/>
-                <a:cs typeface="なぎの" charset="-120"/>
-              </a:rPr>
-              <a:t>特別感謝</a:t>
-            </a:r>
-            <a:endParaRPr lang="ja-JP" altLang="en-US" sz="4400" dirty="0">
-              <a:solidFill>
-                <a:schemeClr val="tx2">
-                  <a:lumMod val="75000"/>
-                </a:schemeClr>
-              </a:solidFill>
-              <a:latin typeface="なぎの" charset="-120"/>
-              <a:ea typeface="なぎの" charset="-120"/>
-              <a:cs typeface="なぎの" charset="-120"/>
-            </a:endParaRPr>
-          </a:p>
-          <a:p>
-            <a:r>
-              <a:rPr lang="ja-JP" altLang="en-US" sz="2800" dirty="0">
-                <a:solidFill>
-                  <a:schemeClr val="tx1">
-                    <a:lumMod val="65000"/>
-                    <a:lumOff val="35000"/>
-                  </a:schemeClr>
-                </a:solidFill>
-                <a:latin typeface="なぎの" charset="-120"/>
-                <a:ea typeface="なぎの" charset="-120"/>
-                <a:cs typeface="なぎの" charset="-120"/>
-              </a:rPr>
-              <a:t>ゲームエンジン</a:t>
-            </a:r>
-            <a:r>
-              <a:rPr lang="en-US" altLang="ja-JP" sz="2800" dirty="0">
-                <a:solidFill>
-                  <a:schemeClr val="tx1">
-                    <a:lumMod val="65000"/>
-                    <a:lumOff val="35000"/>
-                  </a:schemeClr>
-                </a:solidFill>
-                <a:latin typeface="なぎの" charset="-120"/>
-                <a:ea typeface="なぎの" charset="-120"/>
-                <a:cs typeface="なぎの" charset="-120"/>
-              </a:rPr>
-              <a:t>	</a:t>
-            </a:r>
-            <a:r>
-              <a:rPr lang="en-US" altLang="ja-JP" sz="2800" dirty="0">
-                <a:solidFill>
-                  <a:schemeClr val="tx2">
-                    <a:lumMod val="75000"/>
-                  </a:schemeClr>
-                </a:solidFill>
-                <a:latin typeface="なぎの" charset="-120"/>
-                <a:ea typeface="なぎの" charset="-120"/>
-                <a:cs typeface="なぎの" charset="-120"/>
-              </a:rPr>
-              <a:t>Unity</a:t>
-            </a:r>
-            <a:endParaRPr lang="en-US" altLang="ja-JP" sz="2800" dirty="0">
-              <a:solidFill>
-                <a:schemeClr val="tx2">
-                  <a:lumMod val="75000"/>
-                </a:schemeClr>
-              </a:solidFill>
-              <a:latin typeface="なぎの" charset="-120"/>
-              <a:ea typeface="なぎの" charset="-120"/>
-              <a:cs typeface="なぎの" charset="-120"/>
-            </a:endParaRPr>
-          </a:p>
-          <a:p>
-            <a:endParaRPr lang="ja-JP" altLang="en-US" sz="2800" dirty="0">
-              <a:solidFill>
-                <a:srgbClr val="C00000"/>
-              </a:solidFill>
-              <a:latin typeface="なぎの" charset="-120"/>
-              <a:ea typeface="なぎの" charset="-120"/>
-              <a:cs typeface="なぎの" charset="-120"/>
-            </a:endParaRPr>
-          </a:p>
-          <a:p>
-            <a:r>
-              <a:rPr lang="ja-JP" altLang="en-US" sz="2800" dirty="0">
-                <a:solidFill>
-                  <a:srgbClr val="C00000"/>
-                </a:solidFill>
-                <a:latin typeface="なぎの" charset="-120"/>
-                <a:ea typeface="なぎの" charset="-120"/>
-                <a:cs typeface="なぎの" charset="-120"/>
-              </a:rPr>
-              <a:t>使用ツール</a:t>
-            </a:r>
-            <a:r>
-              <a:rPr lang="en-US" altLang="ja-JP" sz="2800" dirty="0">
-                <a:solidFill>
-                  <a:srgbClr val="C00000"/>
-                </a:solidFill>
-                <a:latin typeface="なぎの" charset="-120"/>
-                <a:ea typeface="なぎの" charset="-120"/>
-                <a:cs typeface="なぎの" charset="-120"/>
-              </a:rPr>
-              <a:t>	</a:t>
-            </a:r>
-            <a:r>
-              <a:rPr lang="en-US" altLang="ja-JP" sz="2800" dirty="0">
-                <a:latin typeface="なぎの" charset="-120"/>
-                <a:ea typeface="なぎの" charset="-120"/>
-                <a:cs typeface="なぎの" charset="-120"/>
-              </a:rPr>
-              <a:t>	</a:t>
-            </a:r>
-            <a:r>
-              <a:rPr lang="en-US" altLang="ja-JP" sz="2800" dirty="0" err="1">
-                <a:solidFill>
-                  <a:schemeClr val="tx2">
-                    <a:lumMod val="75000"/>
-                  </a:schemeClr>
-                </a:solidFill>
-                <a:latin typeface="なぎの" charset="-120"/>
-                <a:ea typeface="なぎの" charset="-120"/>
-                <a:cs typeface="なぎの" charset="-120"/>
-              </a:rPr>
-              <a:t>Neovim</a:t>
-            </a:r>
-            <a:r>
-              <a:rPr lang="en-US" altLang="ja-JP" sz="2800" dirty="0">
-                <a:solidFill>
-                  <a:schemeClr val="tx2">
-                    <a:lumMod val="75000"/>
-                  </a:schemeClr>
-                </a:solidFill>
-                <a:latin typeface="なぎの" charset="-120"/>
-                <a:ea typeface="なぎの" charset="-120"/>
-                <a:cs typeface="なぎの" charset="-120"/>
-              </a:rPr>
-              <a:t> with </a:t>
-            </a:r>
-            <a:r>
-              <a:rPr lang="en-US" altLang="ja-JP" sz="2800" dirty="0" err="1">
-                <a:solidFill>
-                  <a:schemeClr val="tx2">
-                    <a:lumMod val="75000"/>
-                  </a:schemeClr>
-                </a:solidFill>
-                <a:latin typeface="なぎの" charset="-120"/>
-                <a:ea typeface="なぎの" charset="-120"/>
-                <a:cs typeface="なぎの" charset="-120"/>
-              </a:rPr>
-              <a:t>VSCode</a:t>
-            </a:r>
-            <a:endParaRPr lang="en-US" altLang="ja-JP" sz="2800" dirty="0">
-              <a:solidFill>
-                <a:schemeClr val="tx2">
-                  <a:lumMod val="75000"/>
-                </a:schemeClr>
-              </a:solidFill>
-              <a:latin typeface="なぎの" charset="-120"/>
-              <a:ea typeface="なぎの" charset="-120"/>
-              <a:cs typeface="なぎの" charset="-120"/>
-            </a:endParaRPr>
-          </a:p>
-          <a:p>
-            <a:r>
-              <a:rPr lang="en-US" altLang="ja-JP" sz="2800" dirty="0">
-                <a:solidFill>
-                  <a:schemeClr val="tx2">
-                    <a:lumMod val="75000"/>
-                  </a:schemeClr>
-                </a:solidFill>
-                <a:latin typeface="なぎの" charset="-120"/>
-                <a:ea typeface="なぎの" charset="-120"/>
-                <a:cs typeface="なぎの" charset="-120"/>
-              </a:rPr>
-              <a:t>			GIMP</a:t>
-            </a:r>
-            <a:endParaRPr lang="en-US" altLang="ja-JP" sz="2800" dirty="0">
-              <a:solidFill>
-                <a:schemeClr val="tx2">
-                  <a:lumMod val="75000"/>
-                </a:schemeClr>
-              </a:solidFill>
-              <a:latin typeface="なぎの" charset="-120"/>
-              <a:ea typeface="なぎの" charset="-120"/>
-              <a:cs typeface="なぎの" charset="-120"/>
-            </a:endParaRPr>
-          </a:p>
-          <a:p>
-            <a:r>
-              <a:rPr lang="en-US" altLang="ja-JP" sz="2800" dirty="0">
-                <a:solidFill>
-                  <a:schemeClr val="tx2">
-                    <a:lumMod val="75000"/>
-                  </a:schemeClr>
-                </a:solidFill>
-                <a:latin typeface="なぎの" charset="-120"/>
-                <a:ea typeface="なぎの" charset="-120"/>
-                <a:cs typeface="なぎの" charset="-120"/>
-              </a:rPr>
-              <a:t>			Git</a:t>
-            </a:r>
-            <a:endParaRPr lang="en-US" altLang="ja-JP" sz="2800" dirty="0">
-              <a:solidFill>
-                <a:schemeClr val="tx2">
-                  <a:lumMod val="75000"/>
-                </a:schemeClr>
-              </a:solidFill>
-              <a:latin typeface="なぎの" charset="-120"/>
-              <a:ea typeface="なぎの" charset="-120"/>
-              <a:cs typeface="なぎの" charset="-120"/>
-            </a:endParaRPr>
-          </a:p>
-          <a:p>
-            <a:r>
-              <a:rPr lang="en-US" altLang="ja-JP" sz="2800" dirty="0">
-                <a:solidFill>
-                  <a:schemeClr val="tx2">
-                    <a:lumMod val="75000"/>
-                  </a:schemeClr>
-                </a:solidFill>
-                <a:latin typeface="なぎの" charset="-120"/>
-                <a:ea typeface="なぎの" charset="-120"/>
-                <a:cs typeface="なぎの" charset="-120"/>
-              </a:rPr>
-              <a:t>			Google Bard</a:t>
-            </a:r>
-            <a:endParaRPr lang="en-US" altLang="ja-JP" sz="2800" dirty="0">
-              <a:solidFill>
-                <a:schemeClr val="tx2">
-                  <a:lumMod val="75000"/>
-                </a:schemeClr>
-              </a:solidFill>
-              <a:latin typeface="なぎの" charset="-120"/>
-              <a:ea typeface="なぎの" charset="-120"/>
-              <a:cs typeface="なぎの" charset="-120"/>
-            </a:endParaRPr>
-          </a:p>
-          <a:p>
-            <a:r>
-              <a:rPr lang="en-US" altLang="ja-JP" sz="2800" dirty="0">
-                <a:solidFill>
-                  <a:schemeClr val="tx2">
-                    <a:lumMod val="75000"/>
-                  </a:schemeClr>
-                </a:solidFill>
-                <a:latin typeface="なぎの" charset="-120"/>
-                <a:ea typeface="なぎの" charset="-120"/>
-                <a:cs typeface="なぎの" charset="-120"/>
-              </a:rPr>
-              <a:t>			Notion</a:t>
-            </a:r>
-            <a:endParaRPr lang="en-US" altLang="ja-JP" sz="2800" dirty="0">
-              <a:solidFill>
-                <a:schemeClr val="tx2">
-                  <a:lumMod val="75000"/>
-                </a:schemeClr>
-              </a:solidFill>
-              <a:latin typeface="なぎの" charset="-120"/>
-              <a:ea typeface="なぎの" charset="-120"/>
-              <a:cs typeface="なぎの" charset="-120"/>
             </a:endParaRPr>
           </a:p>
         </p:txBody>

</xml_diff>

<commit_message>
TRUE FINISHED GAME DEV!
</commit_message>
<xml_diff>
--- a/kikaku/potato_kikakusho.pptx
+++ b/kikaku/potato_kikakusho.pptx
@@ -8,16 +8,15 @@
     <p:notesMasterId r:id="rId4"/>
   </p:notesMasterIdLst>
   <p:handoutMasterIdLst>
-    <p:handoutMasterId r:id="rId11"/>
+    <p:handoutMasterId r:id="rId10"/>
   </p:handoutMasterIdLst>
   <p:sldIdLst>
     <p:sldId id="256" r:id="rId3"/>
     <p:sldId id="262" r:id="rId5"/>
     <p:sldId id="267" r:id="rId6"/>
     <p:sldId id="265" r:id="rId7"/>
-    <p:sldId id="271" r:id="rId8"/>
-    <p:sldId id="257" r:id="rId9"/>
-    <p:sldId id="259" r:id="rId10"/>
+    <p:sldId id="257" r:id="rId8"/>
+    <p:sldId id="259" r:id="rId9"/>
   </p:sldIdLst>
   <p:sldSz cx="12192000" cy="6858000"/>
   <p:notesSz cx="6858000" cy="9144000"/>
@@ -5277,7 +5276,184 @@
           </a:p>
           <a:p>
             <a:pPr indent="457200" algn="l"/>
+            <a:endParaRPr lang="ja-JP" altLang="en-US" sz="2000" i="0" dirty="0">
+              <a:solidFill>
+                <a:schemeClr val="tx2">
+                  <a:lumMod val="75000"/>
+                </a:schemeClr>
+              </a:solidFill>
+              <a:effectLst/>
+              <a:latin typeface="なぎの" charset="-120"/>
+              <a:ea typeface="なぎの" charset="-120"/>
+            </a:endParaRPr>
+          </a:p>
+          <a:p>
+            <a:pPr algn="l"/>
+            <a:r>
+              <a:rPr lang="ja-JP" altLang="en-US" sz="2000" i="0" dirty="0">
+                <a:solidFill>
+                  <a:schemeClr val="tx2">
+                    <a:lumMod val="75000"/>
+                  </a:schemeClr>
+                </a:solidFill>
+                <a:effectLst/>
+                <a:latin typeface="なぎの" charset="-120"/>
+                <a:ea typeface="なぎの" charset="-120"/>
+              </a:rPr>
+              <a:t>・</a:t>
+            </a:r>
+            <a:r>
+              <a:rPr lang="ja-JP" altLang="en-US" sz="2000" i="0" dirty="0">
+                <a:solidFill>
+                  <a:schemeClr val="accent2"/>
+                </a:solidFill>
+                <a:effectLst/>
+                <a:latin typeface="なぎの" charset="-120"/>
+                <a:ea typeface="なぎの" charset="-120"/>
+              </a:rPr>
+              <a:t>ニンジン</a:t>
+            </a:r>
+            <a:endParaRPr lang="ja-JP" altLang="en-US" sz="2000" i="0" dirty="0">
+              <a:solidFill>
+                <a:schemeClr val="tx2">
+                  <a:lumMod val="75000"/>
+                </a:schemeClr>
+              </a:solidFill>
+              <a:effectLst/>
+              <a:latin typeface="なぎの" charset="-120"/>
+              <a:ea typeface="なぎの" charset="-120"/>
+            </a:endParaRPr>
+          </a:p>
+          <a:p>
+            <a:pPr indent="457200" algn="l"/>
+            <a:r>
+              <a:rPr lang="ja-JP" altLang="en-US" i="0" dirty="0">
+                <a:solidFill>
+                  <a:schemeClr val="tx2">
+                    <a:lumMod val="75000"/>
+                  </a:schemeClr>
+                </a:solidFill>
+                <a:effectLst/>
+                <a:latin typeface="なぎの" charset="-120"/>
+                <a:ea typeface="なぎの" charset="-120"/>
+              </a:rPr>
+              <a:t>何回か踏むと壊れてしまう。</a:t>
+            </a:r>
             <a:endParaRPr lang="ja-JP" altLang="en-US" i="0" dirty="0">
+              <a:solidFill>
+                <a:schemeClr val="tx2">
+                  <a:lumMod val="75000"/>
+                </a:schemeClr>
+              </a:solidFill>
+              <a:effectLst/>
+              <a:latin typeface="なぎの" charset="-120"/>
+              <a:ea typeface="なぎの" charset="-120"/>
+            </a:endParaRPr>
+          </a:p>
+          <a:p>
+            <a:pPr indent="457200" algn="l"/>
+            <a:r>
+              <a:rPr lang="ja-JP" altLang="en-US" i="0" dirty="0">
+                <a:solidFill>
+                  <a:srgbClr val="FF0000"/>
+                </a:solidFill>
+                <a:effectLst/>
+                <a:latin typeface="なぎの" charset="-120"/>
+                <a:ea typeface="なぎの" charset="-120"/>
+              </a:rPr>
+              <a:t>🍅</a:t>
+            </a:r>
+            <a:r>
+              <a:rPr lang="ja-JP" altLang="en-US" i="0" dirty="0">
+                <a:solidFill>
+                  <a:schemeClr val="tx2">
+                    <a:lumMod val="75000"/>
+                  </a:schemeClr>
+                </a:solidFill>
+                <a:effectLst/>
+                <a:latin typeface="なぎの" charset="-120"/>
+                <a:ea typeface="なぎの" charset="-120"/>
+              </a:rPr>
+              <a:t>が死ぬと復活する。</a:t>
+            </a:r>
+            <a:endParaRPr lang="ja-JP" altLang="en-US" i="0" dirty="0">
+              <a:solidFill>
+                <a:schemeClr val="tx2">
+                  <a:lumMod val="75000"/>
+                </a:schemeClr>
+              </a:solidFill>
+              <a:effectLst/>
+              <a:latin typeface="なぎの" charset="-120"/>
+              <a:ea typeface="なぎの" charset="-120"/>
+            </a:endParaRPr>
+          </a:p>
+          <a:p>
+            <a:pPr indent="457200" algn="l"/>
+            <a:endParaRPr lang="ja-JP" altLang="en-US" i="0" dirty="0">
+              <a:solidFill>
+                <a:schemeClr val="tx2">
+                  <a:lumMod val="75000"/>
+                </a:schemeClr>
+              </a:solidFill>
+              <a:effectLst/>
+              <a:latin typeface="なぎの" charset="-120"/>
+              <a:ea typeface="なぎの" charset="-120"/>
+            </a:endParaRPr>
+          </a:p>
+          <a:p>
+            <a:pPr lvl="0" indent="0" algn="l" fontAlgn="auto"/>
+            <a:r>
+              <a:rPr lang="ja-JP" altLang="en-US" dirty="0">
+                <a:solidFill>
+                  <a:schemeClr val="tx2">
+                    <a:lumMod val="75000"/>
+                  </a:schemeClr>
+                </a:solidFill>
+                <a:effectLst/>
+                <a:latin typeface="なぎの" charset="-120"/>
+                <a:ea typeface="なぎの" charset="-120"/>
+                <a:sym typeface="+mn-ea"/>
+              </a:rPr>
+              <a:t>・</a:t>
+            </a:r>
+            <a:r>
+              <a:rPr lang="ja-JP" altLang="en-US" dirty="0">
+                <a:solidFill>
+                  <a:srgbClr val="FF0000"/>
+                </a:solidFill>
+                <a:effectLst/>
+                <a:latin typeface="なぎの" charset="-120"/>
+                <a:ea typeface="なぎの" charset="-120"/>
+                <a:sym typeface="+mn-ea"/>
+              </a:rPr>
+              <a:t>トウガラシ</a:t>
+            </a:r>
+            <a:endParaRPr lang="ja-JP" altLang="en-US" i="0" dirty="0">
+              <a:solidFill>
+                <a:srgbClr val="FF0000"/>
+              </a:solidFill>
+              <a:effectLst/>
+              <a:latin typeface="なぎの" charset="-120"/>
+              <a:ea typeface="なぎの" charset="-120"/>
+            </a:endParaRPr>
+          </a:p>
+          <a:p>
+            <a:pPr lvl="0" indent="457200" algn="l" fontAlgn="auto"/>
+            <a:r>
+              <a:rPr lang="ja-JP" altLang="en-US" dirty="0">
+                <a:solidFill>
+                  <a:schemeClr val="tx2">
+                    <a:lumMod val="75000"/>
+                  </a:schemeClr>
+                </a:solidFill>
+                <a:effectLst/>
+                <a:latin typeface="なぎの" charset="-120"/>
+                <a:ea typeface="なぎの" charset="-120"/>
+                <a:sym typeface="+mn-ea"/>
+              </a:rPr>
+              <a:t>触れると全身が痺れ、死んでしまう。</a:t>
+            </a:r>
+            <a:endParaRPr lang="ja-JP" altLang="en-US" dirty="0">
               <a:solidFill>
                 <a:schemeClr val="tx2">
                   <a:lumMod val="75000"/>
@@ -5290,6 +5466,84 @@
             </a:endParaRPr>
           </a:p>
           <a:p>
+            <a:pPr lvl="0" indent="457200" algn="l" fontAlgn="auto"/>
+            <a:endParaRPr lang="ja-JP" altLang="en-US" i="0" dirty="0">
+              <a:solidFill>
+                <a:schemeClr val="tx2">
+                  <a:lumMod val="75000"/>
+                </a:schemeClr>
+              </a:solidFill>
+              <a:effectLst/>
+              <a:latin typeface="なぎの" charset="-120"/>
+              <a:ea typeface="なぎの" charset="-120"/>
+            </a:endParaRPr>
+          </a:p>
+          <a:p>
+            <a:pPr indent="0" algn="l"/>
+            <a:r>
+              <a:rPr lang="ja-JP" altLang="en-US" dirty="0">
+                <a:solidFill>
+                  <a:schemeClr val="tx2">
+                    <a:lumMod val="75000"/>
+                  </a:schemeClr>
+                </a:solidFill>
+                <a:effectLst/>
+                <a:latin typeface="なぎの" charset="-120"/>
+                <a:ea typeface="なぎの" charset="-120"/>
+                <a:sym typeface="+mn-ea"/>
+              </a:rPr>
+              <a:t>・</a:t>
+            </a:r>
+            <a:r>
+              <a:rPr lang="ja-JP" altLang="en-US" dirty="0">
+                <a:solidFill>
+                  <a:schemeClr val="accent5"/>
+                </a:solidFill>
+                <a:effectLst/>
+                <a:latin typeface="なぎの" charset="-120"/>
+                <a:ea typeface="なぎの" charset="-120"/>
+                <a:sym typeface="+mn-ea"/>
+              </a:rPr>
+              <a:t>パソコン</a:t>
+            </a:r>
+            <a:endParaRPr lang="ja-JP" altLang="en-US" i="0" dirty="0">
+              <a:solidFill>
+                <a:schemeClr val="accent1"/>
+              </a:solidFill>
+              <a:effectLst/>
+              <a:latin typeface="なぎの" charset="-120"/>
+              <a:ea typeface="なぎの" charset="-120"/>
+            </a:endParaRPr>
+          </a:p>
+          <a:p>
+            <a:pPr indent="457200" algn="l"/>
+            <a:r>
+              <a:rPr lang="ja-JP" altLang="en-US" dirty="0">
+                <a:solidFill>
+                  <a:schemeClr val="tx2">
+                    <a:lumMod val="75000"/>
+                  </a:schemeClr>
+                </a:solidFill>
+                <a:effectLst/>
+                <a:latin typeface="なぎの" charset="-120"/>
+                <a:ea typeface="なぎの" charset="-120"/>
+                <a:sym typeface="+mn-ea"/>
+              </a:rPr>
+              <a:t>チェックポイント。</a:t>
+            </a:r>
+            <a:endParaRPr lang="ja-JP" altLang="en-US" dirty="0">
+              <a:solidFill>
+                <a:schemeClr val="tx2">
+                  <a:lumMod val="75000"/>
+                </a:schemeClr>
+              </a:solidFill>
+              <a:effectLst/>
+              <a:latin typeface="なぎの" charset="-120"/>
+              <a:ea typeface="なぎの" charset="-120"/>
+              <a:sym typeface="+mn-ea"/>
+            </a:endParaRPr>
+          </a:p>
+          <a:p>
             <a:pPr indent="457200" algn="l"/>
             <a:endParaRPr lang="ja-JP" altLang="en-US" i="0" dirty="0">
               <a:solidFill>
@@ -5300,12 +5554,78 @@
               <a:effectLst/>
               <a:latin typeface="なぎの" charset="-120"/>
               <a:ea typeface="なぎの" charset="-120"/>
+            </a:endParaRPr>
+          </a:p>
+          <a:p>
+            <a:pPr indent="0" algn="l"/>
+            <a:r>
+              <a:rPr lang="ja-JP" altLang="en-US" dirty="0">
+                <a:solidFill>
+                  <a:schemeClr val="tx2">
+                    <a:lumMod val="75000"/>
+                  </a:schemeClr>
+                </a:solidFill>
+                <a:effectLst/>
+                <a:latin typeface="なぎの" charset="-120"/>
+                <a:ea typeface="なぎの" charset="-120"/>
+                <a:sym typeface="+mn-ea"/>
+              </a:rPr>
+              <a:t>・</a:t>
+            </a:r>
+            <a:r>
+              <a:rPr lang="ja-JP" altLang="en-US" dirty="0">
+                <a:effectLst/>
+                <a:latin typeface="なぎの" charset="-120"/>
+                <a:ea typeface="なぎの" charset="-120"/>
+                <a:sym typeface="+mn-ea"/>
+              </a:rPr>
+              <a:t>カメラのズームイン</a:t>
+            </a:r>
+            <a:r>
+              <a:rPr lang="en-US" altLang="ja-JP" dirty="0">
+                <a:effectLst/>
+                <a:latin typeface="なぎの" charset="-120"/>
+                <a:ea typeface="なぎの" charset="-120"/>
+                <a:sym typeface="+mn-ea"/>
+              </a:rPr>
+              <a:t>/</a:t>
+            </a:r>
+            <a:r>
+              <a:rPr lang="ja-JP" altLang="en-US" dirty="0">
+                <a:effectLst/>
+                <a:latin typeface="なぎの" charset="-120"/>
+                <a:ea typeface="なぎの" charset="-120"/>
+                <a:sym typeface="+mn-ea"/>
+              </a:rPr>
+              <a:t>アウト</a:t>
+            </a:r>
+            <a:endParaRPr lang="ja-JP" altLang="en-US" dirty="0">
+              <a:solidFill>
+                <a:schemeClr val="tx1"/>
+              </a:solidFill>
+              <a:effectLst/>
+              <a:latin typeface="なぎの" charset="-120"/>
+              <a:ea typeface="なぎの" charset="-120"/>
               <a:sym typeface="+mn-ea"/>
             </a:endParaRPr>
           </a:p>
           <a:p>
             <a:pPr indent="457200" algn="l"/>
-            <a:endParaRPr lang="ja-JP" altLang="en-US" i="0" dirty="0">
+            <a:r>
+              <a:rPr lang="ja-JP" altLang="en-US" dirty="0">
+                <a:solidFill>
+                  <a:schemeClr val="tx2">
+                    <a:lumMod val="75000"/>
+                  </a:schemeClr>
+                </a:solidFill>
+                <a:effectLst/>
+                <a:latin typeface="なぎの" charset="-120"/>
+                <a:ea typeface="なぎの" charset="-120"/>
+                <a:sym typeface="+mn-ea"/>
+              </a:rPr>
+              <a:t>死角にある情報を収集する。</a:t>
+            </a:r>
+            <a:endParaRPr lang="ja-JP" altLang="en-US" dirty="0">
               <a:solidFill>
                 <a:schemeClr val="tx2">
                   <a:lumMod val="75000"/>
@@ -5319,7 +5639,21 @@
           </a:p>
           <a:p>
             <a:pPr indent="457200" algn="l"/>
-            <a:endParaRPr lang="ja-JP" altLang="en-US" i="0" dirty="0">
+            <a:r>
+              <a:rPr lang="ja-JP" altLang="en-US" dirty="0">
+                <a:solidFill>
+                  <a:schemeClr val="tx2">
+                    <a:lumMod val="75000"/>
+                  </a:schemeClr>
+                </a:solidFill>
+                <a:effectLst/>
+                <a:latin typeface="なぎの" charset="-120"/>
+                <a:ea typeface="なぎの" charset="-120"/>
+                <a:sym typeface="+mn-ea"/>
+              </a:rPr>
+              <a:t>または、位置の調節用。</a:t>
+            </a:r>
+            <a:endParaRPr lang="ja-JP" altLang="en-US" dirty="0">
               <a:solidFill>
                 <a:schemeClr val="tx2">
                   <a:lumMod val="75000"/>
@@ -5332,22 +5666,9 @@
             </a:endParaRPr>
           </a:p>
           <a:p>
-            <a:pPr algn="l"/>
-            <a:endParaRPr lang="ja-JP" altLang="en-US" sz="2000" i="0" dirty="0">
-              <a:solidFill>
-                <a:schemeClr val="tx2">
-                  <a:lumMod val="75000"/>
-                </a:schemeClr>
-              </a:solidFill>
-              <a:effectLst/>
-              <a:latin typeface="なぎの" charset="-120"/>
-              <a:ea typeface="なぎの" charset="-120"/>
-            </a:endParaRPr>
-          </a:p>
-          <a:p>
-            <a:pPr algn="l"/>
-            <a:r>
-              <a:rPr lang="ja-JP" altLang="en-US" sz="2000" i="0" dirty="0">
+            <a:pPr indent="457200" algn="l"/>
+            <a:r>
+              <a:rPr lang="ja-JP" altLang="en-US" dirty="0">
                 <a:solidFill>
                   <a:schemeClr val="tx2">
                     <a:lumMod val="75000"/>
@@ -5356,35 +5677,12 @@
                 <a:effectLst/>
                 <a:latin typeface="なぎの" charset="-120"/>
                 <a:ea typeface="なぎの" charset="-120"/>
-              </a:rPr>
-              <a:t>・</a:t>
-            </a:r>
-            <a:r>
-              <a:rPr lang="ja-JP" altLang="en-US" sz="2000" i="0" dirty="0">
-                <a:solidFill>
-                  <a:schemeClr val="accent2"/>
-                </a:solidFill>
-                <a:effectLst/>
-                <a:latin typeface="なぎの" charset="-120"/>
-                <a:ea typeface="なぎの" charset="-120"/>
-              </a:rPr>
-              <a:t>ニンジン</a:t>
-            </a:r>
-            <a:endParaRPr lang="ja-JP" altLang="en-US" sz="2000" i="0" dirty="0">
-              <a:solidFill>
-                <a:schemeClr val="tx2">
-                  <a:lumMod val="75000"/>
-                </a:schemeClr>
-              </a:solidFill>
-              <a:effectLst/>
-              <a:latin typeface="なぎの" charset="-120"/>
-              <a:ea typeface="なぎの" charset="-120"/>
-            </a:endParaRPr>
-          </a:p>
-          <a:p>
-            <a:pPr indent="457200" algn="l"/>
-            <a:r>
-              <a:rPr lang="ja-JP" altLang="en-US" i="0" dirty="0">
+                <a:sym typeface="+mn-ea"/>
+              </a:rPr>
+              <a:t>ステージ</a:t>
+            </a:r>
+            <a:r>
+              <a:rPr lang="en-US" altLang="ja-JP" dirty="0">
                 <a:solidFill>
                   <a:schemeClr val="tx2">
                     <a:lumMod val="75000"/>
@@ -5393,35 +5691,12 @@
                 <a:effectLst/>
                 <a:latin typeface="なぎの" charset="-120"/>
                 <a:ea typeface="なぎの" charset="-120"/>
-              </a:rPr>
-              <a:t>何回か踏むと壊れてしまう。</a:t>
-            </a:r>
-            <a:endParaRPr lang="ja-JP" altLang="en-US" i="0" dirty="0">
-              <a:solidFill>
-                <a:schemeClr val="tx2">
-                  <a:lumMod val="75000"/>
-                </a:schemeClr>
-              </a:solidFill>
-              <a:effectLst/>
-              <a:latin typeface="なぎの" charset="-120"/>
-              <a:ea typeface="なぎの" charset="-120"/>
-            </a:endParaRPr>
-          </a:p>
-          <a:p>
-            <a:pPr indent="457200" algn="l"/>
-            <a:r>
-              <a:rPr lang="ja-JP" altLang="en-US" i="0" dirty="0">
-                <a:solidFill>
-                  <a:srgbClr val="FF0000"/>
-                </a:solidFill>
-                <a:effectLst/>
-                <a:latin typeface="なぎの" charset="-120"/>
-                <a:ea typeface="なぎの" charset="-120"/>
-              </a:rPr>
-              <a:t>🍅</a:t>
-            </a:r>
-            <a:r>
-              <a:rPr lang="ja-JP" altLang="en-US" i="0" dirty="0">
+                <a:sym typeface="+mn-ea"/>
+              </a:rPr>
+              <a:t>2</a:t>
+            </a:r>
+            <a:r>
+              <a:rPr lang="ja-JP" altLang="en-US" dirty="0">
                 <a:solidFill>
                   <a:schemeClr val="tx2">
                     <a:lumMod val="75000"/>
@@ -5430,22 +5705,10 @@
                 <a:effectLst/>
                 <a:latin typeface="なぎの" charset="-120"/>
                 <a:ea typeface="なぎの" charset="-120"/>
-              </a:rPr>
-              <a:t>が死ぬと復活する。</a:t>
-            </a:r>
-            <a:endParaRPr lang="ja-JP" altLang="en-US" i="0" dirty="0">
-              <a:solidFill>
-                <a:schemeClr val="tx2">
-                  <a:lumMod val="75000"/>
-                </a:schemeClr>
-              </a:solidFill>
-              <a:effectLst/>
-              <a:latin typeface="なぎの" charset="-120"/>
-              <a:ea typeface="なぎの" charset="-120"/>
-            </a:endParaRPr>
-          </a:p>
-          <a:p>
-            <a:pPr indent="457200" algn="l"/>
+                <a:sym typeface="+mn-ea"/>
+              </a:rPr>
+              <a:t>で作る予定だったが、時間的に実装できなかったためボツ。</a:t>
+            </a:r>
             <a:endParaRPr lang="ja-JP" altLang="en-US" dirty="0">
               <a:solidFill>
                 <a:schemeClr val="tx2">
@@ -5540,7 +5803,7 @@
         </p:nvSpPr>
         <p:spPr>
           <a:xfrm>
-            <a:off x="2908300" y="295275"/>
+            <a:off x="1679575" y="303530"/>
             <a:ext cx="6375400" cy="583565"/>
           </a:xfrm>
           <a:prstGeom prst="rect">
@@ -5559,506 +5822,11 @@
                 <a:latin typeface="なぎの" charset="-120"/>
                 <a:ea typeface="なぎの" charset="-120"/>
               </a:rPr>
-              <a:t>ギミック・障害物紹介</a:t>
+              <a:t>ギミック・障害物</a:t>
             </a:r>
             <a:endParaRPr lang="ja-JP" altLang="en-US" sz="3200">
               <a:latin typeface="なぎの" charset="-120"/>
               <a:ea typeface="なぎの" charset="-120"/>
-            </a:endParaRPr>
-          </a:p>
-        </p:txBody>
-      </p:sp>
-    </p:spTree>
-  </p:cSld>
-  <p:clrMapOvr>
-    <a:masterClrMapping/>
-  </p:clrMapOvr>
-  <p:transition/>
-</p:sld>
-</file>
-
-<file path=ppt/slides/slide5.xml><?xml version="1.0" encoding="utf-8"?>
-<p:sld xmlns:a="http://schemas.openxmlformats.org/drawingml/2006/main" xmlns:r="http://schemas.openxmlformats.org/officeDocument/2006/relationships" xmlns:p="http://schemas.openxmlformats.org/presentationml/2006/main">
-  <p:cSld>
-    <p:bg>
-      <p:bgPr>
-        <a:solidFill>
-          <a:schemeClr val="bg1"/>
-        </a:solidFill>
-        <a:effectLst/>
-      </p:bgPr>
-    </p:bg>
-    <p:spTree>
-      <p:nvGrpSpPr>
-        <p:cNvPr id="1" name=""/>
-        <p:cNvGrpSpPr/>
-        <p:nvPr/>
-      </p:nvGrpSpPr>
-      <p:grpSpPr>
-        <a:xfrm>
-          <a:off x="0" y="0"/>
-          <a:ext cx="0" cy="0"/>
-          <a:chOff x="0" y="0"/>
-          <a:chExt cx="0" cy="0"/>
-        </a:xfrm>
-      </p:grpSpPr>
-      <p:sp>
-        <p:nvSpPr>
-          <p:cNvPr id="4" name="タイトル 1"/>
-          <p:cNvSpPr>
-            <a:spLocks noGrp="1"/>
-          </p:cNvSpPr>
-          <p:nvPr/>
-        </p:nvSpPr>
-        <p:spPr>
-          <a:xfrm>
-            <a:off x="838200" y="295275"/>
-            <a:ext cx="10515600" cy="591820"/>
-          </a:xfrm>
-          <a:prstGeom prst="rect">
-            <a:avLst/>
-          </a:prstGeom>
-        </p:spPr>
-        <p:txBody>
-          <a:bodyPr vert="horz" lIns="91440" tIns="45720" rIns="91440" bIns="45720" rtlCol="0" anchor="ctr"/>
-          <a:lstStyle>
-            <a:lvl1pPr algn="l" defTabSz="914400" rtl="0" eaLnBrk="1" latinLnBrk="0" hangingPunct="1">
-              <a:lnSpc>
-                <a:spcPct val="90000"/>
-              </a:lnSpc>
-              <a:spcBef>
-                <a:spcPct val="0"/>
-              </a:spcBef>
-              <a:buNone/>
-              <a:defRPr kumimoji="1" sz="4400" kern="1200">
-                <a:solidFill>
-                  <a:schemeClr val="tx1"/>
-                </a:solidFill>
-                <a:latin typeface="+mj-lt"/>
-                <a:ea typeface="+mj-ea"/>
-                <a:cs typeface="+mj-cs"/>
-              </a:defRPr>
-            </a:lvl1pPr>
-          </a:lstStyle>
-          <a:p>
-            <a:pPr algn="ctr"/>
-            <a:endParaRPr lang="en-US" altLang="ja-JP" sz="4000">
-              <a:latin typeface="FOT-Popハッピネス Std EB" panose="02020900000000000000" charset="-128"/>
-              <a:ea typeface="FOT-Popハッピネス Std EB" panose="02020900000000000000" charset="-128"/>
-            </a:endParaRPr>
-          </a:p>
-        </p:txBody>
-      </p:sp>
-      <p:sp>
-        <p:nvSpPr>
-          <p:cNvPr id="2" name="テキストボックス 1"/>
-          <p:cNvSpPr txBox="1"/>
-          <p:nvPr/>
-        </p:nvSpPr>
-        <p:spPr>
-          <a:xfrm>
-            <a:off x="379730" y="726440"/>
-            <a:ext cx="8382000" cy="5723890"/>
-          </a:xfrm>
-          <a:prstGeom prst="rect">
-            <a:avLst/>
-          </a:prstGeom>
-          <a:noFill/>
-          <a:ln>
-            <a:noFill/>
-          </a:ln>
-        </p:spPr>
-        <p:txBody>
-          <a:bodyPr wrap="square" rtlCol="0">
-            <a:noAutofit/>
-          </a:bodyPr>
-          <a:lstStyle/>
-          <a:p>
-            <a:pPr lvl="0" indent="0" algn="l" fontAlgn="auto"/>
-            <a:r>
-              <a:rPr lang="ja-JP" altLang="en-US" sz="2000" i="0" dirty="0">
-                <a:solidFill>
-                  <a:schemeClr val="tx2">
-                    <a:lumMod val="75000"/>
-                  </a:schemeClr>
-                </a:solidFill>
-                <a:effectLst/>
-                <a:latin typeface="なぎの" charset="-120"/>
-                <a:ea typeface="なぎの" charset="-120"/>
-              </a:rPr>
-              <a:t>・</a:t>
-            </a:r>
-            <a:r>
-              <a:rPr lang="ja-JP" altLang="en-US" sz="2000" i="0" dirty="0">
-                <a:solidFill>
-                  <a:srgbClr val="FF0000"/>
-                </a:solidFill>
-                <a:effectLst/>
-                <a:latin typeface="なぎの" charset="-120"/>
-                <a:ea typeface="なぎの" charset="-120"/>
-              </a:rPr>
-              <a:t>トウガラシ</a:t>
-            </a:r>
-            <a:endParaRPr lang="ja-JP" altLang="en-US" sz="2000" i="0" dirty="0">
-              <a:solidFill>
-                <a:srgbClr val="FF0000"/>
-              </a:solidFill>
-              <a:effectLst/>
-              <a:latin typeface="なぎの" charset="-120"/>
-              <a:ea typeface="なぎの" charset="-120"/>
-            </a:endParaRPr>
-          </a:p>
-          <a:p>
-            <a:pPr lvl="0" indent="457200" algn="l" fontAlgn="auto"/>
-            <a:r>
-              <a:rPr lang="ja-JP" altLang="en-US" i="0" dirty="0">
-                <a:solidFill>
-                  <a:schemeClr val="tx2">
-                    <a:lumMod val="75000"/>
-                  </a:schemeClr>
-                </a:solidFill>
-                <a:effectLst/>
-                <a:latin typeface="なぎの" charset="-120"/>
-                <a:ea typeface="なぎの" charset="-120"/>
-              </a:rPr>
-              <a:t>触れると全身が痺れ、死んでしまう。</a:t>
-            </a:r>
-            <a:endParaRPr lang="ja-JP" altLang="en-US" i="0" dirty="0">
-              <a:solidFill>
-                <a:schemeClr val="tx2">
-                  <a:lumMod val="75000"/>
-                </a:schemeClr>
-              </a:solidFill>
-              <a:effectLst/>
-              <a:latin typeface="なぎの" charset="-120"/>
-              <a:ea typeface="なぎの" charset="-120"/>
-            </a:endParaRPr>
-          </a:p>
-          <a:p>
-            <a:pPr lvl="0" indent="457200" algn="l" fontAlgn="auto"/>
-            <a:endParaRPr lang="ja-JP" altLang="en-US" i="0" dirty="0">
-              <a:solidFill>
-                <a:schemeClr val="tx2">
-                  <a:lumMod val="75000"/>
-                </a:schemeClr>
-              </a:solidFill>
-              <a:effectLst/>
-              <a:latin typeface="なぎの" charset="-120"/>
-              <a:ea typeface="なぎの" charset="-120"/>
-            </a:endParaRPr>
-          </a:p>
-          <a:p>
-            <a:pPr lvl="0" indent="457200" algn="l" fontAlgn="auto"/>
-            <a:endParaRPr lang="ja-JP" altLang="en-US" i="0" dirty="0">
-              <a:solidFill>
-                <a:schemeClr val="tx2">
-                  <a:lumMod val="75000"/>
-                </a:schemeClr>
-              </a:solidFill>
-              <a:effectLst/>
-              <a:latin typeface="なぎの" charset="-120"/>
-              <a:ea typeface="なぎの" charset="-120"/>
-            </a:endParaRPr>
-          </a:p>
-          <a:p>
-            <a:pPr indent="457200" algn="l"/>
-            <a:endParaRPr lang="ja-JP" altLang="en-US" sz="2000" i="0" dirty="0">
-              <a:solidFill>
-                <a:schemeClr val="tx2">
-                  <a:lumMod val="75000"/>
-                </a:schemeClr>
-              </a:solidFill>
-              <a:effectLst/>
-              <a:latin typeface="なぎの" charset="-120"/>
-              <a:ea typeface="なぎの" charset="-120"/>
-            </a:endParaRPr>
-          </a:p>
-          <a:p>
-            <a:pPr indent="0" algn="l"/>
-            <a:r>
-              <a:rPr lang="ja-JP" altLang="en-US" sz="2000" i="0" dirty="0">
-                <a:solidFill>
-                  <a:schemeClr val="tx2">
-                    <a:lumMod val="75000"/>
-                  </a:schemeClr>
-                </a:solidFill>
-                <a:effectLst/>
-                <a:latin typeface="なぎの" charset="-120"/>
-                <a:ea typeface="なぎの" charset="-120"/>
-              </a:rPr>
-              <a:t>・</a:t>
-            </a:r>
-            <a:r>
-              <a:rPr lang="ja-JP" altLang="en-US" sz="2000" i="0" dirty="0">
-                <a:solidFill>
-                  <a:schemeClr val="accent5"/>
-                </a:solidFill>
-                <a:effectLst/>
-                <a:latin typeface="なぎの" charset="-120"/>
-                <a:ea typeface="なぎの" charset="-120"/>
-              </a:rPr>
-              <a:t>パソコン</a:t>
-            </a:r>
-            <a:endParaRPr lang="ja-JP" altLang="en-US" sz="2000" i="0" dirty="0">
-              <a:solidFill>
-                <a:schemeClr val="accent1"/>
-              </a:solidFill>
-              <a:effectLst/>
-              <a:latin typeface="なぎの" charset="-120"/>
-              <a:ea typeface="なぎの" charset="-120"/>
-            </a:endParaRPr>
-          </a:p>
-          <a:p>
-            <a:pPr indent="457200" algn="l"/>
-            <a:r>
-              <a:rPr lang="ja-JP" altLang="en-US" i="0" dirty="0">
-                <a:solidFill>
-                  <a:schemeClr val="tx2">
-                    <a:lumMod val="75000"/>
-                  </a:schemeClr>
-                </a:solidFill>
-                <a:effectLst/>
-                <a:latin typeface="なぎの" charset="-120"/>
-                <a:ea typeface="なぎの" charset="-120"/>
-              </a:rPr>
-              <a:t>チェックポイント。</a:t>
-            </a:r>
-            <a:endParaRPr lang="ja-JP" altLang="en-US" i="0" dirty="0">
-              <a:solidFill>
-                <a:schemeClr val="tx2">
-                  <a:lumMod val="75000"/>
-                </a:schemeClr>
-              </a:solidFill>
-              <a:effectLst/>
-              <a:latin typeface="なぎの" charset="-120"/>
-              <a:ea typeface="なぎの" charset="-120"/>
-            </a:endParaRPr>
-          </a:p>
-          <a:p>
-            <a:pPr indent="457200" algn="l"/>
-            <a:endParaRPr lang="ja-JP" altLang="en-US" sz="2000" i="0" dirty="0">
-              <a:solidFill>
-                <a:schemeClr val="tx2">
-                  <a:lumMod val="75000"/>
-                </a:schemeClr>
-              </a:solidFill>
-              <a:effectLst/>
-              <a:latin typeface="なぎの" charset="-120"/>
-              <a:ea typeface="なぎの" charset="-120"/>
-            </a:endParaRPr>
-          </a:p>
-          <a:p>
-            <a:pPr indent="457200" algn="l"/>
-            <a:endParaRPr lang="ja-JP" altLang="en-US" sz="2000" i="0" dirty="0">
-              <a:solidFill>
-                <a:schemeClr val="tx2">
-                  <a:lumMod val="75000"/>
-                </a:schemeClr>
-              </a:solidFill>
-              <a:effectLst/>
-              <a:latin typeface="なぎの" charset="-120"/>
-              <a:ea typeface="なぎの" charset="-120"/>
-            </a:endParaRPr>
-          </a:p>
-          <a:p>
-            <a:pPr indent="457200" algn="l"/>
-            <a:endParaRPr lang="ja-JP" altLang="en-US" sz="2000" i="0" dirty="0">
-              <a:solidFill>
-                <a:schemeClr val="tx2">
-                  <a:lumMod val="75000"/>
-                </a:schemeClr>
-              </a:solidFill>
-              <a:effectLst/>
-              <a:latin typeface="なぎの" charset="-120"/>
-              <a:ea typeface="なぎの" charset="-120"/>
-            </a:endParaRPr>
-          </a:p>
-          <a:p>
-            <a:pPr indent="0" algn="l"/>
-            <a:r>
-              <a:rPr lang="ja-JP" altLang="en-US" sz="2000" dirty="0">
-                <a:solidFill>
-                  <a:schemeClr val="tx2">
-                    <a:lumMod val="75000"/>
-                  </a:schemeClr>
-                </a:solidFill>
-                <a:effectLst/>
-                <a:latin typeface="なぎの" charset="-120"/>
-                <a:ea typeface="なぎの" charset="-120"/>
-                <a:sym typeface="+mn-ea"/>
-              </a:rPr>
-              <a:t>・</a:t>
-            </a:r>
-            <a:r>
-              <a:rPr lang="ja-JP" altLang="en-US" sz="2000" dirty="0">
-                <a:solidFill>
-                  <a:schemeClr val="tx1"/>
-                </a:solidFill>
-                <a:effectLst/>
-                <a:latin typeface="なぎの" charset="-120"/>
-                <a:ea typeface="なぎの" charset="-120"/>
-                <a:sym typeface="+mn-ea"/>
-              </a:rPr>
-              <a:t>カメラのズームイン</a:t>
-            </a:r>
-            <a:r>
-              <a:rPr lang="en-US" altLang="ja-JP" sz="2000" dirty="0">
-                <a:solidFill>
-                  <a:schemeClr val="tx1"/>
-                </a:solidFill>
-                <a:effectLst/>
-                <a:latin typeface="なぎの" charset="-120"/>
-                <a:ea typeface="なぎの" charset="-120"/>
-                <a:sym typeface="+mn-ea"/>
-              </a:rPr>
-              <a:t>/</a:t>
-            </a:r>
-            <a:r>
-              <a:rPr lang="ja-JP" altLang="en-US" sz="2000" dirty="0">
-                <a:solidFill>
-                  <a:schemeClr val="tx1"/>
-                </a:solidFill>
-                <a:effectLst/>
-                <a:latin typeface="なぎの" charset="-120"/>
-                <a:ea typeface="なぎの" charset="-120"/>
-                <a:sym typeface="+mn-ea"/>
-              </a:rPr>
-              <a:t>アウト</a:t>
-            </a:r>
-            <a:endParaRPr lang="ja-JP" altLang="en-US" sz="2000" dirty="0">
-              <a:solidFill>
-                <a:schemeClr val="tx1"/>
-              </a:solidFill>
-              <a:effectLst/>
-              <a:latin typeface="なぎの" charset="-120"/>
-              <a:ea typeface="なぎの" charset="-120"/>
-              <a:sym typeface="+mn-ea"/>
-            </a:endParaRPr>
-          </a:p>
-          <a:p>
-            <a:pPr indent="457200" algn="l"/>
-            <a:r>
-              <a:rPr lang="ja-JP" altLang="en-US" dirty="0">
-                <a:solidFill>
-                  <a:schemeClr val="tx2">
-                    <a:lumMod val="75000"/>
-                  </a:schemeClr>
-                </a:solidFill>
-                <a:effectLst/>
-                <a:latin typeface="なぎの" charset="-120"/>
-                <a:ea typeface="なぎの" charset="-120"/>
-                <a:sym typeface="+mn-ea"/>
-              </a:rPr>
-              <a:t>死角にある情報を収集する。</a:t>
-            </a:r>
-            <a:endParaRPr lang="ja-JP" altLang="en-US" dirty="0">
-              <a:solidFill>
-                <a:schemeClr val="tx2">
-                  <a:lumMod val="75000"/>
-                </a:schemeClr>
-              </a:solidFill>
-              <a:effectLst/>
-              <a:latin typeface="なぎの" charset="-120"/>
-              <a:ea typeface="なぎの" charset="-120"/>
-              <a:sym typeface="+mn-ea"/>
-            </a:endParaRPr>
-          </a:p>
-          <a:p>
-            <a:pPr indent="457200" algn="l"/>
-            <a:r>
-              <a:rPr lang="ja-JP" altLang="en-US" dirty="0">
-                <a:solidFill>
-                  <a:schemeClr val="tx2">
-                    <a:lumMod val="75000"/>
-                  </a:schemeClr>
-                </a:solidFill>
-                <a:effectLst/>
-                <a:latin typeface="なぎの" charset="-120"/>
-                <a:ea typeface="なぎの" charset="-120"/>
-                <a:sym typeface="+mn-ea"/>
-              </a:rPr>
-              <a:t>または、位置の調節用</a:t>
-            </a:r>
-            <a:r>
-              <a:rPr lang="ja-JP" altLang="en-US" dirty="0">
-                <a:solidFill>
-                  <a:schemeClr val="tx2">
-                    <a:lumMod val="75000"/>
-                  </a:schemeClr>
-                </a:solidFill>
-                <a:effectLst/>
-                <a:latin typeface="なぎの" charset="-120"/>
-                <a:ea typeface="なぎの" charset="-120"/>
-                <a:sym typeface="+mn-ea"/>
-              </a:rPr>
-              <a:t>。</a:t>
-            </a:r>
-            <a:endParaRPr lang="ja-JP" altLang="en-US" dirty="0">
-              <a:solidFill>
-                <a:schemeClr val="tx2">
-                  <a:lumMod val="75000"/>
-                </a:schemeClr>
-              </a:solidFill>
-              <a:effectLst/>
-              <a:latin typeface="なぎの" charset="-120"/>
-              <a:ea typeface="なぎの" charset="-120"/>
-              <a:sym typeface="+mn-ea"/>
-            </a:endParaRPr>
-          </a:p>
-          <a:p>
-            <a:pPr indent="457200" algn="l"/>
-            <a:r>
-              <a:rPr lang="ja-JP" altLang="en-US" sz="1400" dirty="0">
-                <a:solidFill>
-                  <a:schemeClr val="tx2">
-                    <a:lumMod val="75000"/>
-                  </a:schemeClr>
-                </a:solidFill>
-                <a:effectLst/>
-                <a:latin typeface="なぎの" charset="-120"/>
-                <a:ea typeface="なぎの" charset="-120"/>
-                <a:sym typeface="+mn-ea"/>
-              </a:rPr>
-              <a:t>ステージ</a:t>
-            </a:r>
-            <a:r>
-              <a:rPr lang="en-US" altLang="ja-JP" sz="1400" dirty="0">
-                <a:solidFill>
-                  <a:schemeClr val="tx2">
-                    <a:lumMod val="75000"/>
-                  </a:schemeClr>
-                </a:solidFill>
-                <a:effectLst/>
-                <a:latin typeface="なぎの" charset="-120"/>
-                <a:ea typeface="なぎの" charset="-120"/>
-                <a:sym typeface="+mn-ea"/>
-              </a:rPr>
-              <a:t>2</a:t>
-            </a:r>
-            <a:r>
-              <a:rPr lang="ja-JP" altLang="en-US" sz="1400" dirty="0">
-                <a:solidFill>
-                  <a:schemeClr val="tx2">
-                    <a:lumMod val="75000"/>
-                  </a:schemeClr>
-                </a:solidFill>
-                <a:effectLst/>
-                <a:latin typeface="なぎの" charset="-120"/>
-                <a:ea typeface="なぎの" charset="-120"/>
-                <a:sym typeface="+mn-ea"/>
-              </a:rPr>
-              <a:t>で作る予定だったが、時間的に実装できなかったためボツ。</a:t>
-            </a:r>
-            <a:endParaRPr lang="ja-JP" altLang="en-US" sz="1400" dirty="0">
-              <a:solidFill>
-                <a:schemeClr val="tx2">
-                  <a:lumMod val="75000"/>
-                </a:schemeClr>
-              </a:solidFill>
-              <a:effectLst/>
-              <a:latin typeface="なぎの" charset="-120"/>
-              <a:ea typeface="なぎの" charset="-120"/>
-              <a:sym typeface="+mn-ea"/>
             </a:endParaRPr>
           </a:p>
         </p:txBody>
@@ -6072,14 +5840,14 @@
           <p:nvPr/>
         </p:nvPicPr>
         <p:blipFill>
-          <a:blip r:embed="rId1"/>
+          <a:blip r:embed="rId4"/>
           <a:stretch>
             <a:fillRect/>
           </a:stretch>
         </p:blipFill>
         <p:spPr>
           <a:xfrm>
-            <a:off x="7127875" y="3271520"/>
+            <a:off x="7520940" y="3271520"/>
             <a:ext cx="3091815" cy="3091815"/>
           </a:xfrm>
           <a:prstGeom prst="rect">
@@ -6096,7 +5864,7 @@
           <p:nvPr/>
         </p:nvPicPr>
         <p:blipFill>
-          <a:blip r:embed="rId2"/>
+          <a:blip r:embed="rId5"/>
           <a:stretch>
             <a:fillRect/>
           </a:stretch>
@@ -6120,7 +5888,7 @@
           <p:nvPr/>
         </p:nvPicPr>
         <p:blipFill>
-          <a:blip r:embed="rId3"/>
+          <a:blip r:embed="rId6"/>
           <a:stretch>
             <a:fillRect/>
           </a:stretch>
@@ -6135,42 +5903,6 @@
           </a:prstGeom>
         </p:spPr>
       </p:pic>
-      <p:sp>
-        <p:nvSpPr>
-          <p:cNvPr id="13" name="テキストボックス 12"/>
-          <p:cNvSpPr txBox="1"/>
-          <p:nvPr/>
-        </p:nvSpPr>
-        <p:spPr>
-          <a:xfrm>
-            <a:off x="2908300" y="295275"/>
-            <a:ext cx="6375400" cy="583565"/>
-          </a:xfrm>
-          <a:prstGeom prst="rect">
-            <a:avLst/>
-          </a:prstGeom>
-          <a:noFill/>
-        </p:spPr>
-        <p:txBody>
-          <a:bodyPr wrap="square" rtlCol="0">
-            <a:spAutoFit/>
-          </a:bodyPr>
-          <a:p>
-            <a:pPr algn="ctr"/>
-            <a:r>
-              <a:rPr lang="ja-JP" altLang="en-US" sz="3200">
-                <a:latin typeface="なぎの" charset="-120"/>
-                <a:ea typeface="なぎの" charset="-120"/>
-              </a:rPr>
-              <a:t>ギミック・障害物紹介</a:t>
-            </a:r>
-            <a:endParaRPr lang="ja-JP" altLang="en-US" sz="3200">
-              <a:latin typeface="なぎの" charset="-120"/>
-              <a:ea typeface="なぎの" charset="-120"/>
-            </a:endParaRPr>
-          </a:p>
-        </p:txBody>
-      </p:sp>
     </p:spTree>
   </p:cSld>
   <p:clrMapOvr>
@@ -6180,7 +5912,7 @@
 </p:sld>
 </file>
 
-<file path=ppt/slides/slide6.xml><?xml version="1.0" encoding="utf-8"?>
+<file path=ppt/slides/slide5.xml><?xml version="1.0" encoding="utf-8"?>
 <p:sld xmlns:a="http://schemas.openxmlformats.org/drawingml/2006/main" xmlns:r="http://schemas.openxmlformats.org/officeDocument/2006/relationships" xmlns:p="http://schemas.openxmlformats.org/presentationml/2006/main">
   <p:cSld>
     <p:bg>
@@ -6252,9 +5984,476 @@
           </a:p>
         </p:txBody>
       </p:sp>
+      <p:sp>
+        <p:nvSpPr>
+          <p:cNvPr id="8" name="テキストボックス 7"/>
+          <p:cNvSpPr txBox="1"/>
+          <p:nvPr/>
+        </p:nvSpPr>
+        <p:spPr>
+          <a:xfrm>
+            <a:off x="2139950" y="4395470"/>
+            <a:ext cx="8491855" cy="2400935"/>
+          </a:xfrm>
+          <a:prstGeom prst="rect">
+            <a:avLst/>
+          </a:prstGeom>
+          <a:noFill/>
+        </p:spPr>
+        <p:txBody>
+          <a:bodyPr wrap="square" rtlCol="0">
+            <a:noAutofit/>
+          </a:bodyPr>
+          <a:lstStyle/>
+          <a:p>
+            <a:r>
+              <a:rPr lang="en-US" sz="2400" dirty="0">
+                <a:ln w="3175">
+                  <a:noFill/>
+                </a:ln>
+                <a:solidFill>
+                  <a:srgbClr val="D74E56"/>
+                </a:solidFill>
+                <a:effectLst/>
+                <a:latin typeface="なぎの" charset="-120"/>
+                <a:ea typeface="なぎの" charset="-120"/>
+                <a:cs typeface="なぎの" charset="-120"/>
+              </a:rPr>
+              <a:t>A, D</a:t>
+            </a:r>
+            <a:r>
+              <a:rPr lang="en-US" sz="2400" dirty="0">
+                <a:ln w="3175">
+                  <a:noFill/>
+                </a:ln>
+                <a:solidFill>
+                  <a:schemeClr val="tx1">
+                    <a:lumMod val="65000"/>
+                    <a:lumOff val="35000"/>
+                  </a:schemeClr>
+                </a:solidFill>
+                <a:effectLst/>
+                <a:latin typeface="なぎの" charset="-120"/>
+                <a:ea typeface="なぎの" charset="-120"/>
+                <a:cs typeface="なぎの" charset="-120"/>
+              </a:rPr>
+              <a:t>	</a:t>
+            </a:r>
+            <a:r>
+              <a:rPr lang="ja-JP" altLang="en-US" sz="2400" dirty="0">
+                <a:ln w="3175">
+                  <a:noFill/>
+                </a:ln>
+                <a:solidFill>
+                  <a:schemeClr val="tx1">
+                    <a:lumMod val="65000"/>
+                    <a:lumOff val="35000"/>
+                  </a:schemeClr>
+                </a:solidFill>
+                <a:effectLst/>
+                <a:latin typeface="なぎの" charset="-120"/>
+                <a:ea typeface="なぎの" charset="-120"/>
+                <a:cs typeface="なぎの" charset="-120"/>
+              </a:rPr>
+              <a:t>左右移動</a:t>
+            </a:r>
+            <a:endParaRPr lang="ja-JP" altLang="en-US" sz="2400" dirty="0">
+              <a:ln w="3175">
+                <a:noFill/>
+              </a:ln>
+              <a:solidFill>
+                <a:schemeClr val="tx1">
+                  <a:lumMod val="65000"/>
+                  <a:lumOff val="35000"/>
+                </a:schemeClr>
+              </a:solidFill>
+              <a:effectLst/>
+              <a:latin typeface="なぎの" charset="-120"/>
+              <a:ea typeface="なぎの" charset="-120"/>
+              <a:cs typeface="なぎの" charset="-120"/>
+            </a:endParaRPr>
+          </a:p>
+          <a:p>
+            <a:r>
+              <a:rPr lang="en-US" altLang="ja-JP" sz="2400" dirty="0">
+                <a:ln w="3175">
+                  <a:noFill/>
+                </a:ln>
+                <a:solidFill>
+                  <a:srgbClr val="D74E56"/>
+                </a:solidFill>
+                <a:effectLst/>
+                <a:latin typeface="なぎの" charset="-120"/>
+                <a:ea typeface="なぎの" charset="-120"/>
+                <a:cs typeface="なぎの" charset="-120"/>
+              </a:rPr>
+              <a:t>W, K</a:t>
+            </a:r>
+            <a:r>
+              <a:rPr lang="en-US" altLang="ja-JP" sz="2400" dirty="0">
+                <a:ln w="3175">
+                  <a:noFill/>
+                </a:ln>
+                <a:solidFill>
+                  <a:schemeClr val="tx1">
+                    <a:lumMod val="65000"/>
+                    <a:lumOff val="35000"/>
+                  </a:schemeClr>
+                </a:solidFill>
+                <a:effectLst/>
+                <a:latin typeface="なぎの" charset="-120"/>
+                <a:ea typeface="なぎの" charset="-120"/>
+                <a:cs typeface="なぎの" charset="-120"/>
+              </a:rPr>
+              <a:t>	</a:t>
+            </a:r>
+            <a:r>
+              <a:rPr lang="ja-JP" altLang="en-US" sz="2400" dirty="0">
+                <a:ln w="3175">
+                  <a:noFill/>
+                </a:ln>
+                <a:solidFill>
+                  <a:schemeClr val="tx1">
+                    <a:lumMod val="65000"/>
+                    <a:lumOff val="35000"/>
+                  </a:schemeClr>
+                </a:solidFill>
+                <a:effectLst/>
+                <a:latin typeface="なぎの" charset="-120"/>
+                <a:ea typeface="なぎの" charset="-120"/>
+                <a:cs typeface="なぎの" charset="-120"/>
+              </a:rPr>
+              <a:t>ジャンプ</a:t>
+            </a:r>
+            <a:endParaRPr lang="ja-JP" altLang="en-US" sz="2400" dirty="0">
+              <a:ln w="3175">
+                <a:noFill/>
+              </a:ln>
+              <a:solidFill>
+                <a:schemeClr val="tx1">
+                  <a:lumMod val="65000"/>
+                  <a:lumOff val="35000"/>
+                </a:schemeClr>
+              </a:solidFill>
+              <a:effectLst/>
+              <a:latin typeface="なぎの" charset="-120"/>
+              <a:ea typeface="なぎの" charset="-120"/>
+              <a:cs typeface="なぎの" charset="-120"/>
+            </a:endParaRPr>
+          </a:p>
+          <a:p>
+            <a:r>
+              <a:rPr lang="en-US" altLang="ja-JP" sz="2400" dirty="0">
+                <a:ln w="3175">
+                  <a:noFill/>
+                </a:ln>
+                <a:solidFill>
+                  <a:srgbClr val="4BBC4F"/>
+                </a:solidFill>
+                <a:effectLst/>
+                <a:latin typeface="なぎの" charset="-120"/>
+                <a:ea typeface="なぎの" charset="-120"/>
+                <a:cs typeface="なぎの" charset="-120"/>
+              </a:rPr>
+              <a:t>J</a:t>
+            </a:r>
+            <a:r>
+              <a:rPr lang="en-US" altLang="ja-JP" sz="2400" dirty="0">
+                <a:ln w="3175">
+                  <a:noFill/>
+                </a:ln>
+                <a:solidFill>
+                  <a:schemeClr val="tx1">
+                    <a:lumMod val="65000"/>
+                    <a:lumOff val="35000"/>
+                  </a:schemeClr>
+                </a:solidFill>
+                <a:effectLst/>
+                <a:latin typeface="なぎの" charset="-120"/>
+                <a:ea typeface="なぎの" charset="-120"/>
+                <a:cs typeface="なぎの" charset="-120"/>
+              </a:rPr>
+              <a:t>	</a:t>
+            </a:r>
+            <a:r>
+              <a:rPr lang="ja-JP" altLang="en-US" sz="2400" dirty="0">
+                <a:ln w="3175">
+                  <a:noFill/>
+                </a:ln>
+                <a:solidFill>
+                  <a:schemeClr val="tx1">
+                    <a:lumMod val="65000"/>
+                    <a:lumOff val="35000"/>
+                  </a:schemeClr>
+                </a:solidFill>
+                <a:effectLst/>
+                <a:latin typeface="なぎの" charset="-120"/>
+                <a:ea typeface="なぎの" charset="-120"/>
+                <a:cs typeface="なぎの" charset="-120"/>
+              </a:rPr>
+              <a:t>ギミック起動</a:t>
+            </a:r>
+            <a:endParaRPr lang="ja-JP" altLang="en-US" sz="2400" dirty="0">
+              <a:ln w="3175">
+                <a:noFill/>
+              </a:ln>
+              <a:solidFill>
+                <a:schemeClr val="tx1">
+                  <a:lumMod val="65000"/>
+                  <a:lumOff val="35000"/>
+                </a:schemeClr>
+              </a:solidFill>
+              <a:effectLst/>
+              <a:latin typeface="なぎの" charset="-120"/>
+              <a:ea typeface="なぎの" charset="-120"/>
+              <a:cs typeface="なぎの" charset="-120"/>
+            </a:endParaRPr>
+          </a:p>
+          <a:p>
+            <a:r>
+              <a:rPr lang="en-US" altLang="ja-JP" sz="2400" dirty="0">
+                <a:ln w="3175">
+                  <a:noFill/>
+                </a:ln>
+                <a:solidFill>
+                  <a:srgbClr val="61C464"/>
+                </a:solidFill>
+                <a:effectLst/>
+                <a:latin typeface="なぎの" charset="-120"/>
+                <a:ea typeface="なぎの" charset="-120"/>
+                <a:cs typeface="なぎの" charset="-120"/>
+              </a:rPr>
+              <a:t>Spc</a:t>
+            </a:r>
+            <a:r>
+              <a:rPr lang="en-US" altLang="ja-JP" sz="2400" dirty="0">
+                <a:ln w="3175">
+                  <a:noFill/>
+                </a:ln>
+                <a:solidFill>
+                  <a:schemeClr val="tx1">
+                    <a:lumMod val="65000"/>
+                    <a:lumOff val="35000"/>
+                  </a:schemeClr>
+                </a:solidFill>
+                <a:effectLst/>
+                <a:latin typeface="なぎの" charset="-120"/>
+                <a:ea typeface="なぎの" charset="-120"/>
+                <a:cs typeface="なぎの" charset="-120"/>
+              </a:rPr>
+              <a:t>	</a:t>
+            </a:r>
+            <a:r>
+              <a:rPr lang="ja-JP" altLang="en-US" sz="2400" dirty="0">
+                <a:ln w="3175">
+                  <a:noFill/>
+                </a:ln>
+                <a:solidFill>
+                  <a:schemeClr val="tx1">
+                    <a:lumMod val="65000"/>
+                    <a:lumOff val="35000"/>
+                  </a:schemeClr>
+                </a:solidFill>
+                <a:effectLst/>
+                <a:latin typeface="なぎの" charset="-120"/>
+                <a:ea typeface="なぎの" charset="-120"/>
+                <a:cs typeface="なぎの" charset="-120"/>
+              </a:rPr>
+              <a:t>リスポーン</a:t>
+            </a:r>
+            <a:endParaRPr lang="ja-JP" altLang="en-US" sz="2400" dirty="0">
+              <a:ln w="3175">
+                <a:noFill/>
+              </a:ln>
+              <a:solidFill>
+                <a:schemeClr val="tx1">
+                  <a:lumMod val="65000"/>
+                  <a:lumOff val="35000"/>
+                </a:schemeClr>
+              </a:solidFill>
+              <a:effectLst/>
+              <a:latin typeface="なぎの" charset="-120"/>
+              <a:ea typeface="なぎの" charset="-120"/>
+              <a:cs typeface="なぎの" charset="-120"/>
+            </a:endParaRPr>
+          </a:p>
+          <a:p>
+            <a:r>
+              <a:rPr lang="en-US" altLang="ja-JP" sz="2400" dirty="0">
+                <a:ln w="3175">
+                  <a:noFill/>
+                </a:ln>
+                <a:solidFill>
+                  <a:srgbClr val="4A45A9"/>
+                </a:solidFill>
+                <a:effectLst/>
+                <a:latin typeface="なぎの" charset="-120"/>
+                <a:ea typeface="なぎの" charset="-120"/>
+                <a:cs typeface="なぎの" charset="-120"/>
+              </a:rPr>
+              <a:t>I, O</a:t>
+            </a:r>
+            <a:r>
+              <a:rPr lang="en-US" altLang="ja-JP" sz="2400" dirty="0">
+                <a:ln w="3175">
+                  <a:noFill/>
+                </a:ln>
+                <a:solidFill>
+                  <a:schemeClr val="tx1">
+                    <a:lumMod val="65000"/>
+                    <a:lumOff val="35000"/>
+                  </a:schemeClr>
+                </a:solidFill>
+                <a:effectLst/>
+                <a:latin typeface="なぎの" charset="-120"/>
+                <a:ea typeface="なぎの" charset="-120"/>
+                <a:cs typeface="なぎの" charset="-120"/>
+              </a:rPr>
+              <a:t>	</a:t>
+            </a:r>
+            <a:r>
+              <a:rPr lang="ja-JP" altLang="en-US" sz="2400" dirty="0">
+                <a:ln w="3175">
+                  <a:noFill/>
+                </a:ln>
+                <a:solidFill>
+                  <a:schemeClr val="tx1">
+                    <a:lumMod val="65000"/>
+                    <a:lumOff val="35000"/>
+                  </a:schemeClr>
+                </a:solidFill>
+                <a:effectLst/>
+                <a:latin typeface="なぎの" charset="-120"/>
+                <a:ea typeface="なぎの" charset="-120"/>
+                <a:cs typeface="なぎの" charset="-120"/>
+              </a:rPr>
+              <a:t>ズームイン</a:t>
+            </a:r>
+            <a:r>
+              <a:rPr lang="en-US" altLang="ja-JP" sz="2400" dirty="0">
+                <a:ln w="3175">
+                  <a:noFill/>
+                </a:ln>
+                <a:solidFill>
+                  <a:schemeClr val="tx1">
+                    <a:lumMod val="65000"/>
+                    <a:lumOff val="35000"/>
+                  </a:schemeClr>
+                </a:solidFill>
+                <a:effectLst/>
+                <a:latin typeface="なぎの" charset="-120"/>
+                <a:ea typeface="なぎの" charset="-120"/>
+                <a:cs typeface="なぎの" charset="-120"/>
+              </a:rPr>
+              <a:t>/</a:t>
+            </a:r>
+            <a:r>
+              <a:rPr lang="ja-JP" altLang="en-US" sz="2400" dirty="0">
+                <a:ln w="3175">
+                  <a:noFill/>
+                </a:ln>
+                <a:solidFill>
+                  <a:schemeClr val="tx1">
+                    <a:lumMod val="65000"/>
+                    <a:lumOff val="35000"/>
+                  </a:schemeClr>
+                </a:solidFill>
+                <a:effectLst/>
+                <a:latin typeface="なぎの" charset="-120"/>
+                <a:ea typeface="なぎの" charset="-120"/>
+                <a:cs typeface="なぎの" charset="-120"/>
+              </a:rPr>
+              <a:t>ズームアウト</a:t>
+            </a:r>
+            <a:endParaRPr lang="ja-JP" altLang="en-US" sz="2400" dirty="0">
+              <a:ln w="3175">
+                <a:noFill/>
+              </a:ln>
+              <a:solidFill>
+                <a:schemeClr val="tx1">
+                  <a:lumMod val="65000"/>
+                  <a:lumOff val="35000"/>
+                </a:schemeClr>
+              </a:solidFill>
+              <a:effectLst/>
+              <a:latin typeface="なぎの" charset="-120"/>
+              <a:ea typeface="なぎの" charset="-120"/>
+              <a:cs typeface="なぎの" charset="-120"/>
+            </a:endParaRPr>
+          </a:p>
+          <a:p>
+            <a:r>
+              <a:rPr lang="en-US" altLang="ja-JP" sz="2400" dirty="0">
+                <a:ln w="3175">
+                  <a:noFill/>
+                </a:ln>
+                <a:solidFill>
+                  <a:srgbClr val="C89355"/>
+                </a:solidFill>
+                <a:effectLst/>
+                <a:latin typeface="なぎの" charset="-120"/>
+                <a:ea typeface="なぎの" charset="-120"/>
+                <a:cs typeface="なぎの" charset="-120"/>
+              </a:rPr>
+              <a:t>Esc</a:t>
+            </a:r>
+            <a:r>
+              <a:rPr lang="en-US" altLang="ja-JP" sz="2400" dirty="0">
+                <a:ln w="3175">
+                  <a:noFill/>
+                </a:ln>
+                <a:solidFill>
+                  <a:schemeClr val="tx1">
+                    <a:lumMod val="65000"/>
+                    <a:lumOff val="35000"/>
+                  </a:schemeClr>
+                </a:solidFill>
+                <a:effectLst/>
+                <a:latin typeface="なぎの" charset="-120"/>
+                <a:ea typeface="なぎの" charset="-120"/>
+                <a:cs typeface="なぎの" charset="-120"/>
+              </a:rPr>
+              <a:t> 	</a:t>
+            </a:r>
+            <a:r>
+              <a:rPr lang="ja-JP" altLang="en-US" sz="2400" dirty="0">
+                <a:ln w="3175">
+                  <a:noFill/>
+                </a:ln>
+                <a:solidFill>
+                  <a:schemeClr val="tx1">
+                    <a:lumMod val="65000"/>
+                    <a:lumOff val="35000"/>
+                  </a:schemeClr>
+                </a:solidFill>
+                <a:effectLst/>
+                <a:latin typeface="なぎの" charset="-120"/>
+                <a:ea typeface="なぎの" charset="-120"/>
+                <a:cs typeface="なぎの" charset="-120"/>
+              </a:rPr>
+              <a:t>ポーズ</a:t>
+            </a:r>
+            <a:endParaRPr lang="ja-JP" altLang="en-US" sz="2400" dirty="0">
+              <a:ln w="3175">
+                <a:noFill/>
+              </a:ln>
+              <a:solidFill>
+                <a:schemeClr val="tx1">
+                  <a:lumMod val="65000"/>
+                  <a:lumOff val="35000"/>
+                </a:schemeClr>
+              </a:solidFill>
+              <a:effectLst/>
+              <a:latin typeface="なぎの" charset="-120"/>
+              <a:ea typeface="なぎの" charset="-120"/>
+              <a:cs typeface="なぎの" charset="-120"/>
+            </a:endParaRPr>
+          </a:p>
+        </p:txBody>
+      </p:sp>
       <p:pic>
         <p:nvPicPr>
-          <p:cNvPr id="7" name="図形 6" descr="D:\desktop\keyboard.pngkeyboard"/>
+          <p:cNvPr id="4" name="図形 3" descr="keyboard2"/>
           <p:cNvPicPr>
             <a:picLocks noChangeAspect="1"/>
           </p:cNvPicPr>
@@ -6262,542 +6461,20 @@
         </p:nvPicPr>
         <p:blipFill>
           <a:blip r:embed="rId1"/>
-          <a:srcRect/>
           <a:stretch>
             <a:fillRect/>
           </a:stretch>
         </p:blipFill>
         <p:spPr>
           <a:xfrm>
-            <a:off x="2575878" y="738823"/>
-            <a:ext cx="7040880" cy="2710180"/>
+            <a:off x="1109980" y="556895"/>
+            <a:ext cx="9972675" cy="3838575"/>
           </a:xfrm>
           <a:prstGeom prst="rect">
             <a:avLst/>
           </a:prstGeom>
-          <a:effectLst/>
         </p:spPr>
       </p:pic>
-      <p:sp>
-        <p:nvSpPr>
-          <p:cNvPr id="8" name="テキストボックス 7"/>
-          <p:cNvSpPr txBox="1"/>
-          <p:nvPr/>
-        </p:nvSpPr>
-        <p:spPr>
-          <a:xfrm>
-            <a:off x="1849755" y="3647440"/>
-            <a:ext cx="8491855" cy="2922905"/>
-          </a:xfrm>
-          <a:prstGeom prst="rect">
-            <a:avLst/>
-          </a:prstGeom>
-          <a:noFill/>
-        </p:spPr>
-        <p:txBody>
-          <a:bodyPr wrap="square" rtlCol="0">
-            <a:spAutoFit/>
-          </a:bodyPr>
-          <a:lstStyle/>
-          <a:p>
-            <a:r>
-              <a:rPr lang="en-US" altLang="ja-JP" sz="2800" dirty="0">
-                <a:ln w="3175">
-                  <a:noFill/>
-                </a:ln>
-                <a:solidFill>
-                  <a:schemeClr val="accent2"/>
-                </a:solidFill>
-                <a:effectLst/>
-                <a:latin typeface="なぎの" charset="-120"/>
-                <a:ea typeface="なぎの" charset="-120"/>
-                <a:cs typeface="なぎの" charset="-120"/>
-              </a:rPr>
-              <a:t>E</a:t>
-            </a:r>
-            <a:r>
-              <a:rPr lang="en-US" altLang="ja-JP" sz="2800" dirty="0">
-                <a:ln w="3175">
-                  <a:noFill/>
-                </a:ln>
-                <a:solidFill>
-                  <a:schemeClr val="accent2"/>
-                </a:solidFill>
-                <a:latin typeface="なぎの" charset="-120"/>
-                <a:ea typeface="なぎの" charset="-120"/>
-                <a:cs typeface="なぎの" charset="-120"/>
-              </a:rPr>
-              <a:t>sc</a:t>
-            </a:r>
-            <a:r>
-              <a:rPr lang="en-US" altLang="ja-JP" sz="2800" dirty="0">
-                <a:latin typeface="なぎの" charset="-120"/>
-                <a:ea typeface="なぎの" charset="-120"/>
-                <a:cs typeface="なぎの" charset="-120"/>
-              </a:rPr>
-              <a:t> </a:t>
-            </a:r>
-            <a:r>
-              <a:rPr lang="ja-JP" altLang="en-US" sz="2800" dirty="0">
-                <a:solidFill>
-                  <a:schemeClr val="tx2">
-                    <a:lumMod val="75000"/>
-                  </a:schemeClr>
-                </a:solidFill>
-                <a:latin typeface="なぎの" charset="-120"/>
-                <a:ea typeface="なぎの" charset="-120"/>
-                <a:cs typeface="なぎの" charset="-120"/>
-              </a:rPr>
-              <a:t>ポーズ</a:t>
-            </a:r>
-            <a:r>
-              <a:rPr lang="en-US" altLang="ja-JP" sz="2800" dirty="0">
-                <a:solidFill>
-                  <a:schemeClr val="tx2">
-                    <a:lumMod val="75000"/>
-                  </a:schemeClr>
-                </a:solidFill>
-                <a:latin typeface="なぎの" charset="-120"/>
-                <a:ea typeface="なぎの" charset="-120"/>
-                <a:cs typeface="なぎの" charset="-120"/>
-              </a:rPr>
-              <a:t>	</a:t>
-            </a:r>
-            <a:r>
-              <a:rPr lang="en-US" altLang="ja-JP" sz="2800" dirty="0">
-                <a:latin typeface="なぎの" charset="-120"/>
-                <a:ea typeface="なぎの" charset="-120"/>
-                <a:cs typeface="なぎの" charset="-120"/>
-              </a:rPr>
-              <a:t>	</a:t>
-            </a:r>
-            <a:r>
-              <a:rPr lang="en-US" altLang="ja-JP" sz="2800" dirty="0">
-                <a:solidFill>
-                  <a:srgbClr val="FF0000"/>
-                </a:solidFill>
-                <a:latin typeface="なぎの" charset="-120"/>
-                <a:ea typeface="なぎの" charset="-120"/>
-                <a:cs typeface="なぎの" charset="-120"/>
-              </a:rPr>
-              <a:t>W</a:t>
-            </a:r>
-            <a:r>
-              <a:rPr lang="en-US" altLang="ja-JP" sz="2800" dirty="0">
-                <a:latin typeface="なぎの" charset="-120"/>
-                <a:ea typeface="なぎの" charset="-120"/>
-                <a:cs typeface="なぎの" charset="-120"/>
-              </a:rPr>
-              <a:t> </a:t>
-            </a:r>
-            <a:r>
-              <a:rPr lang="ja-JP" altLang="en-US" sz="2800" dirty="0">
-                <a:solidFill>
-                  <a:schemeClr val="tx2">
-                    <a:lumMod val="75000"/>
-                  </a:schemeClr>
-                </a:solidFill>
-                <a:latin typeface="なぎの" charset="-120"/>
-                <a:ea typeface="なぎの" charset="-120"/>
-                <a:cs typeface="なぎの" charset="-120"/>
-              </a:rPr>
-              <a:t>ジャンプ</a:t>
-            </a:r>
-            <a:r>
-              <a:rPr lang="en-US" altLang="ja-JP" sz="2800" dirty="0">
-                <a:latin typeface="なぎの" charset="-120"/>
-                <a:ea typeface="なぎの" charset="-120"/>
-                <a:cs typeface="なぎの" charset="-120"/>
-              </a:rPr>
-              <a:t>		</a:t>
-            </a:r>
-            <a:r>
-              <a:rPr lang="en-US" altLang="ja-JP" sz="2800" dirty="0">
-                <a:solidFill>
-                  <a:srgbClr val="0070C0"/>
-                </a:solidFill>
-                <a:latin typeface="なぎの" charset="-120"/>
-                <a:ea typeface="なぎの" charset="-120"/>
-                <a:cs typeface="なぎの" charset="-120"/>
-                <a:sym typeface="+mn-ea"/>
-              </a:rPr>
-              <a:t>I</a:t>
-            </a:r>
-            <a:r>
-              <a:rPr lang="en-US" altLang="ja-JP" sz="2800" dirty="0">
-                <a:latin typeface="なぎの" charset="-120"/>
-                <a:ea typeface="なぎの" charset="-120"/>
-                <a:cs typeface="なぎの" charset="-120"/>
-                <a:sym typeface="+mn-ea"/>
-              </a:rPr>
-              <a:t> </a:t>
-            </a:r>
-            <a:r>
-              <a:rPr lang="ja-JP" altLang="en-US" sz="2800" dirty="0">
-                <a:solidFill>
-                  <a:schemeClr val="tx2">
-                    <a:lumMod val="75000"/>
-                  </a:schemeClr>
-                </a:solidFill>
-                <a:latin typeface="なぎの" charset="-120"/>
-                <a:ea typeface="なぎの" charset="-120"/>
-                <a:cs typeface="なぎの" charset="-120"/>
-                <a:sym typeface="+mn-ea"/>
-              </a:rPr>
-              <a:t>ズームイン</a:t>
-            </a:r>
-            <a:endParaRPr lang="ja-JP" altLang="en-US" sz="2800" dirty="0">
-              <a:solidFill>
-                <a:schemeClr val="tx2">
-                  <a:lumMod val="75000"/>
-                </a:schemeClr>
-              </a:solidFill>
-              <a:latin typeface="なぎの" charset="-120"/>
-              <a:ea typeface="なぎの" charset="-120"/>
-              <a:cs typeface="なぎの" charset="-120"/>
-            </a:endParaRPr>
-          </a:p>
-          <a:p>
-            <a:r>
-              <a:rPr lang="en-US" altLang="ja-JP" sz="2800" dirty="0">
-                <a:solidFill>
-                  <a:srgbClr val="FF0000"/>
-                </a:solidFill>
-                <a:latin typeface="なぎの" charset="-120"/>
-                <a:ea typeface="なぎの" charset="-120"/>
-                <a:cs typeface="なぎの" charset="-120"/>
-              </a:rPr>
-              <a:t>			A</a:t>
-            </a:r>
-            <a:r>
-              <a:rPr lang="en-US" altLang="ja-JP" sz="2800" dirty="0">
-                <a:latin typeface="なぎの" charset="-120"/>
-                <a:ea typeface="なぎの" charset="-120"/>
-                <a:cs typeface="なぎの" charset="-120"/>
-              </a:rPr>
-              <a:t> </a:t>
-            </a:r>
-            <a:r>
-              <a:rPr lang="ja-JP" altLang="en-US" sz="2800" dirty="0">
-                <a:solidFill>
-                  <a:schemeClr val="tx2">
-                    <a:lumMod val="75000"/>
-                  </a:schemeClr>
-                </a:solidFill>
-                <a:latin typeface="なぎの" charset="-120"/>
-                <a:ea typeface="なぎの" charset="-120"/>
-                <a:cs typeface="なぎの" charset="-120"/>
-              </a:rPr>
-              <a:t>左移動</a:t>
-            </a:r>
-            <a:r>
-              <a:rPr lang="en-US" altLang="ja-JP" sz="2800" dirty="0">
-                <a:latin typeface="なぎの" charset="-120"/>
-                <a:ea typeface="なぎの" charset="-120"/>
-                <a:cs typeface="なぎの" charset="-120"/>
-              </a:rPr>
-              <a:t>		</a:t>
-            </a:r>
-            <a:r>
-              <a:rPr lang="en-US" altLang="ja-JP" sz="2800" dirty="0">
-                <a:solidFill>
-                  <a:srgbClr val="0070C0"/>
-                </a:solidFill>
-                <a:latin typeface="なぎの" charset="-120"/>
-                <a:ea typeface="なぎの" charset="-120"/>
-                <a:cs typeface="なぎの" charset="-120"/>
-                <a:sym typeface="+mn-ea"/>
-              </a:rPr>
-              <a:t>O</a:t>
-            </a:r>
-            <a:r>
-              <a:rPr lang="en-US" altLang="ja-JP" sz="2800" dirty="0">
-                <a:latin typeface="なぎの" charset="-120"/>
-                <a:ea typeface="なぎの" charset="-120"/>
-                <a:cs typeface="なぎの" charset="-120"/>
-                <a:sym typeface="+mn-ea"/>
-              </a:rPr>
-              <a:t> </a:t>
-            </a:r>
-            <a:r>
-              <a:rPr lang="ja-JP" altLang="en-US" sz="2800" dirty="0">
-                <a:solidFill>
-                  <a:schemeClr val="tx2">
-                    <a:lumMod val="75000"/>
-                  </a:schemeClr>
-                </a:solidFill>
-                <a:latin typeface="なぎの" charset="-120"/>
-                <a:ea typeface="なぎの" charset="-120"/>
-                <a:cs typeface="なぎの" charset="-120"/>
-                <a:sym typeface="+mn-ea"/>
-              </a:rPr>
-              <a:t>ズームアウト</a:t>
-            </a:r>
-            <a:endParaRPr lang="en-US" altLang="ja-JP" sz="2800" dirty="0">
-              <a:solidFill>
-                <a:schemeClr val="tx2">
-                  <a:lumMod val="75000"/>
-                </a:schemeClr>
-              </a:solidFill>
-              <a:latin typeface="なぎの" charset="-120"/>
-              <a:ea typeface="なぎの" charset="-120"/>
-              <a:cs typeface="なぎの" charset="-120"/>
-            </a:endParaRPr>
-          </a:p>
-          <a:p>
-            <a:r>
-              <a:rPr lang="en-US" altLang="ja-JP" sz="2800" dirty="0">
-                <a:solidFill>
-                  <a:srgbClr val="FF0000"/>
-                </a:solidFill>
-                <a:latin typeface="なぎの" charset="-120"/>
-                <a:ea typeface="なぎの" charset="-120"/>
-                <a:cs typeface="なぎの" charset="-120"/>
-              </a:rPr>
-              <a:t>			D</a:t>
-            </a:r>
-            <a:r>
-              <a:rPr lang="en-US" altLang="ja-JP" sz="2800" dirty="0">
-                <a:latin typeface="なぎの" charset="-120"/>
-                <a:ea typeface="なぎの" charset="-120"/>
-                <a:cs typeface="なぎの" charset="-120"/>
-              </a:rPr>
-              <a:t> </a:t>
-            </a:r>
-            <a:r>
-              <a:rPr lang="ja-JP" altLang="en-US" sz="2800" dirty="0">
-                <a:solidFill>
-                  <a:schemeClr val="tx2">
-                    <a:lumMod val="75000"/>
-                  </a:schemeClr>
-                </a:solidFill>
-                <a:latin typeface="なぎの" charset="-120"/>
-                <a:ea typeface="なぎの" charset="-120"/>
-                <a:cs typeface="なぎの" charset="-120"/>
-              </a:rPr>
-              <a:t>右移動</a:t>
-            </a:r>
-            <a:endParaRPr lang="ja-JP" altLang="en-US" sz="2800" dirty="0">
-              <a:solidFill>
-                <a:schemeClr val="tx2">
-                  <a:lumMod val="75000"/>
-                </a:schemeClr>
-              </a:solidFill>
-              <a:latin typeface="なぎの" charset="-120"/>
-              <a:ea typeface="なぎの" charset="-120"/>
-              <a:cs typeface="なぎの" charset="-120"/>
-            </a:endParaRPr>
-          </a:p>
-          <a:p>
-            <a:endParaRPr lang="ja-JP" altLang="en-US" sz="2800" dirty="0">
-              <a:latin typeface="なぎの" charset="-120"/>
-              <a:ea typeface="なぎの" charset="-120"/>
-              <a:cs typeface="なぎの" charset="-120"/>
-            </a:endParaRPr>
-          </a:p>
-          <a:p>
-            <a:r>
-              <a:rPr lang="en-US" altLang="ja-JP" sz="2800" dirty="0">
-                <a:solidFill>
-                  <a:srgbClr val="00B050"/>
-                </a:solidFill>
-                <a:latin typeface="なぎの" charset="-120"/>
-                <a:ea typeface="なぎの" charset="-120"/>
-                <a:cs typeface="なぎの" charset="-120"/>
-                <a:sym typeface="+mn-ea"/>
-              </a:rPr>
-              <a:t>J</a:t>
-            </a:r>
-            <a:r>
-              <a:rPr lang="en-US" altLang="ja-JP" sz="2800" dirty="0">
-                <a:latin typeface="なぎの" charset="-120"/>
-                <a:ea typeface="なぎの" charset="-120"/>
-                <a:cs typeface="なぎの" charset="-120"/>
-                <a:sym typeface="+mn-ea"/>
-              </a:rPr>
-              <a:t> </a:t>
-            </a:r>
-            <a:r>
-              <a:rPr lang="ja-JP" altLang="en-US" sz="2800" dirty="0">
-                <a:solidFill>
-                  <a:schemeClr val="tx2">
-                    <a:lumMod val="75000"/>
-                  </a:schemeClr>
-                </a:solidFill>
-                <a:latin typeface="なぎの" charset="-120"/>
-                <a:ea typeface="なぎの" charset="-120"/>
-                <a:cs typeface="なぎの" charset="-120"/>
-                <a:sym typeface="+mn-ea"/>
-              </a:rPr>
-              <a:t>アクション</a:t>
-            </a:r>
-            <a:r>
-              <a:rPr lang="en-US" altLang="ja-JP" sz="2800" dirty="0">
-                <a:solidFill>
-                  <a:schemeClr val="tx2">
-                    <a:lumMod val="75000"/>
-                  </a:schemeClr>
-                </a:solidFill>
-                <a:latin typeface="なぎの" charset="-120"/>
-                <a:ea typeface="なぎの" charset="-120"/>
-                <a:cs typeface="なぎの" charset="-120"/>
-                <a:sym typeface="+mn-ea"/>
-              </a:rPr>
-              <a:t>	</a:t>
-            </a:r>
-            <a:r>
-              <a:rPr lang="ja-JP" altLang="en-US" sz="2800" dirty="0">
-                <a:solidFill>
-                  <a:schemeClr val="tx2">
-                    <a:lumMod val="75000"/>
-                  </a:schemeClr>
-                </a:solidFill>
-                <a:latin typeface="なぎの" charset="-120"/>
-                <a:ea typeface="なぎの" charset="-120"/>
-                <a:cs typeface="なぎの" charset="-120"/>
-                <a:sym typeface="+mn-ea"/>
-              </a:rPr>
-              <a:t>決定や、ギミックを起動する</a:t>
-            </a:r>
-            <a:endParaRPr lang="ja-JP" altLang="en-US" sz="2800" dirty="0">
-              <a:solidFill>
-                <a:schemeClr val="tx2">
-                  <a:lumMod val="75000"/>
-                </a:schemeClr>
-              </a:solidFill>
-              <a:latin typeface="なぎの" charset="-120"/>
-              <a:ea typeface="なぎの" charset="-120"/>
-              <a:cs typeface="なぎの" charset="-120"/>
-              <a:sym typeface="+mn-ea"/>
-            </a:endParaRPr>
-          </a:p>
-          <a:p>
-            <a:r>
-              <a:rPr lang="en-US" altLang="ja-JP" sz="2800" dirty="0" err="1">
-                <a:solidFill>
-                  <a:srgbClr val="00B050"/>
-                </a:solidFill>
-                <a:latin typeface="なぎの" charset="-120"/>
-                <a:ea typeface="なぎの" charset="-120"/>
-                <a:cs typeface="なぎの" charset="-120"/>
-                <a:sym typeface="+mn-ea"/>
-              </a:rPr>
-              <a:t>Spc</a:t>
-            </a:r>
-            <a:r>
-              <a:rPr lang="en-US" altLang="ja-JP" sz="2800" dirty="0">
-                <a:solidFill>
-                  <a:schemeClr val="tx1"/>
-                </a:solidFill>
-                <a:latin typeface="なぎの" charset="-120"/>
-                <a:ea typeface="なぎの" charset="-120"/>
-                <a:cs typeface="なぎの" charset="-120"/>
-                <a:sym typeface="+mn-ea"/>
-              </a:rPr>
-              <a:t> </a:t>
-            </a:r>
-            <a:r>
-              <a:rPr lang="ja-JP" altLang="en-US" sz="2800" dirty="0">
-                <a:solidFill>
-                  <a:schemeClr val="tx2">
-                    <a:lumMod val="75000"/>
-                  </a:schemeClr>
-                </a:solidFill>
-                <a:latin typeface="なぎの" charset="-120"/>
-                <a:ea typeface="なぎの" charset="-120"/>
-                <a:cs typeface="なぎの" charset="-120"/>
-                <a:sym typeface="+mn-ea"/>
-              </a:rPr>
-              <a:t>戻る</a:t>
-            </a:r>
-            <a:r>
-              <a:rPr lang="en-US" altLang="ja-JP" sz="2800" dirty="0">
-                <a:solidFill>
-                  <a:schemeClr val="tx2">
-                    <a:lumMod val="75000"/>
-                  </a:schemeClr>
-                </a:solidFill>
-                <a:latin typeface="なぎの" charset="-120"/>
-                <a:ea typeface="なぎの" charset="-120"/>
-                <a:cs typeface="なぎの" charset="-120"/>
-                <a:sym typeface="+mn-ea"/>
-              </a:rPr>
-              <a:t>		</a:t>
-            </a:r>
-            <a:r>
-              <a:rPr lang="ja-JP" altLang="en-US" sz="2800" dirty="0">
-                <a:solidFill>
-                  <a:schemeClr val="tx2">
-                    <a:lumMod val="75000"/>
-                  </a:schemeClr>
-                </a:solidFill>
-                <a:latin typeface="なぎの" charset="-120"/>
-                <a:ea typeface="なぎの" charset="-120"/>
-                <a:cs typeface="なぎの" charset="-120"/>
-                <a:sym typeface="+mn-ea"/>
-              </a:rPr>
-              <a:t>チェックポイントに戻る</a:t>
-            </a:r>
-            <a:endParaRPr lang="ja-JP" altLang="en-US" sz="2800" dirty="0">
-              <a:solidFill>
-                <a:schemeClr val="tx2">
-                  <a:lumMod val="75000"/>
-                </a:schemeClr>
-              </a:solidFill>
-              <a:latin typeface="なぎの" charset="-120"/>
-              <a:ea typeface="なぎの" charset="-120"/>
-              <a:cs typeface="なぎの" charset="-120"/>
-              <a:sym typeface="+mn-ea"/>
-            </a:endParaRPr>
-          </a:p>
-          <a:p>
-            <a:pPr>
-              <a:lnSpc>
-                <a:spcPct val="100000"/>
-              </a:lnSpc>
-            </a:pPr>
-            <a:r>
-              <a:rPr lang="en-US" altLang="ja-JP" sz="1600" dirty="0">
-                <a:solidFill>
-                  <a:schemeClr val="tx2">
-                    <a:lumMod val="75000"/>
-                  </a:schemeClr>
-                </a:solidFill>
-                <a:latin typeface="なぎの" charset="-120"/>
-                <a:ea typeface="なぎの" charset="-120"/>
-                <a:cs typeface="なぎの" charset="-120"/>
-                <a:sym typeface="+mn-ea"/>
-              </a:rPr>
-              <a:t>※</a:t>
-            </a:r>
-            <a:r>
-              <a:rPr lang="ja-JP" altLang="en-US" sz="1600" dirty="0">
-                <a:solidFill>
-                  <a:schemeClr val="tx2">
-                    <a:lumMod val="75000"/>
-                  </a:schemeClr>
-                </a:solidFill>
-                <a:latin typeface="なぎの" charset="-120"/>
-                <a:ea typeface="なぎの" charset="-120"/>
-                <a:cs typeface="なぎの" charset="-120"/>
-                <a:sym typeface="+mn-ea"/>
-              </a:rPr>
-              <a:t>ゲーム内からもポーズメニューを開くことで操作方法を確認できます。</a:t>
-            </a:r>
-            <a:endParaRPr lang="ja-JP" altLang="en-US" sz="1600" dirty="0">
-              <a:solidFill>
-                <a:schemeClr val="tx2">
-                  <a:lumMod val="75000"/>
-                </a:schemeClr>
-              </a:solidFill>
-              <a:latin typeface="なぎの" charset="-120"/>
-              <a:ea typeface="なぎの" charset="-120"/>
-              <a:cs typeface="なぎの" charset="-120"/>
-              <a:sym typeface="+mn-ea"/>
-            </a:endParaRPr>
-          </a:p>
-        </p:txBody>
-      </p:sp>
     </p:spTree>
   </p:cSld>
   <p:clrMapOvr>
@@ -6806,7 +6483,7 @@
 </p:sld>
 </file>
 
-<file path=ppt/slides/slide7.xml><?xml version="1.0" encoding="utf-8"?>
+<file path=ppt/slides/slide6.xml><?xml version="1.0" encoding="utf-8"?>
 <p:sld xmlns:a="http://schemas.openxmlformats.org/drawingml/2006/main" xmlns:r="http://schemas.openxmlformats.org/officeDocument/2006/relationships" xmlns:p="http://schemas.openxmlformats.org/presentationml/2006/main">
   <p:cSld>
     <p:bg>

</xml_diff>